<commit_message>
Update session 26 documents.
</commit_message>
<xml_diff>
--- a/CPSC-24700/Presentations/ajax.pptx
+++ b/CPSC-24700/Presentations/ajax.pptx
@@ -164,6 +164,10 @@
 </p:presentation>
 </file>
 
+<file path=ppt/revisionInfo.xml><?xml version="1.0" encoding="utf-8"?>
+<p1510:revInfo xmlns:a="http://schemas.openxmlformats.org/drawingml/2006/main" xmlns:r="http://schemas.openxmlformats.org/officeDocument/2006/relationships" xmlns:p1510="http://schemas.microsoft.com/office/powerpoint/2015/10/main"/>
+</file>
+
 <file path=ppt/notesMasters/notesMaster1.xml><?xml version="1.0" encoding="utf-8"?>
 <p:notesMaster xmlns:a="http://schemas.openxmlformats.org/drawingml/2006/main" xmlns:r="http://schemas.openxmlformats.org/officeDocument/2006/relationships" xmlns:p="http://schemas.openxmlformats.org/presentationml/2006/main">
   <p:cSld>
@@ -246,7 +250,7 @@
           <a:p>
             <a:fld id="{82AC26F5-A2E7-4901-A403-BBD25C17198C}" type="datetimeFigureOut">
               <a:rPr lang="en-US" smtClean="0"/>
-              <a:t>10/26/2017</a:t>
+              <a:t>10/27/2017</a:t>
             </a:fld>
             <a:endParaRPr lang="en-US"/>
           </a:p>
@@ -752,7 +756,7 @@
           <a:p>
             <a:fld id="{FB7712AD-3B21-4FE9-B722-CF9B0200D9B9}" type="datetimeFigureOut">
               <a:rPr lang="en-US" smtClean="0"/>
-              <a:t>10/26/2017</a:t>
+              <a:t>10/27/2017</a:t>
             </a:fld>
             <a:endParaRPr lang="en-US"/>
           </a:p>
@@ -1019,7 +1023,7 @@
           <a:p>
             <a:fld id="{FB7712AD-3B21-4FE9-B722-CF9B0200D9B9}" type="datetimeFigureOut">
               <a:rPr lang="en-US" smtClean="0"/>
-              <a:t>10/26/2017</a:t>
+              <a:t>10/27/2017</a:t>
             </a:fld>
             <a:endParaRPr lang="en-US"/>
           </a:p>
@@ -1199,7 +1203,7 @@
           <a:p>
             <a:fld id="{FB7712AD-3B21-4FE9-B722-CF9B0200D9B9}" type="datetimeFigureOut">
               <a:rPr lang="en-US" smtClean="0"/>
-              <a:t>10/26/2017</a:t>
+              <a:t>10/27/2017</a:t>
             </a:fld>
             <a:endParaRPr lang="en-US"/>
           </a:p>
@@ -1389,7 +1393,7 @@
           <a:p>
             <a:fld id="{FB7712AD-3B21-4FE9-B722-CF9B0200D9B9}" type="datetimeFigureOut">
               <a:rPr lang="en-US" smtClean="0"/>
-              <a:t>10/26/2017</a:t>
+              <a:t>10/27/2017</a:t>
             </a:fld>
             <a:endParaRPr lang="en-US"/>
           </a:p>
@@ -1565,7 +1569,7 @@
           <a:p>
             <a:fld id="{45970EBF-F3D2-4BBA-9F57-483185C1C2DB}" type="datetime1">
               <a:rPr lang="en-US" smtClean="0"/>
-              <a:t>10/26/2017</a:t>
+              <a:t>10/27/2017</a:t>
             </a:fld>
             <a:endParaRPr lang="en-US"/>
           </a:p>
@@ -1702,7 +1706,7 @@
           <a:p>
             <a:fld id="{FB7712AD-3B21-4FE9-B722-CF9B0200D9B9}" type="datetimeFigureOut">
               <a:rPr lang="en-US" smtClean="0"/>
-              <a:t>10/26/2017</a:t>
+              <a:t>10/27/2017</a:t>
             </a:fld>
             <a:endParaRPr lang="en-US"/>
           </a:p>
@@ -1941,7 +1945,7 @@
           <a:p>
             <a:fld id="{FB7712AD-3B21-4FE9-B722-CF9B0200D9B9}" type="datetimeFigureOut">
               <a:rPr lang="en-US" smtClean="0"/>
-              <a:t>10/26/2017</a:t>
+              <a:t>10/27/2017</a:t>
             </a:fld>
             <a:endParaRPr lang="en-US"/>
           </a:p>
@@ -2144,7 +2148,7 @@
           <a:p>
             <a:fld id="{FB7712AD-3B21-4FE9-B722-CF9B0200D9B9}" type="datetimeFigureOut">
               <a:rPr lang="en-US" smtClean="0"/>
-              <a:t>10/26/2017</a:t>
+              <a:t>10/27/2017</a:t>
             </a:fld>
             <a:endParaRPr lang="en-US"/>
           </a:p>
@@ -2441,7 +2445,7 @@
           <a:p>
             <a:fld id="{FB7712AD-3B21-4FE9-B722-CF9B0200D9B9}" type="datetimeFigureOut">
               <a:rPr lang="en-US" smtClean="0"/>
-              <a:t>10/26/2017</a:t>
+              <a:t>10/27/2017</a:t>
             </a:fld>
             <a:endParaRPr lang="en-US"/>
           </a:p>
@@ -2877,7 +2881,7 @@
           <a:p>
             <a:fld id="{FB7712AD-3B21-4FE9-B722-CF9B0200D9B9}" type="datetimeFigureOut">
               <a:rPr lang="en-US" smtClean="0"/>
-              <a:t>10/26/2017</a:t>
+              <a:t>10/27/2017</a:t>
             </a:fld>
             <a:endParaRPr lang="en-US"/>
           </a:p>
@@ -3006,7 +3010,7 @@
           <a:p>
             <a:fld id="{FB7712AD-3B21-4FE9-B722-CF9B0200D9B9}" type="datetimeFigureOut">
               <a:rPr lang="en-US" smtClean="0"/>
-              <a:t>10/26/2017</a:t>
+              <a:t>10/27/2017</a:t>
             </a:fld>
             <a:endParaRPr lang="en-US"/>
           </a:p>
@@ -3113,7 +3117,7 @@
           <a:p>
             <a:fld id="{FB7712AD-3B21-4FE9-B722-CF9B0200D9B9}" type="datetimeFigureOut">
               <a:rPr lang="en-US" smtClean="0"/>
-              <a:t>10/26/2017</a:t>
+              <a:t>10/27/2017</a:t>
             </a:fld>
             <a:endParaRPr lang="en-US"/>
           </a:p>
@@ -3400,7 +3404,7 @@
           <a:p>
             <a:fld id="{FB7712AD-3B21-4FE9-B722-CF9B0200D9B9}" type="datetimeFigureOut">
               <a:rPr lang="en-US" smtClean="0"/>
-              <a:t>10/26/2017</a:t>
+              <a:t>10/27/2017</a:t>
             </a:fld>
             <a:endParaRPr lang="en-US"/>
           </a:p>
@@ -3726,7 +3730,7 @@
           <a:p>
             <a:fld id="{FB7712AD-3B21-4FE9-B722-CF9B0200D9B9}" type="datetimeFigureOut">
               <a:rPr lang="en-US" smtClean="0"/>
-              <a:t>10/26/2017</a:t>
+              <a:t>10/27/2017</a:t>
             </a:fld>
             <a:endParaRPr lang="en-US"/>
           </a:p>

</xml_diff>

<commit_message>
Update session 27 documents.
</commit_message>
<xml_diff>
--- a/CPSC-24700/Presentations/ajax.pptx
+++ b/CPSC-24700/Presentations/ajax.pptx
@@ -6,7 +6,7 @@
     <p:sldMasterId id="2147483675" r:id="rId2"/>
   </p:sldMasterIdLst>
   <p:notesMasterIdLst>
-    <p:notesMasterId r:id="rId43"/>
+    <p:notesMasterId r:id="rId44"/>
   </p:notesMasterIdLst>
   <p:sldIdLst>
     <p:sldId id="256" r:id="rId3"/>
@@ -44,11 +44,12 @@
     <p:sldId id="280" r:id="rId35"/>
     <p:sldId id="290" r:id="rId36"/>
     <p:sldId id="282" r:id="rId37"/>
-    <p:sldId id="297" r:id="rId38"/>
-    <p:sldId id="283" r:id="rId39"/>
-    <p:sldId id="291" r:id="rId40"/>
-    <p:sldId id="292" r:id="rId41"/>
-    <p:sldId id="298" r:id="rId42"/>
+    <p:sldId id="300" r:id="rId38"/>
+    <p:sldId id="297" r:id="rId39"/>
+    <p:sldId id="283" r:id="rId40"/>
+    <p:sldId id="291" r:id="rId41"/>
+    <p:sldId id="292" r:id="rId42"/>
+    <p:sldId id="298" r:id="rId43"/>
   </p:sldIdLst>
   <p:sldSz cx="9144000" cy="6858000" type="screen4x3"/>
   <p:notesSz cx="6858000" cy="9144000"/>
@@ -252,7 +253,7 @@
           <a:p>
             <a:fld id="{82AC26F5-A2E7-4901-A403-BBD25C17198C}" type="datetimeFigureOut">
               <a:rPr lang="en-US" smtClean="0"/>
-              <a:t>10/30/2017</a:t>
+              <a:t>11/1/2017</a:t>
             </a:fld>
             <a:endParaRPr lang="en-US"/>
           </a:p>
@@ -924,6 +925,150 @@
 </p:notes>
 </file>
 
+<file path=ppt/notesSlides/notesSlide5.xml><?xml version="1.0" encoding="utf-8"?>
+<p:notes xmlns:a="http://schemas.openxmlformats.org/drawingml/2006/main" xmlns:r="http://schemas.openxmlformats.org/officeDocument/2006/relationships" xmlns:p="http://schemas.openxmlformats.org/presentationml/2006/main">
+  <p:cSld>
+    <p:spTree>
+      <p:nvGrpSpPr>
+        <p:cNvPr id="1" name=""/>
+        <p:cNvGrpSpPr/>
+        <p:nvPr/>
+      </p:nvGrpSpPr>
+      <p:grpSpPr>
+        <a:xfrm>
+          <a:off x="0" y="0"/>
+          <a:ext cx="0" cy="0"/>
+          <a:chOff x="0" y="0"/>
+          <a:chExt cx="0" cy="0"/>
+        </a:xfrm>
+      </p:grpSpPr>
+      <p:sp>
+        <p:nvSpPr>
+          <p:cNvPr id="2" name="Slide Image Placeholder 1"/>
+          <p:cNvSpPr>
+            <a:spLocks noGrp="1" noRot="1" noChangeAspect="1"/>
+          </p:cNvSpPr>
+          <p:nvPr>
+            <p:ph type="sldImg"/>
+          </p:nvPr>
+        </p:nvSpPr>
+        <p:spPr/>
+      </p:sp>
+      <p:sp>
+        <p:nvSpPr>
+          <p:cNvPr id="3" name="Notes Placeholder 2"/>
+          <p:cNvSpPr>
+            <a:spLocks noGrp="1"/>
+          </p:cNvSpPr>
+          <p:nvPr>
+            <p:ph type="body" idx="1"/>
+          </p:nvPr>
+        </p:nvSpPr>
+        <p:spPr/>
+        <p:txBody>
+          <a:bodyPr/>
+          <a:lstStyle/>
+          <a:p>
+            <a:endParaRPr lang="en-US" dirty="0"/>
+          </a:p>
+        </p:txBody>
+      </p:sp>
+      <p:sp>
+        <p:nvSpPr>
+          <p:cNvPr id="4" name="Slide Number Placeholder 3"/>
+          <p:cNvSpPr>
+            <a:spLocks noGrp="1"/>
+          </p:cNvSpPr>
+          <p:nvPr>
+            <p:ph type="sldNum" sz="quarter" idx="10"/>
+          </p:nvPr>
+        </p:nvSpPr>
+        <p:spPr/>
+        <p:txBody>
+          <a:bodyPr/>
+          <a:lstStyle/>
+          <a:p>
+            <a:pPr marL="0" marR="0" lvl="0" indent="0" algn="r" defTabSz="914400" rtl="0" eaLnBrk="1" fontAlgn="auto" latinLnBrk="0" hangingPunct="1">
+              <a:lnSpc>
+                <a:spcPct val="100000"/>
+              </a:lnSpc>
+              <a:spcBef>
+                <a:spcPts val="0"/>
+              </a:spcBef>
+              <a:spcAft>
+                <a:spcPts val="0"/>
+              </a:spcAft>
+              <a:buClrTx/>
+              <a:buSzTx/>
+              <a:buFontTx/>
+              <a:buNone/>
+              <a:tabLst/>
+              <a:defRPr/>
+            </a:pPr>
+            <a:fld id="{5394DE12-7B9B-46AA-AC19-C30A49928B9B}" type="slidenum">
+              <a:rPr kumimoji="0" lang="en-US" sz="1200" b="0" i="0" u="none" strike="noStrike" kern="1200" cap="none" spc="0" normalizeH="0" baseline="0" noProof="0" smtClean="0">
+                <a:ln>
+                  <a:noFill/>
+                </a:ln>
+                <a:solidFill>
+                  <a:prstClr val="black"/>
+                </a:solidFill>
+                <a:effectLst/>
+                <a:uLnTx/>
+                <a:uFillTx/>
+                <a:latin typeface="Calibri" panose="020F0502020204030204"/>
+                <a:ea typeface="+mn-ea"/>
+                <a:cs typeface="+mn-cs"/>
+              </a:rPr>
+              <a:pPr marL="0" marR="0" lvl="0" indent="0" algn="r" defTabSz="914400" rtl="0" eaLnBrk="1" fontAlgn="auto" latinLnBrk="0" hangingPunct="1">
+                <a:lnSpc>
+                  <a:spcPct val="100000"/>
+                </a:lnSpc>
+                <a:spcBef>
+                  <a:spcPts val="0"/>
+                </a:spcBef>
+                <a:spcAft>
+                  <a:spcPts val="0"/>
+                </a:spcAft>
+                <a:buClrTx/>
+                <a:buSzTx/>
+                <a:buFontTx/>
+                <a:buNone/>
+                <a:tabLst/>
+                <a:defRPr/>
+              </a:pPr>
+              <a:t>36</a:t>
+            </a:fld>
+            <a:endParaRPr kumimoji="0" lang="en-US" sz="1200" b="0" i="0" u="none" strike="noStrike" kern="1200" cap="none" spc="0" normalizeH="0" baseline="0" noProof="0" dirty="0">
+              <a:ln>
+                <a:noFill/>
+              </a:ln>
+              <a:solidFill>
+                <a:prstClr val="black"/>
+              </a:solidFill>
+              <a:effectLst/>
+              <a:uLnTx/>
+              <a:uFillTx/>
+              <a:latin typeface="Calibri" panose="020F0502020204030204"/>
+              <a:ea typeface="+mn-ea"/>
+              <a:cs typeface="+mn-cs"/>
+            </a:endParaRPr>
+          </a:p>
+        </p:txBody>
+      </p:sp>
+    </p:spTree>
+    <p:extLst>
+      <p:ext uri="{BB962C8B-B14F-4D97-AF65-F5344CB8AC3E}">
+        <p14:creationId xmlns:p14="http://schemas.microsoft.com/office/powerpoint/2010/main" val="83885594"/>
+      </p:ext>
+    </p:extLst>
+  </p:cSld>
+  <p:clrMapOvr>
+    <a:masterClrMapping/>
+  </p:clrMapOvr>
+</p:notes>
+</file>
+
 <file path=ppt/slideLayouts/slideLayout1.xml><?xml version="1.0" encoding="utf-8"?>
 <p:sldLayout xmlns:a="http://schemas.openxmlformats.org/drawingml/2006/main" xmlns:r="http://schemas.openxmlformats.org/officeDocument/2006/relationships" xmlns:p="http://schemas.openxmlformats.org/presentationml/2006/main" type="title" preserve="1">
   <p:cSld name="Title Slide">
@@ -1082,7 +1227,7 @@
           <a:p>
             <a:fld id="{FB7712AD-3B21-4FE9-B722-CF9B0200D9B9}" type="datetimeFigureOut">
               <a:rPr lang="en-US" smtClean="0"/>
-              <a:t>10/30/2017</a:t>
+              <a:t>11/1/2017</a:t>
             </a:fld>
             <a:endParaRPr lang="en-US"/>
           </a:p>
@@ -1349,7 +1494,7 @@
           <a:p>
             <a:fld id="{FB7712AD-3B21-4FE9-B722-CF9B0200D9B9}" type="datetimeFigureOut">
               <a:rPr lang="en-US" smtClean="0"/>
-              <a:t>10/30/2017</a:t>
+              <a:t>11/1/2017</a:t>
             </a:fld>
             <a:endParaRPr lang="en-US"/>
           </a:p>
@@ -1529,7 +1674,7 @@
           <a:p>
             <a:fld id="{FB7712AD-3B21-4FE9-B722-CF9B0200D9B9}" type="datetimeFigureOut">
               <a:rPr lang="en-US" smtClean="0"/>
-              <a:t>10/30/2017</a:t>
+              <a:t>11/1/2017</a:t>
             </a:fld>
             <a:endParaRPr lang="en-US"/>
           </a:p>
@@ -1719,7 +1864,7 @@
           <a:p>
             <a:fld id="{FB7712AD-3B21-4FE9-B722-CF9B0200D9B9}" type="datetimeFigureOut">
               <a:rPr lang="en-US" smtClean="0"/>
-              <a:t>10/30/2017</a:t>
+              <a:t>11/1/2017</a:t>
             </a:fld>
             <a:endParaRPr lang="en-US"/>
           </a:p>
@@ -1895,7 +2040,7 @@
           <a:p>
             <a:fld id="{45970EBF-F3D2-4BBA-9F57-483185C1C2DB}" type="datetime1">
               <a:rPr lang="en-US" smtClean="0"/>
-              <a:t>10/30/2017</a:t>
+              <a:t>11/1/2017</a:t>
             </a:fld>
             <a:endParaRPr lang="en-US"/>
           </a:p>
@@ -2104,7 +2249,7 @@
           <a:p>
             <a:fld id="{5FB62F81-FD80-4AA8-93CA-E835B40BE667}" type="datetimeFigureOut">
               <a:rPr lang="en-US" smtClean="0"/>
-              <a:t>10/30/2017</a:t>
+              <a:t>11/1/2017</a:t>
             </a:fld>
             <a:endParaRPr lang="en-US"/>
           </a:p>
@@ -2302,7 +2447,7 @@
           <a:p>
             <a:fld id="{5FB62F81-FD80-4AA8-93CA-E835B40BE667}" type="datetimeFigureOut">
               <a:rPr lang="en-US" smtClean="0"/>
-              <a:t>10/30/2017</a:t>
+              <a:t>11/1/2017</a:t>
             </a:fld>
             <a:endParaRPr lang="en-US"/>
           </a:p>
@@ -2577,7 +2722,7 @@
           <a:p>
             <a:fld id="{5FB62F81-FD80-4AA8-93CA-E835B40BE667}" type="datetimeFigureOut">
               <a:rPr lang="en-US" smtClean="0"/>
-              <a:t>10/30/2017</a:t>
+              <a:t>11/1/2017</a:t>
             </a:fld>
             <a:endParaRPr lang="en-US"/>
           </a:p>
@@ -2842,7 +2987,7 @@
           <a:p>
             <a:fld id="{5FB62F81-FD80-4AA8-93CA-E835B40BE667}" type="datetimeFigureOut">
               <a:rPr lang="en-US" smtClean="0"/>
-              <a:t>10/30/2017</a:t>
+              <a:t>11/1/2017</a:t>
             </a:fld>
             <a:endParaRPr lang="en-US"/>
           </a:p>
@@ -3254,7 +3399,7 @@
           <a:p>
             <a:fld id="{5FB62F81-FD80-4AA8-93CA-E835B40BE667}" type="datetimeFigureOut">
               <a:rPr lang="en-US" smtClean="0"/>
-              <a:t>10/30/2017</a:t>
+              <a:t>11/1/2017</a:t>
             </a:fld>
             <a:endParaRPr lang="en-US"/>
           </a:p>
@@ -3395,7 +3540,7 @@
           <a:p>
             <a:fld id="{5FB62F81-FD80-4AA8-93CA-E835B40BE667}" type="datetimeFigureOut">
               <a:rPr lang="en-US" smtClean="0"/>
-              <a:t>10/30/2017</a:t>
+              <a:t>11/1/2017</a:t>
             </a:fld>
             <a:endParaRPr lang="en-US"/>
           </a:p>
@@ -3543,7 +3688,7 @@
           <a:p>
             <a:fld id="{FB7712AD-3B21-4FE9-B722-CF9B0200D9B9}" type="datetimeFigureOut">
               <a:rPr lang="en-US" smtClean="0"/>
-              <a:t>10/30/2017</a:t>
+              <a:t>11/1/2017</a:t>
             </a:fld>
             <a:endParaRPr lang="en-US"/>
           </a:p>
@@ -3652,7 +3797,7 @@
           <a:p>
             <a:fld id="{5FB62F81-FD80-4AA8-93CA-E835B40BE667}" type="datetimeFigureOut">
               <a:rPr lang="en-US" smtClean="0"/>
-              <a:t>10/30/2017</a:t>
+              <a:t>11/1/2017</a:t>
             </a:fld>
             <a:endParaRPr lang="en-US"/>
           </a:p>
@@ -3963,7 +4108,7 @@
           <a:p>
             <a:fld id="{5FB62F81-FD80-4AA8-93CA-E835B40BE667}" type="datetimeFigureOut">
               <a:rPr lang="en-US" smtClean="0"/>
-              <a:t>10/30/2017</a:t>
+              <a:t>11/1/2017</a:t>
             </a:fld>
             <a:endParaRPr lang="en-US"/>
           </a:p>
@@ -4251,7 +4396,7 @@
           <a:p>
             <a:fld id="{5FB62F81-FD80-4AA8-93CA-E835B40BE667}" type="datetimeFigureOut">
               <a:rPr lang="en-US" smtClean="0"/>
-              <a:t>10/30/2017</a:t>
+              <a:t>11/1/2017</a:t>
             </a:fld>
             <a:endParaRPr lang="en-US"/>
           </a:p>
@@ -4449,7 +4594,7 @@
           <a:p>
             <a:fld id="{5FB62F81-FD80-4AA8-93CA-E835B40BE667}" type="datetimeFigureOut">
               <a:rPr lang="en-US" smtClean="0"/>
-              <a:t>10/30/2017</a:t>
+              <a:t>11/1/2017</a:t>
             </a:fld>
             <a:endParaRPr lang="en-US"/>
           </a:p>
@@ -4657,7 +4802,7 @@
           <a:p>
             <a:fld id="{5FB62F81-FD80-4AA8-93CA-E835B40BE667}" type="datetimeFigureOut">
               <a:rPr lang="en-US" smtClean="0"/>
-              <a:t>10/30/2017</a:t>
+              <a:t>11/1/2017</a:t>
             </a:fld>
             <a:endParaRPr lang="en-US"/>
           </a:p>
@@ -4900,7 +5045,7 @@
           <a:p>
             <a:fld id="{FB7712AD-3B21-4FE9-B722-CF9B0200D9B9}" type="datetimeFigureOut">
               <a:rPr lang="en-US" smtClean="0"/>
-              <a:t>10/30/2017</a:t>
+              <a:t>11/1/2017</a:t>
             </a:fld>
             <a:endParaRPr lang="en-US"/>
           </a:p>
@@ -5103,7 +5248,7 @@
           <a:p>
             <a:fld id="{FB7712AD-3B21-4FE9-B722-CF9B0200D9B9}" type="datetimeFigureOut">
               <a:rPr lang="en-US" smtClean="0"/>
-              <a:t>10/30/2017</a:t>
+              <a:t>11/1/2017</a:t>
             </a:fld>
             <a:endParaRPr lang="en-US"/>
           </a:p>
@@ -5400,7 +5545,7 @@
           <a:p>
             <a:fld id="{FB7712AD-3B21-4FE9-B722-CF9B0200D9B9}" type="datetimeFigureOut">
               <a:rPr lang="en-US" smtClean="0"/>
-              <a:t>10/30/2017</a:t>
+              <a:t>11/1/2017</a:t>
             </a:fld>
             <a:endParaRPr lang="en-US"/>
           </a:p>
@@ -5836,7 +5981,7 @@
           <a:p>
             <a:fld id="{FB7712AD-3B21-4FE9-B722-CF9B0200D9B9}" type="datetimeFigureOut">
               <a:rPr lang="en-US" smtClean="0"/>
-              <a:t>10/30/2017</a:t>
+              <a:t>11/1/2017</a:t>
             </a:fld>
             <a:endParaRPr lang="en-US"/>
           </a:p>
@@ -5965,7 +6110,7 @@
           <a:p>
             <a:fld id="{FB7712AD-3B21-4FE9-B722-CF9B0200D9B9}" type="datetimeFigureOut">
               <a:rPr lang="en-US" smtClean="0"/>
-              <a:t>10/30/2017</a:t>
+              <a:t>11/1/2017</a:t>
             </a:fld>
             <a:endParaRPr lang="en-US"/>
           </a:p>
@@ -6072,7 +6217,7 @@
           <a:p>
             <a:fld id="{FB7712AD-3B21-4FE9-B722-CF9B0200D9B9}" type="datetimeFigureOut">
               <a:rPr lang="en-US" smtClean="0"/>
-              <a:t>10/30/2017</a:t>
+              <a:t>11/1/2017</a:t>
             </a:fld>
             <a:endParaRPr lang="en-US"/>
           </a:p>
@@ -6359,7 +6504,7 @@
           <a:p>
             <a:fld id="{FB7712AD-3B21-4FE9-B722-CF9B0200D9B9}" type="datetimeFigureOut">
               <a:rPr lang="en-US" smtClean="0"/>
-              <a:t>10/30/2017</a:t>
+              <a:t>11/1/2017</a:t>
             </a:fld>
             <a:endParaRPr lang="en-US"/>
           </a:p>
@@ -6685,7 +6830,7 @@
           <a:p>
             <a:fld id="{FB7712AD-3B21-4FE9-B722-CF9B0200D9B9}" type="datetimeFigureOut">
               <a:rPr lang="en-US" smtClean="0"/>
-              <a:t>10/30/2017</a:t>
+              <a:t>11/1/2017</a:t>
             </a:fld>
             <a:endParaRPr lang="en-US"/>
           </a:p>
@@ -7386,7 +7531,7 @@
           <a:p>
             <a:fld id="{5FB62F81-FD80-4AA8-93CA-E835B40BE667}" type="datetimeFigureOut">
               <a:rPr lang="en-US" smtClean="0"/>
-              <a:t>10/30/2017</a:t>
+              <a:t>11/1/2017</a:t>
             </a:fld>
             <a:endParaRPr lang="en-US"/>
           </a:p>
@@ -9455,7 +9600,7 @@
           <a:p>
             <a:r>
               <a:rPr lang="en-US" sz="3600" dirty="0"/>
-              <a:t>End of Session</a:t>
+              <a:t>Start Session 27</a:t>
             </a:r>
           </a:p>
         </p:txBody>
@@ -13494,6 +13639,16 @@
 <file path=ppt/slides/slide36.xml><?xml version="1.0" encoding="utf-8"?>
 <p:sld xmlns:a="http://schemas.openxmlformats.org/drawingml/2006/main" xmlns:r="http://schemas.openxmlformats.org/officeDocument/2006/relationships" xmlns:p="http://schemas.openxmlformats.org/presentationml/2006/main">
   <p:cSld>
+    <p:bg>
+      <p:bgPr>
+        <a:solidFill>
+          <a:schemeClr val="bg1">
+            <a:lumMod val="75000"/>
+          </a:schemeClr>
+        </a:solidFill>
+        <a:effectLst/>
+      </p:bgPr>
+    </p:bg>
     <p:spTree>
       <p:nvGrpSpPr>
         <p:cNvPr id="1" name=""/>
@@ -13518,14 +13673,58 @@
             <p:ph type="ctrTitle"/>
           </p:nvPr>
         </p:nvSpPr>
-        <p:spPr/>
-        <p:txBody>
-          <a:bodyPr/>
-          <a:lstStyle/>
-          <a:p>
+        <p:spPr>
+          <a:xfrm>
+            <a:off x="1143000" y="1699022"/>
+            <a:ext cx="6858000" cy="1790700"/>
+          </a:xfrm>
+        </p:spPr>
+        <p:txBody>
+          <a:bodyPr>
+            <a:normAutofit/>
+          </a:bodyPr>
+          <a:lstStyle/>
+          <a:p>
+            <a:r>
+              <a:rPr lang="en-US" sz="3600" dirty="0"/>
+              <a:t>End of Session 27</a:t>
+            </a:r>
+          </a:p>
+        </p:txBody>
+      </p:sp>
+      <p:sp>
+        <p:nvSpPr>
+          <p:cNvPr id="3" name="Subtitle 2"/>
+          <p:cNvSpPr>
+            <a:spLocks noGrp="1"/>
+          </p:cNvSpPr>
+          <p:nvPr>
+            <p:ph type="subTitle" idx="1"/>
+          </p:nvPr>
+        </p:nvSpPr>
+        <p:spPr>
+          <a:xfrm>
+            <a:off x="1143000" y="3558778"/>
+            <a:ext cx="6858000" cy="1648517"/>
+          </a:xfrm>
+        </p:spPr>
+        <p:txBody>
+          <a:bodyPr>
+            <a:normAutofit/>
+          </a:bodyPr>
+          <a:lstStyle/>
+          <a:p>
+            <a:pPr algn="l"/>
             <a:r>
               <a:rPr lang="en-US" dirty="0"/>
-              <a:t>AJAX Security Issues</a:t>
+              <a:t>Course Number: CPSC-24700</a:t>
+            </a:r>
+          </a:p>
+          <a:p>
+            <a:pPr algn="l"/>
+            <a:r>
+              <a:rPr lang="en-US" dirty="0"/>
+              <a:t>Instructor: Eric Pogue</a:t>
             </a:r>
           </a:p>
         </p:txBody>
@@ -13533,7 +13732,7 @@
     </p:spTree>
     <p:extLst>
       <p:ext uri="{BB962C8B-B14F-4D97-AF65-F5344CB8AC3E}">
-        <p14:creationId xmlns:p14="http://schemas.microsoft.com/office/powerpoint/2010/main" val="3917904633"/>
+        <p14:creationId xmlns:p14="http://schemas.microsoft.com/office/powerpoint/2010/main" val="3743516022"/>
       </p:ext>
     </p:extLst>
   </p:cSld>
@@ -13562,128 +13761,30 @@
       </p:grpSpPr>
       <p:sp>
         <p:nvSpPr>
-          <p:cNvPr id="5" name="Title 4"/>
-          <p:cNvSpPr>
-            <a:spLocks noGrp="1"/>
-          </p:cNvSpPr>
-          <p:nvPr>
-            <p:ph type="title"/>
-          </p:nvPr>
-        </p:nvSpPr>
-        <p:spPr/>
-        <p:txBody>
-          <a:bodyPr>
-            <a:noAutofit/>
-          </a:bodyPr>
+          <p:cNvPr id="2" name="Title 1"/>
+          <p:cNvSpPr>
+            <a:spLocks noGrp="1"/>
+          </p:cNvSpPr>
+          <p:nvPr>
+            <p:ph type="ctrTitle"/>
+          </p:nvPr>
+        </p:nvSpPr>
+        <p:spPr/>
+        <p:txBody>
+          <a:bodyPr/>
           <a:lstStyle/>
           <a:p>
             <a:r>
               <a:rPr lang="en-US" dirty="0"/>
-              <a:t>Security and Ajax</a:t>
-            </a:r>
-          </a:p>
-        </p:txBody>
-      </p:sp>
-      <p:sp>
-        <p:nvSpPr>
-          <p:cNvPr id="6" name="Content Placeholder 5"/>
-          <p:cNvSpPr>
-            <a:spLocks noGrp="1"/>
-          </p:cNvSpPr>
-          <p:nvPr>
-            <p:ph idx="1"/>
-          </p:nvPr>
-        </p:nvSpPr>
-        <p:spPr/>
-        <p:txBody>
-          <a:bodyPr>
-            <a:normAutofit/>
-          </a:bodyPr>
-          <a:lstStyle/>
-          <a:p>
-            <a:r>
-              <a:rPr lang="en-US" dirty="0"/>
-              <a:t>Some security issues to keep in mind when using Ajax:</a:t>
-            </a:r>
-          </a:p>
-          <a:p>
-            <a:endParaRPr lang="en-US" dirty="0"/>
-          </a:p>
-          <a:p>
-            <a:r>
-              <a:rPr lang="en-US" dirty="0"/>
-              <a:t>Non-Ajax applications often have just one or only a few server-side sources of responses</a:t>
-            </a:r>
-          </a:p>
-          <a:p>
-            <a:endParaRPr lang="en-US" dirty="0"/>
-          </a:p>
-          <a:p>
-            <a:r>
-              <a:rPr lang="en-US" dirty="0"/>
-              <a:t>Ajax applications often have </a:t>
-            </a:r>
-            <a:r>
-              <a:rPr lang="en-US" b="1" dirty="0"/>
-              <a:t>many server-side programs</a:t>
-            </a:r>
-            <a:r>
-              <a:rPr lang="en-US" dirty="0"/>
-              <a:t> that produce small amounts of data.  </a:t>
-            </a:r>
-          </a:p>
-          <a:p>
-            <a:endParaRPr lang="en-US" dirty="0"/>
-          </a:p>
-          <a:p>
-            <a:r>
-              <a:rPr lang="en-US" dirty="0">
-                <a:solidFill>
-                  <a:srgbClr val="FF0000"/>
-                </a:solidFill>
-              </a:rPr>
-              <a:t>This increases the attack surface of the whole application</a:t>
-            </a:r>
-          </a:p>
-          <a:p>
-            <a:endParaRPr lang="en-US" dirty="0"/>
-          </a:p>
-          <a:p>
-            <a:endParaRPr lang="en-US" dirty="0"/>
-          </a:p>
-          <a:p>
-            <a:endParaRPr lang="en-US" dirty="0"/>
-          </a:p>
-        </p:txBody>
-      </p:sp>
-      <p:sp>
-        <p:nvSpPr>
-          <p:cNvPr id="8" name="Slide Number Placeholder 7"/>
-          <p:cNvSpPr>
-            <a:spLocks noGrp="1"/>
-          </p:cNvSpPr>
-          <p:nvPr>
-            <p:ph type="sldNum" sz="quarter" idx="12"/>
-          </p:nvPr>
-        </p:nvSpPr>
-        <p:spPr/>
-        <p:txBody>
-          <a:bodyPr/>
-          <a:lstStyle/>
-          <a:p>
-            <a:fld id="{B68E68E5-E6FC-4206-8BED-C09E3F386DCD}" type="slidenum">
-              <a:rPr lang="en-US" smtClean="0"/>
-              <a:pPr/>
-              <a:t>37</a:t>
-            </a:fld>
-            <a:endParaRPr lang="en-US"/>
+              <a:t>AJAX Security Issues</a:t>
+            </a:r>
           </a:p>
         </p:txBody>
       </p:sp>
     </p:spTree>
     <p:extLst>
       <p:ext uri="{BB962C8B-B14F-4D97-AF65-F5344CB8AC3E}">
-        <p14:creationId xmlns:p14="http://schemas.microsoft.com/office/powerpoint/2010/main" val="2278236532"/>
+        <p14:creationId xmlns:p14="http://schemas.microsoft.com/office/powerpoint/2010/main" val="3917904633"/>
       </p:ext>
     </p:extLst>
   </p:cSld>
@@ -13744,12 +13845,7 @@
             <p:ph idx="1"/>
           </p:nvPr>
         </p:nvSpPr>
-        <p:spPr>
-          <a:xfrm>
-            <a:off x="685800" y="1219200"/>
-            <a:ext cx="7772400" cy="4953000"/>
-          </a:xfrm>
-        </p:spPr>
+        <p:spPr/>
         <p:txBody>
           <a:bodyPr>
             <a:normAutofit/>
@@ -13758,50 +13854,56 @@
           <a:p>
             <a:r>
               <a:rPr lang="en-US" dirty="0"/>
-              <a:t>Therefore Ajax developers should put </a:t>
+              <a:t>Some security issues to keep in mind when using Ajax:</a:t>
+            </a:r>
+          </a:p>
+          <a:p>
+            <a:endParaRPr lang="en-US" dirty="0"/>
+          </a:p>
+          <a:p>
+            <a:r>
+              <a:rPr lang="en-US" dirty="0"/>
+              <a:t>Non-Ajax applications often have just one or only a few server-side sources of responses</a:t>
+            </a:r>
+          </a:p>
+          <a:p>
+            <a:endParaRPr lang="en-US" dirty="0"/>
+          </a:p>
+          <a:p>
+            <a:r>
+              <a:rPr lang="en-US" dirty="0"/>
+              <a:t>Ajax applications often have </a:t>
             </a:r>
             <a:r>
               <a:rPr lang="en-US" b="1" dirty="0"/>
-              <a:t>security code in the client code</a:t>
+              <a:t>many server-side programs</a:t>
+            </a:r>
+            <a:r>
+              <a:rPr lang="en-US" dirty="0"/>
+              <a:t> that produce small amounts of data.  </a:t>
             </a:r>
           </a:p>
           <a:p>
             <a:endParaRPr lang="en-US" dirty="0"/>
           </a:p>
           <a:p>
-            <a:r>
-              <a:rPr lang="en-US" dirty="0"/>
-              <a:t>Also, </a:t>
-            </a:r>
-            <a:r>
-              <a:rPr lang="en-US" b="1" dirty="0"/>
-              <a:t>must include in the server code</a:t>
-            </a:r>
-            <a:r>
-              <a:rPr lang="en-US" dirty="0"/>
-              <a:t>, because </a:t>
-            </a:r>
             <a:r>
               <a:rPr lang="en-US" dirty="0">
                 <a:solidFill>
-                  <a:srgbClr val="7030A0"/>
+                  <a:srgbClr val="FF0000"/>
                 </a:solidFill>
               </a:rPr>
-              <a:t>intruders can change the code on the client</a:t>
+              <a:t>This increases the attack surface of the whole application</a:t>
             </a:r>
           </a:p>
           <a:p>
             <a:endParaRPr lang="en-US" dirty="0"/>
           </a:p>
           <a:p>
-            <a:r>
-              <a:rPr lang="en-US" dirty="0"/>
-              <a:t>The common problem comes from </a:t>
-            </a:r>
-            <a:r>
-              <a:rPr lang="en-US" b="1" dirty="0"/>
-              <a:t>cross-site scripting</a:t>
-            </a:r>
+            <a:endParaRPr lang="en-US" dirty="0"/>
+          </a:p>
+          <a:p>
+            <a:endParaRPr lang="en-US" dirty="0"/>
           </a:p>
         </p:txBody>
       </p:sp>
@@ -13832,7 +13934,7 @@
     </p:spTree>
     <p:extLst>
       <p:ext uri="{BB962C8B-B14F-4D97-AF65-F5344CB8AC3E}">
-        <p14:creationId xmlns:p14="http://schemas.microsoft.com/office/powerpoint/2010/main" val="1655927440"/>
+        <p14:creationId xmlns:p14="http://schemas.microsoft.com/office/powerpoint/2010/main" val="2278236532"/>
       </p:ext>
     </p:extLst>
   </p:cSld>
@@ -13906,59 +14008,51 @@
           <a:lstStyle/>
           <a:p>
             <a:r>
-              <a:rPr lang="en-US" b="1" i="1" dirty="0">
+              <a:rPr lang="en-US" dirty="0"/>
+              <a:t>Therefore Ajax developers should put </a:t>
+            </a:r>
+            <a:r>
+              <a:rPr lang="en-US" b="1" dirty="0"/>
+              <a:t>security code in the client code</a:t>
+            </a:r>
+          </a:p>
+          <a:p>
+            <a:endParaRPr lang="en-US" dirty="0"/>
+          </a:p>
+          <a:p>
+            <a:r>
+              <a:rPr lang="en-US" dirty="0"/>
+              <a:t>Also, </a:t>
+            </a:r>
+            <a:r>
+              <a:rPr lang="en-US" b="1" dirty="0"/>
+              <a:t>must include in the server code</a:t>
+            </a:r>
+            <a:r>
+              <a:rPr lang="en-US" dirty="0"/>
+              <a:t>, because </a:t>
+            </a:r>
+            <a:r>
+              <a:rPr lang="en-US" dirty="0">
                 <a:solidFill>
-                  <a:srgbClr val="FF0000"/>
+                  <a:srgbClr val="7030A0"/>
                 </a:solidFill>
               </a:rPr>
-              <a:t>Cross-site scripting </a:t>
-            </a:r>
+              <a:t>intruders can change the code on the client</a:t>
+            </a:r>
+          </a:p>
+          <a:p>
+            <a:endParaRPr lang="en-US" dirty="0"/>
+          </a:p>
+          <a:p>
             <a:r>
               <a:rPr lang="en-US" dirty="0"/>
-              <a:t>means servers providing JavaScript code as an Ajax response</a:t>
-            </a:r>
-          </a:p>
-          <a:p>
-            <a:pPr marL="342900" indent="-342900">
-              <a:buFont typeface="Arial" panose="020B0604020202020204" pitchFamily="34" charset="0"/>
-              <a:buChar char="•"/>
-            </a:pPr>
-            <a:r>
-              <a:rPr lang="en-US" dirty="0"/>
-              <a:t>Such code could be modified by an intruder before it is run on the client </a:t>
-            </a:r>
-          </a:p>
-          <a:p>
-            <a:pPr marL="342900" indent="-342900">
-              <a:buFont typeface="Arial" panose="020B0604020202020204" pitchFamily="34" charset="0"/>
-              <a:buChar char="•"/>
-            </a:pPr>
-            <a:r>
-              <a:rPr lang="en-US" dirty="0"/>
-              <a:t>All such code must be scanned before it is interpreted</a:t>
-            </a:r>
-          </a:p>
-          <a:p>
-            <a:endParaRPr lang="en-US" dirty="0"/>
-          </a:p>
-          <a:p>
-            <a:r>
-              <a:rPr lang="en-US" dirty="0"/>
-              <a:t>Intruder code could also come to the client from text boxes used to collect return data</a:t>
-            </a:r>
-          </a:p>
-          <a:p>
-            <a:pPr marL="342900" indent="-342900">
-              <a:buFont typeface="Arial" panose="020B0604020202020204" pitchFamily="34" charset="0"/>
-              <a:buChar char="•"/>
-            </a:pPr>
-            <a:r>
-              <a:rPr lang="en-US" dirty="0"/>
-              <a:t>It could include script tags with malicious code</a:t>
-            </a:r>
-          </a:p>
-          <a:p>
-            <a:endParaRPr lang="en-US" dirty="0"/>
+              <a:t>The common problem comes from </a:t>
+            </a:r>
+            <a:r>
+              <a:rPr lang="en-US" b="1" dirty="0"/>
+              <a:t>cross-site scripting</a:t>
+            </a:r>
           </a:p>
         </p:txBody>
       </p:sp>
@@ -13989,7 +14083,7 @@
     </p:spTree>
     <p:extLst>
       <p:ext uri="{BB962C8B-B14F-4D97-AF65-F5344CB8AC3E}">
-        <p14:creationId xmlns:p14="http://schemas.microsoft.com/office/powerpoint/2010/main" val="1604505368"/>
+        <p14:creationId xmlns:p14="http://schemas.microsoft.com/office/powerpoint/2010/main" val="1655927440"/>
       </p:ext>
     </p:extLst>
   </p:cSld>
@@ -14157,6 +14251,163 @@
 </file>
 
 <file path=ppt/slides/slide40.xml><?xml version="1.0" encoding="utf-8"?>
+<p:sld xmlns:a="http://schemas.openxmlformats.org/drawingml/2006/main" xmlns:r="http://schemas.openxmlformats.org/officeDocument/2006/relationships" xmlns:p="http://schemas.openxmlformats.org/presentationml/2006/main">
+  <p:cSld>
+    <p:spTree>
+      <p:nvGrpSpPr>
+        <p:cNvPr id="1" name=""/>
+        <p:cNvGrpSpPr/>
+        <p:nvPr/>
+      </p:nvGrpSpPr>
+      <p:grpSpPr>
+        <a:xfrm>
+          <a:off x="0" y="0"/>
+          <a:ext cx="0" cy="0"/>
+          <a:chOff x="0" y="0"/>
+          <a:chExt cx="0" cy="0"/>
+        </a:xfrm>
+      </p:grpSpPr>
+      <p:sp>
+        <p:nvSpPr>
+          <p:cNvPr id="5" name="Title 4"/>
+          <p:cNvSpPr>
+            <a:spLocks noGrp="1"/>
+          </p:cNvSpPr>
+          <p:nvPr>
+            <p:ph type="title"/>
+          </p:nvPr>
+        </p:nvSpPr>
+        <p:spPr/>
+        <p:txBody>
+          <a:bodyPr>
+            <a:noAutofit/>
+          </a:bodyPr>
+          <a:lstStyle/>
+          <a:p>
+            <a:r>
+              <a:rPr lang="en-US" dirty="0"/>
+              <a:t>Security and Ajax</a:t>
+            </a:r>
+          </a:p>
+        </p:txBody>
+      </p:sp>
+      <p:sp>
+        <p:nvSpPr>
+          <p:cNvPr id="6" name="Content Placeholder 5"/>
+          <p:cNvSpPr>
+            <a:spLocks noGrp="1"/>
+          </p:cNvSpPr>
+          <p:nvPr>
+            <p:ph idx="1"/>
+          </p:nvPr>
+        </p:nvSpPr>
+        <p:spPr>
+          <a:xfrm>
+            <a:off x="685800" y="1219200"/>
+            <a:ext cx="7772400" cy="4953000"/>
+          </a:xfrm>
+        </p:spPr>
+        <p:txBody>
+          <a:bodyPr>
+            <a:normAutofit/>
+          </a:bodyPr>
+          <a:lstStyle/>
+          <a:p>
+            <a:r>
+              <a:rPr lang="en-US" b="1" i="1" dirty="0">
+                <a:solidFill>
+                  <a:srgbClr val="FF0000"/>
+                </a:solidFill>
+              </a:rPr>
+              <a:t>Cross-site scripting </a:t>
+            </a:r>
+            <a:r>
+              <a:rPr lang="en-US" dirty="0"/>
+              <a:t>means servers providing JavaScript code as an Ajax response</a:t>
+            </a:r>
+          </a:p>
+          <a:p>
+            <a:pPr marL="342900" indent="-342900">
+              <a:buFont typeface="Arial" panose="020B0604020202020204" pitchFamily="34" charset="0"/>
+              <a:buChar char="•"/>
+            </a:pPr>
+            <a:r>
+              <a:rPr lang="en-US" dirty="0"/>
+              <a:t>Such code could be modified by an intruder before it is run on the client </a:t>
+            </a:r>
+          </a:p>
+          <a:p>
+            <a:pPr marL="342900" indent="-342900">
+              <a:buFont typeface="Arial" panose="020B0604020202020204" pitchFamily="34" charset="0"/>
+              <a:buChar char="•"/>
+            </a:pPr>
+            <a:r>
+              <a:rPr lang="en-US" dirty="0"/>
+              <a:t>All such code must be scanned before it is interpreted</a:t>
+            </a:r>
+          </a:p>
+          <a:p>
+            <a:endParaRPr lang="en-US" dirty="0"/>
+          </a:p>
+          <a:p>
+            <a:r>
+              <a:rPr lang="en-US" dirty="0"/>
+              <a:t>Intruder code could also come to the client from text boxes used to collect return data</a:t>
+            </a:r>
+          </a:p>
+          <a:p>
+            <a:pPr marL="342900" indent="-342900">
+              <a:buFont typeface="Arial" panose="020B0604020202020204" pitchFamily="34" charset="0"/>
+              <a:buChar char="•"/>
+            </a:pPr>
+            <a:r>
+              <a:rPr lang="en-US" dirty="0"/>
+              <a:t>It could include script tags with malicious code</a:t>
+            </a:r>
+          </a:p>
+          <a:p>
+            <a:endParaRPr lang="en-US" dirty="0"/>
+          </a:p>
+        </p:txBody>
+      </p:sp>
+      <p:sp>
+        <p:nvSpPr>
+          <p:cNvPr id="8" name="Slide Number Placeholder 7"/>
+          <p:cNvSpPr>
+            <a:spLocks noGrp="1"/>
+          </p:cNvSpPr>
+          <p:nvPr>
+            <p:ph type="sldNum" sz="quarter" idx="12"/>
+          </p:nvPr>
+        </p:nvSpPr>
+        <p:spPr/>
+        <p:txBody>
+          <a:bodyPr/>
+          <a:lstStyle/>
+          <a:p>
+            <a:fld id="{B68E68E5-E6FC-4206-8BED-C09E3F386DCD}" type="slidenum">
+              <a:rPr lang="en-US" smtClean="0"/>
+              <a:pPr/>
+              <a:t>40</a:t>
+            </a:fld>
+            <a:endParaRPr lang="en-US"/>
+          </a:p>
+        </p:txBody>
+      </p:sp>
+    </p:spTree>
+    <p:extLst>
+      <p:ext uri="{BB962C8B-B14F-4D97-AF65-F5344CB8AC3E}">
+        <p14:creationId xmlns:p14="http://schemas.microsoft.com/office/powerpoint/2010/main" val="1604505368"/>
+      </p:ext>
+    </p:extLst>
+  </p:cSld>
+  <p:clrMapOvr>
+    <a:masterClrMapping/>
+  </p:clrMapOvr>
+</p:sld>
+</file>
+
+<file path=ppt/slides/slide41.xml><?xml version="1.0" encoding="utf-8"?>
 <p:sld xmlns:a="http://schemas.openxmlformats.org/drawingml/2006/main" xmlns:r="http://schemas.openxmlformats.org/officeDocument/2006/relationships" xmlns:p="http://schemas.openxmlformats.org/presentationml/2006/main">
   <p:cSld>
     <p:spTree>

</xml_diff>

<commit_message>
Update documents in class.
</commit_message>
<xml_diff>
--- a/CPSC-24700/Presentations/ajax.pptx
+++ b/CPSC-24700/Presentations/ajax.pptx
@@ -3,53 +3,50 @@
 <p:presentation xmlns:a="http://schemas.openxmlformats.org/drawingml/2006/main" xmlns:r="http://schemas.openxmlformats.org/officeDocument/2006/relationships" xmlns:p="http://schemas.openxmlformats.org/presentationml/2006/main" saveSubsetFonts="1">
   <p:sldMasterIdLst>
     <p:sldMasterId id="2147483661" r:id="rId1"/>
-    <p:sldMasterId id="2147483675" r:id="rId2"/>
   </p:sldMasterIdLst>
   <p:notesMasterIdLst>
-    <p:notesMasterId r:id="rId44"/>
+    <p:notesMasterId r:id="rId41"/>
   </p:notesMasterIdLst>
   <p:sldIdLst>
-    <p:sldId id="256" r:id="rId3"/>
-    <p:sldId id="285" r:id="rId4"/>
-    <p:sldId id="284" r:id="rId5"/>
-    <p:sldId id="257" r:id="rId6"/>
-    <p:sldId id="258" r:id="rId7"/>
-    <p:sldId id="293" r:id="rId8"/>
-    <p:sldId id="259" r:id="rId9"/>
-    <p:sldId id="262" r:id="rId10"/>
-    <p:sldId id="263" r:id="rId11"/>
-    <p:sldId id="264" r:id="rId12"/>
-    <p:sldId id="294" r:id="rId13"/>
-    <p:sldId id="265" r:id="rId14"/>
-    <p:sldId id="266" r:id="rId15"/>
-    <p:sldId id="267" r:id="rId16"/>
-    <p:sldId id="268" r:id="rId17"/>
-    <p:sldId id="269" r:id="rId18"/>
-    <p:sldId id="270" r:id="rId19"/>
-    <p:sldId id="271" r:id="rId20"/>
-    <p:sldId id="295" r:id="rId21"/>
-    <p:sldId id="272" r:id="rId22"/>
-    <p:sldId id="273" r:id="rId23"/>
-    <p:sldId id="286" r:id="rId24"/>
-    <p:sldId id="274" r:id="rId25"/>
-    <p:sldId id="287" r:id="rId26"/>
-    <p:sldId id="296" r:id="rId27"/>
-    <p:sldId id="275" r:id="rId28"/>
-    <p:sldId id="276" r:id="rId29"/>
-    <p:sldId id="277" r:id="rId30"/>
-    <p:sldId id="288" r:id="rId31"/>
-    <p:sldId id="279" r:id="rId32"/>
-    <p:sldId id="289" r:id="rId33"/>
-    <p:sldId id="280" r:id="rId34"/>
-    <p:sldId id="290" r:id="rId35"/>
-    <p:sldId id="282" r:id="rId36"/>
-    <p:sldId id="301" r:id="rId37"/>
-    <p:sldId id="297" r:id="rId38"/>
-    <p:sldId id="283" r:id="rId39"/>
-    <p:sldId id="291" r:id="rId40"/>
-    <p:sldId id="292" r:id="rId41"/>
-    <p:sldId id="298" r:id="rId42"/>
-    <p:sldId id="302" r:id="rId43"/>
+    <p:sldId id="256" r:id="rId2"/>
+    <p:sldId id="285" r:id="rId3"/>
+    <p:sldId id="284" r:id="rId4"/>
+    <p:sldId id="257" r:id="rId5"/>
+    <p:sldId id="258" r:id="rId6"/>
+    <p:sldId id="293" r:id="rId7"/>
+    <p:sldId id="259" r:id="rId8"/>
+    <p:sldId id="262" r:id="rId9"/>
+    <p:sldId id="263" r:id="rId10"/>
+    <p:sldId id="264" r:id="rId11"/>
+    <p:sldId id="294" r:id="rId12"/>
+    <p:sldId id="265" r:id="rId13"/>
+    <p:sldId id="266" r:id="rId14"/>
+    <p:sldId id="267" r:id="rId15"/>
+    <p:sldId id="268" r:id="rId16"/>
+    <p:sldId id="269" r:id="rId17"/>
+    <p:sldId id="270" r:id="rId18"/>
+    <p:sldId id="271" r:id="rId19"/>
+    <p:sldId id="295" r:id="rId20"/>
+    <p:sldId id="272" r:id="rId21"/>
+    <p:sldId id="273" r:id="rId22"/>
+    <p:sldId id="286" r:id="rId23"/>
+    <p:sldId id="274" r:id="rId24"/>
+    <p:sldId id="287" r:id="rId25"/>
+    <p:sldId id="296" r:id="rId26"/>
+    <p:sldId id="275" r:id="rId27"/>
+    <p:sldId id="276" r:id="rId28"/>
+    <p:sldId id="277" r:id="rId29"/>
+    <p:sldId id="288" r:id="rId30"/>
+    <p:sldId id="279" r:id="rId31"/>
+    <p:sldId id="289" r:id="rId32"/>
+    <p:sldId id="280" r:id="rId33"/>
+    <p:sldId id="290" r:id="rId34"/>
+    <p:sldId id="282" r:id="rId35"/>
+    <p:sldId id="297" r:id="rId36"/>
+    <p:sldId id="283" r:id="rId37"/>
+    <p:sldId id="291" r:id="rId38"/>
+    <p:sldId id="292" r:id="rId39"/>
+    <p:sldId id="298" r:id="rId40"/>
   </p:sldIdLst>
   <p:sldSz cx="9144000" cy="6858000" type="screen4x3"/>
   <p:notesSz cx="6858000" cy="9144000"/>
@@ -253,7 +250,7 @@
           <a:p>
             <a:fld id="{82AC26F5-A2E7-4901-A403-BBD25C17198C}" type="datetimeFigureOut">
               <a:rPr lang="en-US" smtClean="0"/>
-              <a:t>11/2/2017</a:t>
+              <a:t>11/3/2017</a:t>
             </a:fld>
             <a:endParaRPr lang="en-US"/>
           </a:p>
@@ -781,294 +778,6 @@
 </p:notes>
 </file>
 
-<file path=ppt/notesSlides/notesSlide4.xml><?xml version="1.0" encoding="utf-8"?>
-<p:notes xmlns:a="http://schemas.openxmlformats.org/drawingml/2006/main" xmlns:r="http://schemas.openxmlformats.org/officeDocument/2006/relationships" xmlns:p="http://schemas.openxmlformats.org/presentationml/2006/main">
-  <p:cSld>
-    <p:spTree>
-      <p:nvGrpSpPr>
-        <p:cNvPr id="1" name=""/>
-        <p:cNvGrpSpPr/>
-        <p:nvPr/>
-      </p:nvGrpSpPr>
-      <p:grpSpPr>
-        <a:xfrm>
-          <a:off x="0" y="0"/>
-          <a:ext cx="0" cy="0"/>
-          <a:chOff x="0" y="0"/>
-          <a:chExt cx="0" cy="0"/>
-        </a:xfrm>
-      </p:grpSpPr>
-      <p:sp>
-        <p:nvSpPr>
-          <p:cNvPr id="2" name="Slide Image Placeholder 1"/>
-          <p:cNvSpPr>
-            <a:spLocks noGrp="1" noRot="1" noChangeAspect="1"/>
-          </p:cNvSpPr>
-          <p:nvPr>
-            <p:ph type="sldImg"/>
-          </p:nvPr>
-        </p:nvSpPr>
-        <p:spPr/>
-      </p:sp>
-      <p:sp>
-        <p:nvSpPr>
-          <p:cNvPr id="3" name="Notes Placeholder 2"/>
-          <p:cNvSpPr>
-            <a:spLocks noGrp="1"/>
-          </p:cNvSpPr>
-          <p:nvPr>
-            <p:ph type="body" idx="1"/>
-          </p:nvPr>
-        </p:nvSpPr>
-        <p:spPr/>
-        <p:txBody>
-          <a:bodyPr/>
-          <a:lstStyle/>
-          <a:p>
-            <a:endParaRPr lang="en-US" dirty="0"/>
-          </a:p>
-        </p:txBody>
-      </p:sp>
-      <p:sp>
-        <p:nvSpPr>
-          <p:cNvPr id="4" name="Slide Number Placeholder 3"/>
-          <p:cNvSpPr>
-            <a:spLocks noGrp="1"/>
-          </p:cNvSpPr>
-          <p:nvPr>
-            <p:ph type="sldNum" sz="quarter" idx="10"/>
-          </p:nvPr>
-        </p:nvSpPr>
-        <p:spPr/>
-        <p:txBody>
-          <a:bodyPr/>
-          <a:lstStyle/>
-          <a:p>
-            <a:pPr marL="0" marR="0" lvl="0" indent="0" algn="r" defTabSz="914400" rtl="0" eaLnBrk="1" fontAlgn="auto" latinLnBrk="0" hangingPunct="1">
-              <a:lnSpc>
-                <a:spcPct val="100000"/>
-              </a:lnSpc>
-              <a:spcBef>
-                <a:spcPts val="0"/>
-              </a:spcBef>
-              <a:spcAft>
-                <a:spcPts val="0"/>
-              </a:spcAft>
-              <a:buClrTx/>
-              <a:buSzTx/>
-              <a:buFontTx/>
-              <a:buNone/>
-              <a:tabLst/>
-              <a:defRPr/>
-            </a:pPr>
-            <a:fld id="{5394DE12-7B9B-46AA-AC19-C30A49928B9B}" type="slidenum">
-              <a:rPr kumimoji="0" lang="en-US" sz="1200" b="0" i="0" u="none" strike="noStrike" kern="1200" cap="none" spc="0" normalizeH="0" baseline="0" noProof="0" smtClean="0">
-                <a:ln>
-                  <a:noFill/>
-                </a:ln>
-                <a:solidFill>
-                  <a:prstClr val="black"/>
-                </a:solidFill>
-                <a:effectLst/>
-                <a:uLnTx/>
-                <a:uFillTx/>
-                <a:latin typeface="Calibri" panose="020F0502020204030204"/>
-                <a:ea typeface="+mn-ea"/>
-                <a:cs typeface="+mn-cs"/>
-              </a:rPr>
-              <a:pPr marL="0" marR="0" lvl="0" indent="0" algn="r" defTabSz="914400" rtl="0" eaLnBrk="1" fontAlgn="auto" latinLnBrk="0" hangingPunct="1">
-                <a:lnSpc>
-                  <a:spcPct val="100000"/>
-                </a:lnSpc>
-                <a:spcBef>
-                  <a:spcPts val="0"/>
-                </a:spcBef>
-                <a:spcAft>
-                  <a:spcPts val="0"/>
-                </a:spcAft>
-                <a:buClrTx/>
-                <a:buSzTx/>
-                <a:buFontTx/>
-                <a:buNone/>
-                <a:tabLst/>
-                <a:defRPr/>
-              </a:pPr>
-              <a:t>35</a:t>
-            </a:fld>
-            <a:endParaRPr kumimoji="0" lang="en-US" sz="1200" b="0" i="0" u="none" strike="noStrike" kern="1200" cap="none" spc="0" normalizeH="0" baseline="0" noProof="0" dirty="0">
-              <a:ln>
-                <a:noFill/>
-              </a:ln>
-              <a:solidFill>
-                <a:prstClr val="black"/>
-              </a:solidFill>
-              <a:effectLst/>
-              <a:uLnTx/>
-              <a:uFillTx/>
-              <a:latin typeface="Calibri" panose="020F0502020204030204"/>
-              <a:ea typeface="+mn-ea"/>
-              <a:cs typeface="+mn-cs"/>
-            </a:endParaRPr>
-          </a:p>
-        </p:txBody>
-      </p:sp>
-    </p:spTree>
-    <p:extLst>
-      <p:ext uri="{BB962C8B-B14F-4D97-AF65-F5344CB8AC3E}">
-        <p14:creationId xmlns:p14="http://schemas.microsoft.com/office/powerpoint/2010/main" val="2578016379"/>
-      </p:ext>
-    </p:extLst>
-  </p:cSld>
-  <p:clrMapOvr>
-    <a:masterClrMapping/>
-  </p:clrMapOvr>
-</p:notes>
-</file>
-
-<file path=ppt/notesSlides/notesSlide5.xml><?xml version="1.0" encoding="utf-8"?>
-<p:notes xmlns:a="http://schemas.openxmlformats.org/drawingml/2006/main" xmlns:r="http://schemas.openxmlformats.org/officeDocument/2006/relationships" xmlns:p="http://schemas.openxmlformats.org/presentationml/2006/main">
-  <p:cSld>
-    <p:spTree>
-      <p:nvGrpSpPr>
-        <p:cNvPr id="1" name=""/>
-        <p:cNvGrpSpPr/>
-        <p:nvPr/>
-      </p:nvGrpSpPr>
-      <p:grpSpPr>
-        <a:xfrm>
-          <a:off x="0" y="0"/>
-          <a:ext cx="0" cy="0"/>
-          <a:chOff x="0" y="0"/>
-          <a:chExt cx="0" cy="0"/>
-        </a:xfrm>
-      </p:grpSpPr>
-      <p:sp>
-        <p:nvSpPr>
-          <p:cNvPr id="2" name="Slide Image Placeholder 1"/>
-          <p:cNvSpPr>
-            <a:spLocks noGrp="1" noRot="1" noChangeAspect="1"/>
-          </p:cNvSpPr>
-          <p:nvPr>
-            <p:ph type="sldImg"/>
-          </p:nvPr>
-        </p:nvSpPr>
-        <p:spPr/>
-      </p:sp>
-      <p:sp>
-        <p:nvSpPr>
-          <p:cNvPr id="3" name="Notes Placeholder 2"/>
-          <p:cNvSpPr>
-            <a:spLocks noGrp="1"/>
-          </p:cNvSpPr>
-          <p:nvPr>
-            <p:ph type="body" idx="1"/>
-          </p:nvPr>
-        </p:nvSpPr>
-        <p:spPr/>
-        <p:txBody>
-          <a:bodyPr/>
-          <a:lstStyle/>
-          <a:p>
-            <a:endParaRPr lang="en-US" dirty="0"/>
-          </a:p>
-        </p:txBody>
-      </p:sp>
-      <p:sp>
-        <p:nvSpPr>
-          <p:cNvPr id="4" name="Slide Number Placeholder 3"/>
-          <p:cNvSpPr>
-            <a:spLocks noGrp="1"/>
-          </p:cNvSpPr>
-          <p:nvPr>
-            <p:ph type="sldNum" sz="quarter" idx="10"/>
-          </p:nvPr>
-        </p:nvSpPr>
-        <p:spPr/>
-        <p:txBody>
-          <a:bodyPr/>
-          <a:lstStyle/>
-          <a:p>
-            <a:pPr marL="0" marR="0" lvl="0" indent="0" algn="r" defTabSz="914400" rtl="0" eaLnBrk="1" fontAlgn="auto" latinLnBrk="0" hangingPunct="1">
-              <a:lnSpc>
-                <a:spcPct val="100000"/>
-              </a:lnSpc>
-              <a:spcBef>
-                <a:spcPts val="0"/>
-              </a:spcBef>
-              <a:spcAft>
-                <a:spcPts val="0"/>
-              </a:spcAft>
-              <a:buClrTx/>
-              <a:buSzTx/>
-              <a:buFontTx/>
-              <a:buNone/>
-              <a:tabLst/>
-              <a:defRPr/>
-            </a:pPr>
-            <a:fld id="{5394DE12-7B9B-46AA-AC19-C30A49928B9B}" type="slidenum">
-              <a:rPr kumimoji="0" lang="en-US" sz="1200" b="0" i="0" u="none" strike="noStrike" kern="1200" cap="none" spc="0" normalizeH="0" baseline="0" noProof="0" smtClean="0">
-                <a:ln>
-                  <a:noFill/>
-                </a:ln>
-                <a:solidFill>
-                  <a:prstClr val="black"/>
-                </a:solidFill>
-                <a:effectLst/>
-                <a:uLnTx/>
-                <a:uFillTx/>
-                <a:latin typeface="Calibri" panose="020F0502020204030204"/>
-                <a:ea typeface="+mn-ea"/>
-                <a:cs typeface="+mn-cs"/>
-              </a:rPr>
-              <a:pPr marL="0" marR="0" lvl="0" indent="0" algn="r" defTabSz="914400" rtl="0" eaLnBrk="1" fontAlgn="auto" latinLnBrk="0" hangingPunct="1">
-                <a:lnSpc>
-                  <a:spcPct val="100000"/>
-                </a:lnSpc>
-                <a:spcBef>
-                  <a:spcPts val="0"/>
-                </a:spcBef>
-                <a:spcAft>
-                  <a:spcPts val="0"/>
-                </a:spcAft>
-                <a:buClrTx/>
-                <a:buSzTx/>
-                <a:buFontTx/>
-                <a:buNone/>
-                <a:tabLst/>
-                <a:defRPr/>
-              </a:pPr>
-              <a:t>41</a:t>
-            </a:fld>
-            <a:endParaRPr kumimoji="0" lang="en-US" sz="1200" b="0" i="0" u="none" strike="noStrike" kern="1200" cap="none" spc="0" normalizeH="0" baseline="0" noProof="0" dirty="0">
-              <a:ln>
-                <a:noFill/>
-              </a:ln>
-              <a:solidFill>
-                <a:prstClr val="black"/>
-              </a:solidFill>
-              <a:effectLst/>
-              <a:uLnTx/>
-              <a:uFillTx/>
-              <a:latin typeface="Calibri" panose="020F0502020204030204"/>
-              <a:ea typeface="+mn-ea"/>
-              <a:cs typeface="+mn-cs"/>
-            </a:endParaRPr>
-          </a:p>
-        </p:txBody>
-      </p:sp>
-    </p:spTree>
-    <p:extLst>
-      <p:ext uri="{BB962C8B-B14F-4D97-AF65-F5344CB8AC3E}">
-        <p14:creationId xmlns:p14="http://schemas.microsoft.com/office/powerpoint/2010/main" val="4140901756"/>
-      </p:ext>
-    </p:extLst>
-  </p:cSld>
-  <p:clrMapOvr>
-    <a:masterClrMapping/>
-  </p:clrMapOvr>
-</p:notes>
-</file>
-
 <file path=ppt/slideLayouts/slideLayout1.xml><?xml version="1.0" encoding="utf-8"?>
 <p:sldLayout xmlns:a="http://schemas.openxmlformats.org/drawingml/2006/main" xmlns:r="http://schemas.openxmlformats.org/officeDocument/2006/relationships" xmlns:p="http://schemas.openxmlformats.org/presentationml/2006/main" type="title" preserve="1">
   <p:cSld name="Title Slide">
@@ -1227,7 +936,7 @@
           <a:p>
             <a:fld id="{FB7712AD-3B21-4FE9-B722-CF9B0200D9B9}" type="datetimeFigureOut">
               <a:rPr lang="en-US" smtClean="0"/>
-              <a:t>11/2/2017</a:t>
+              <a:t>11/3/2017</a:t>
             </a:fld>
             <a:endParaRPr lang="en-US"/>
           </a:p>
@@ -1494,7 +1203,7 @@
           <a:p>
             <a:fld id="{FB7712AD-3B21-4FE9-B722-CF9B0200D9B9}" type="datetimeFigureOut">
               <a:rPr lang="en-US" smtClean="0"/>
-              <a:t>11/2/2017</a:t>
+              <a:t>11/3/2017</a:t>
             </a:fld>
             <a:endParaRPr lang="en-US"/>
           </a:p>
@@ -1674,7 +1383,7 @@
           <a:p>
             <a:fld id="{FB7712AD-3B21-4FE9-B722-CF9B0200D9B9}" type="datetimeFigureOut">
               <a:rPr lang="en-US" smtClean="0"/>
-              <a:t>11/2/2017</a:t>
+              <a:t>11/3/2017</a:t>
             </a:fld>
             <a:endParaRPr lang="en-US"/>
           </a:p>
@@ -1864,7 +1573,7 @@
           <a:p>
             <a:fld id="{FB7712AD-3B21-4FE9-B722-CF9B0200D9B9}" type="datetimeFigureOut">
               <a:rPr lang="en-US" smtClean="0"/>
-              <a:t>11/2/2017</a:t>
+              <a:t>11/3/2017</a:t>
             </a:fld>
             <a:endParaRPr lang="en-US"/>
           </a:p>
@@ -2040,7 +1749,7 @@
           <a:p>
             <a:fld id="{45970EBF-F3D2-4BBA-9F57-483185C1C2DB}" type="datetime1">
               <a:rPr lang="en-US" smtClean="0"/>
-              <a:t>11/2/2017</a:t>
+              <a:t>11/3/2017</a:t>
             </a:fld>
             <a:endParaRPr lang="en-US"/>
           </a:p>
@@ -2093,1517 +1802,6 @@
     <p:extLst>
       <p:ext uri="{BB962C8B-B14F-4D97-AF65-F5344CB8AC3E}">
         <p14:creationId xmlns:p14="http://schemas.microsoft.com/office/powerpoint/2010/main" val="2189269403"/>
-      </p:ext>
-    </p:extLst>
-  </p:cSld>
-  <p:clrMapOvr>
-    <a:masterClrMapping/>
-  </p:clrMapOvr>
-</p:sldLayout>
-</file>
-
-<file path=ppt/slideLayouts/slideLayout14.xml><?xml version="1.0" encoding="utf-8"?>
-<p:sldLayout xmlns:a="http://schemas.openxmlformats.org/drawingml/2006/main" xmlns:r="http://schemas.openxmlformats.org/officeDocument/2006/relationships" xmlns:p="http://schemas.openxmlformats.org/presentationml/2006/main" type="title" preserve="1">
-  <p:cSld name="Title Slide">
-    <p:spTree>
-      <p:nvGrpSpPr>
-        <p:cNvPr id="1" name=""/>
-        <p:cNvGrpSpPr/>
-        <p:nvPr/>
-      </p:nvGrpSpPr>
-      <p:grpSpPr>
-        <a:xfrm>
-          <a:off x="0" y="0"/>
-          <a:ext cx="0" cy="0"/>
-          <a:chOff x="0" y="0"/>
-          <a:chExt cx="0" cy="0"/>
-        </a:xfrm>
-      </p:grpSpPr>
-      <p:sp>
-        <p:nvSpPr>
-          <p:cNvPr id="2" name="Title 1">
-            <a:extLst>
-              <a:ext uri="{FF2B5EF4-FFF2-40B4-BE49-F238E27FC236}">
-                <a16:creationId xmlns:a16="http://schemas.microsoft.com/office/drawing/2014/main" id="{05A3C455-831E-4420-AAF5-7B5275339AF7}"/>
-              </a:ext>
-            </a:extLst>
-          </p:cNvPr>
-          <p:cNvSpPr>
-            <a:spLocks noGrp="1"/>
-          </p:cNvSpPr>
-          <p:nvPr>
-            <p:ph type="ctrTitle"/>
-          </p:nvPr>
-        </p:nvSpPr>
-        <p:spPr>
-          <a:xfrm>
-            <a:off x="1143000" y="1122363"/>
-            <a:ext cx="6858000" cy="2387600"/>
-          </a:xfrm>
-        </p:spPr>
-        <p:txBody>
-          <a:bodyPr anchor="b"/>
-          <a:lstStyle>
-            <a:lvl1pPr algn="ctr">
-              <a:defRPr sz="4500"/>
-            </a:lvl1pPr>
-          </a:lstStyle>
-          <a:p>
-            <a:r>
-              <a:rPr lang="en-US"/>
-              <a:t>Click to edit Master title style</a:t>
-            </a:r>
-          </a:p>
-        </p:txBody>
-      </p:sp>
-      <p:sp>
-        <p:nvSpPr>
-          <p:cNvPr id="3" name="Subtitle 2">
-            <a:extLst>
-              <a:ext uri="{FF2B5EF4-FFF2-40B4-BE49-F238E27FC236}">
-                <a16:creationId xmlns:a16="http://schemas.microsoft.com/office/drawing/2014/main" id="{7771B8BA-2662-420C-93D2-B4A75BECADDF}"/>
-              </a:ext>
-            </a:extLst>
-          </p:cNvPr>
-          <p:cNvSpPr>
-            <a:spLocks noGrp="1"/>
-          </p:cNvSpPr>
-          <p:nvPr>
-            <p:ph type="subTitle" idx="1"/>
-          </p:nvPr>
-        </p:nvSpPr>
-        <p:spPr>
-          <a:xfrm>
-            <a:off x="1143000" y="3602038"/>
-            <a:ext cx="6858000" cy="1655762"/>
-          </a:xfrm>
-        </p:spPr>
-        <p:txBody>
-          <a:bodyPr/>
-          <a:lstStyle>
-            <a:lvl1pPr marL="0" indent="0" algn="ctr">
-              <a:buNone/>
-              <a:defRPr sz="1800"/>
-            </a:lvl1pPr>
-            <a:lvl2pPr marL="342900" indent="0" algn="ctr">
-              <a:buNone/>
-              <a:defRPr sz="1500"/>
-            </a:lvl2pPr>
-            <a:lvl3pPr marL="685800" indent="0" algn="ctr">
-              <a:buNone/>
-              <a:defRPr sz="1350"/>
-            </a:lvl3pPr>
-            <a:lvl4pPr marL="1028700" indent="0" algn="ctr">
-              <a:buNone/>
-              <a:defRPr sz="1200"/>
-            </a:lvl4pPr>
-            <a:lvl5pPr marL="1371600" indent="0" algn="ctr">
-              <a:buNone/>
-              <a:defRPr sz="1200"/>
-            </a:lvl5pPr>
-            <a:lvl6pPr marL="1714500" indent="0" algn="ctr">
-              <a:buNone/>
-              <a:defRPr sz="1200"/>
-            </a:lvl6pPr>
-            <a:lvl7pPr marL="2057400" indent="0" algn="ctr">
-              <a:buNone/>
-              <a:defRPr sz="1200"/>
-            </a:lvl7pPr>
-            <a:lvl8pPr marL="2400300" indent="0" algn="ctr">
-              <a:buNone/>
-              <a:defRPr sz="1200"/>
-            </a:lvl8pPr>
-            <a:lvl9pPr marL="2743200" indent="0" algn="ctr">
-              <a:buNone/>
-              <a:defRPr sz="1200"/>
-            </a:lvl9pPr>
-          </a:lstStyle>
-          <a:p>
-            <a:r>
-              <a:rPr lang="en-US"/>
-              <a:t>Click to edit Master subtitle style</a:t>
-            </a:r>
-          </a:p>
-        </p:txBody>
-      </p:sp>
-      <p:sp>
-        <p:nvSpPr>
-          <p:cNvPr id="4" name="Date Placeholder 3">
-            <a:extLst>
-              <a:ext uri="{FF2B5EF4-FFF2-40B4-BE49-F238E27FC236}">
-                <a16:creationId xmlns:a16="http://schemas.microsoft.com/office/drawing/2014/main" id="{C4C8C490-A978-448B-B63A-95C0EDBDCDA8}"/>
-              </a:ext>
-            </a:extLst>
-          </p:cNvPr>
-          <p:cNvSpPr>
-            <a:spLocks noGrp="1"/>
-          </p:cNvSpPr>
-          <p:nvPr>
-            <p:ph type="dt" sz="half" idx="10"/>
-          </p:nvPr>
-        </p:nvSpPr>
-        <p:spPr/>
-        <p:txBody>
-          <a:bodyPr/>
-          <a:lstStyle/>
-          <a:p>
-            <a:fld id="{5FB62F81-FD80-4AA8-93CA-E835B40BE667}" type="datetimeFigureOut">
-              <a:rPr lang="en-US" smtClean="0"/>
-              <a:t>11/2/2017</a:t>
-            </a:fld>
-            <a:endParaRPr lang="en-US"/>
-          </a:p>
-        </p:txBody>
-      </p:sp>
-      <p:sp>
-        <p:nvSpPr>
-          <p:cNvPr id="5" name="Footer Placeholder 4">
-            <a:extLst>
-              <a:ext uri="{FF2B5EF4-FFF2-40B4-BE49-F238E27FC236}">
-                <a16:creationId xmlns:a16="http://schemas.microsoft.com/office/drawing/2014/main" id="{44F91E26-7A64-4211-A939-3860EB431078}"/>
-              </a:ext>
-            </a:extLst>
-          </p:cNvPr>
-          <p:cNvSpPr>
-            <a:spLocks noGrp="1"/>
-          </p:cNvSpPr>
-          <p:nvPr>
-            <p:ph type="ftr" sz="quarter" idx="11"/>
-          </p:nvPr>
-        </p:nvSpPr>
-        <p:spPr/>
-        <p:txBody>
-          <a:bodyPr/>
-          <a:lstStyle/>
-          <a:p>
-            <a:endParaRPr lang="en-US"/>
-          </a:p>
-        </p:txBody>
-      </p:sp>
-      <p:sp>
-        <p:nvSpPr>
-          <p:cNvPr id="6" name="Slide Number Placeholder 5">
-            <a:extLst>
-              <a:ext uri="{FF2B5EF4-FFF2-40B4-BE49-F238E27FC236}">
-                <a16:creationId xmlns:a16="http://schemas.microsoft.com/office/drawing/2014/main" id="{92D5C404-7D71-40A3-B09F-2957ADFC94AE}"/>
-              </a:ext>
-            </a:extLst>
-          </p:cNvPr>
-          <p:cNvSpPr>
-            <a:spLocks noGrp="1"/>
-          </p:cNvSpPr>
-          <p:nvPr>
-            <p:ph type="sldNum" sz="quarter" idx="12"/>
-          </p:nvPr>
-        </p:nvSpPr>
-        <p:spPr/>
-        <p:txBody>
-          <a:bodyPr/>
-          <a:lstStyle/>
-          <a:p>
-            <a:fld id="{6427441B-EBD2-447D-AE1D-AD6F97A1CA52}" type="slidenum">
-              <a:rPr lang="en-US" smtClean="0"/>
-              <a:t>‹#›</a:t>
-            </a:fld>
-            <a:endParaRPr lang="en-US"/>
-          </a:p>
-        </p:txBody>
-      </p:sp>
-    </p:spTree>
-    <p:extLst>
-      <p:ext uri="{BB962C8B-B14F-4D97-AF65-F5344CB8AC3E}">
-        <p14:creationId xmlns:p14="http://schemas.microsoft.com/office/powerpoint/2010/main" val="827892586"/>
-      </p:ext>
-    </p:extLst>
-  </p:cSld>
-  <p:clrMapOvr>
-    <a:masterClrMapping/>
-  </p:clrMapOvr>
-</p:sldLayout>
-</file>
-
-<file path=ppt/slideLayouts/slideLayout15.xml><?xml version="1.0" encoding="utf-8"?>
-<p:sldLayout xmlns:a="http://schemas.openxmlformats.org/drawingml/2006/main" xmlns:r="http://schemas.openxmlformats.org/officeDocument/2006/relationships" xmlns:p="http://schemas.openxmlformats.org/presentationml/2006/main" type="obj" preserve="1">
-  <p:cSld name="Title and Content">
-    <p:spTree>
-      <p:nvGrpSpPr>
-        <p:cNvPr id="1" name=""/>
-        <p:cNvGrpSpPr/>
-        <p:nvPr/>
-      </p:nvGrpSpPr>
-      <p:grpSpPr>
-        <a:xfrm>
-          <a:off x="0" y="0"/>
-          <a:ext cx="0" cy="0"/>
-          <a:chOff x="0" y="0"/>
-          <a:chExt cx="0" cy="0"/>
-        </a:xfrm>
-      </p:grpSpPr>
-      <p:sp>
-        <p:nvSpPr>
-          <p:cNvPr id="2" name="Title 1">
-            <a:extLst>
-              <a:ext uri="{FF2B5EF4-FFF2-40B4-BE49-F238E27FC236}">
-                <a16:creationId xmlns:a16="http://schemas.microsoft.com/office/drawing/2014/main" id="{4EC65339-DC3D-4046-9ADE-47545BF138CC}"/>
-              </a:ext>
-            </a:extLst>
-          </p:cNvPr>
-          <p:cNvSpPr>
-            <a:spLocks noGrp="1"/>
-          </p:cNvSpPr>
-          <p:nvPr>
-            <p:ph type="title"/>
-          </p:nvPr>
-        </p:nvSpPr>
-        <p:spPr/>
-        <p:txBody>
-          <a:bodyPr/>
-          <a:lstStyle/>
-          <a:p>
-            <a:r>
-              <a:rPr lang="en-US"/>
-              <a:t>Click to edit Master title style</a:t>
-            </a:r>
-          </a:p>
-        </p:txBody>
-      </p:sp>
-      <p:sp>
-        <p:nvSpPr>
-          <p:cNvPr id="3" name="Content Placeholder 2">
-            <a:extLst>
-              <a:ext uri="{FF2B5EF4-FFF2-40B4-BE49-F238E27FC236}">
-                <a16:creationId xmlns:a16="http://schemas.microsoft.com/office/drawing/2014/main" id="{0718011A-7CE3-4B35-B259-549F255DA6D8}"/>
-              </a:ext>
-            </a:extLst>
-          </p:cNvPr>
-          <p:cNvSpPr>
-            <a:spLocks noGrp="1"/>
-          </p:cNvSpPr>
-          <p:nvPr>
-            <p:ph idx="1"/>
-          </p:nvPr>
-        </p:nvSpPr>
-        <p:spPr/>
-        <p:txBody>
-          <a:bodyPr/>
-          <a:lstStyle/>
-          <a:p>
-            <a:pPr lvl="0"/>
-            <a:r>
-              <a:rPr lang="en-US"/>
-              <a:t>Edit Master text styles</a:t>
-            </a:r>
-          </a:p>
-          <a:p>
-            <a:pPr lvl="1"/>
-            <a:r>
-              <a:rPr lang="en-US"/>
-              <a:t>Second level</a:t>
-            </a:r>
-          </a:p>
-          <a:p>
-            <a:pPr lvl="2"/>
-            <a:r>
-              <a:rPr lang="en-US"/>
-              <a:t>Third level</a:t>
-            </a:r>
-          </a:p>
-          <a:p>
-            <a:pPr lvl="3"/>
-            <a:r>
-              <a:rPr lang="en-US"/>
-              <a:t>Fourth level</a:t>
-            </a:r>
-          </a:p>
-          <a:p>
-            <a:pPr lvl="4"/>
-            <a:r>
-              <a:rPr lang="en-US"/>
-              <a:t>Fifth level</a:t>
-            </a:r>
-          </a:p>
-        </p:txBody>
-      </p:sp>
-      <p:sp>
-        <p:nvSpPr>
-          <p:cNvPr id="4" name="Date Placeholder 3">
-            <a:extLst>
-              <a:ext uri="{FF2B5EF4-FFF2-40B4-BE49-F238E27FC236}">
-                <a16:creationId xmlns:a16="http://schemas.microsoft.com/office/drawing/2014/main" id="{E02FC54B-4989-40E0-8190-0064B1BC3271}"/>
-              </a:ext>
-            </a:extLst>
-          </p:cNvPr>
-          <p:cNvSpPr>
-            <a:spLocks noGrp="1"/>
-          </p:cNvSpPr>
-          <p:nvPr>
-            <p:ph type="dt" sz="half" idx="10"/>
-          </p:nvPr>
-        </p:nvSpPr>
-        <p:spPr/>
-        <p:txBody>
-          <a:bodyPr/>
-          <a:lstStyle/>
-          <a:p>
-            <a:fld id="{5FB62F81-FD80-4AA8-93CA-E835B40BE667}" type="datetimeFigureOut">
-              <a:rPr lang="en-US" smtClean="0"/>
-              <a:t>11/2/2017</a:t>
-            </a:fld>
-            <a:endParaRPr lang="en-US"/>
-          </a:p>
-        </p:txBody>
-      </p:sp>
-      <p:sp>
-        <p:nvSpPr>
-          <p:cNvPr id="5" name="Footer Placeholder 4">
-            <a:extLst>
-              <a:ext uri="{FF2B5EF4-FFF2-40B4-BE49-F238E27FC236}">
-                <a16:creationId xmlns:a16="http://schemas.microsoft.com/office/drawing/2014/main" id="{269D177F-3853-4918-9396-8DB6C6AF0D01}"/>
-              </a:ext>
-            </a:extLst>
-          </p:cNvPr>
-          <p:cNvSpPr>
-            <a:spLocks noGrp="1"/>
-          </p:cNvSpPr>
-          <p:nvPr>
-            <p:ph type="ftr" sz="quarter" idx="11"/>
-          </p:nvPr>
-        </p:nvSpPr>
-        <p:spPr/>
-        <p:txBody>
-          <a:bodyPr/>
-          <a:lstStyle/>
-          <a:p>
-            <a:endParaRPr lang="en-US"/>
-          </a:p>
-        </p:txBody>
-      </p:sp>
-      <p:sp>
-        <p:nvSpPr>
-          <p:cNvPr id="6" name="Slide Number Placeholder 5">
-            <a:extLst>
-              <a:ext uri="{FF2B5EF4-FFF2-40B4-BE49-F238E27FC236}">
-                <a16:creationId xmlns:a16="http://schemas.microsoft.com/office/drawing/2014/main" id="{50E018FD-DCA7-4785-B30E-816703C003F0}"/>
-              </a:ext>
-            </a:extLst>
-          </p:cNvPr>
-          <p:cNvSpPr>
-            <a:spLocks noGrp="1"/>
-          </p:cNvSpPr>
-          <p:nvPr>
-            <p:ph type="sldNum" sz="quarter" idx="12"/>
-          </p:nvPr>
-        </p:nvSpPr>
-        <p:spPr/>
-        <p:txBody>
-          <a:bodyPr/>
-          <a:lstStyle/>
-          <a:p>
-            <a:fld id="{6427441B-EBD2-447D-AE1D-AD6F97A1CA52}" type="slidenum">
-              <a:rPr lang="en-US" smtClean="0"/>
-              <a:t>‹#›</a:t>
-            </a:fld>
-            <a:endParaRPr lang="en-US"/>
-          </a:p>
-        </p:txBody>
-      </p:sp>
-    </p:spTree>
-    <p:extLst>
-      <p:ext uri="{BB962C8B-B14F-4D97-AF65-F5344CB8AC3E}">
-        <p14:creationId xmlns:p14="http://schemas.microsoft.com/office/powerpoint/2010/main" val="2115293805"/>
-      </p:ext>
-    </p:extLst>
-  </p:cSld>
-  <p:clrMapOvr>
-    <a:masterClrMapping/>
-  </p:clrMapOvr>
-</p:sldLayout>
-</file>
-
-<file path=ppt/slideLayouts/slideLayout16.xml><?xml version="1.0" encoding="utf-8"?>
-<p:sldLayout xmlns:a="http://schemas.openxmlformats.org/drawingml/2006/main" xmlns:r="http://schemas.openxmlformats.org/officeDocument/2006/relationships" xmlns:p="http://schemas.openxmlformats.org/presentationml/2006/main" type="secHead" preserve="1">
-  <p:cSld name="Section Header">
-    <p:spTree>
-      <p:nvGrpSpPr>
-        <p:cNvPr id="1" name=""/>
-        <p:cNvGrpSpPr/>
-        <p:nvPr/>
-      </p:nvGrpSpPr>
-      <p:grpSpPr>
-        <a:xfrm>
-          <a:off x="0" y="0"/>
-          <a:ext cx="0" cy="0"/>
-          <a:chOff x="0" y="0"/>
-          <a:chExt cx="0" cy="0"/>
-        </a:xfrm>
-      </p:grpSpPr>
-      <p:sp>
-        <p:nvSpPr>
-          <p:cNvPr id="2" name="Title 1">
-            <a:extLst>
-              <a:ext uri="{FF2B5EF4-FFF2-40B4-BE49-F238E27FC236}">
-                <a16:creationId xmlns:a16="http://schemas.microsoft.com/office/drawing/2014/main" id="{9186C051-F98C-4AF9-8AEF-875A24CB5A42}"/>
-              </a:ext>
-            </a:extLst>
-          </p:cNvPr>
-          <p:cNvSpPr>
-            <a:spLocks noGrp="1"/>
-          </p:cNvSpPr>
-          <p:nvPr>
-            <p:ph type="title"/>
-          </p:nvPr>
-        </p:nvSpPr>
-        <p:spPr>
-          <a:xfrm>
-            <a:off x="623888" y="1709739"/>
-            <a:ext cx="7886700" cy="2852737"/>
-          </a:xfrm>
-        </p:spPr>
-        <p:txBody>
-          <a:bodyPr anchor="b"/>
-          <a:lstStyle>
-            <a:lvl1pPr>
-              <a:defRPr sz="4500"/>
-            </a:lvl1pPr>
-          </a:lstStyle>
-          <a:p>
-            <a:r>
-              <a:rPr lang="en-US"/>
-              <a:t>Click to edit Master title style</a:t>
-            </a:r>
-          </a:p>
-        </p:txBody>
-      </p:sp>
-      <p:sp>
-        <p:nvSpPr>
-          <p:cNvPr id="3" name="Text Placeholder 2">
-            <a:extLst>
-              <a:ext uri="{FF2B5EF4-FFF2-40B4-BE49-F238E27FC236}">
-                <a16:creationId xmlns:a16="http://schemas.microsoft.com/office/drawing/2014/main" id="{EF1CD024-06EC-4A93-8CC6-216C90D0E053}"/>
-              </a:ext>
-            </a:extLst>
-          </p:cNvPr>
-          <p:cNvSpPr>
-            <a:spLocks noGrp="1"/>
-          </p:cNvSpPr>
-          <p:nvPr>
-            <p:ph type="body" idx="1"/>
-          </p:nvPr>
-        </p:nvSpPr>
-        <p:spPr>
-          <a:xfrm>
-            <a:off x="623888" y="4589464"/>
-            <a:ext cx="7886700" cy="1500187"/>
-          </a:xfrm>
-        </p:spPr>
-        <p:txBody>
-          <a:bodyPr/>
-          <a:lstStyle>
-            <a:lvl1pPr marL="0" indent="0">
-              <a:buNone/>
-              <a:defRPr sz="1800">
-                <a:solidFill>
-                  <a:schemeClr val="tx1">
-                    <a:tint val="75000"/>
-                  </a:schemeClr>
-                </a:solidFill>
-              </a:defRPr>
-            </a:lvl1pPr>
-            <a:lvl2pPr marL="342900" indent="0">
-              <a:buNone/>
-              <a:defRPr sz="1500">
-                <a:solidFill>
-                  <a:schemeClr val="tx1">
-                    <a:tint val="75000"/>
-                  </a:schemeClr>
-                </a:solidFill>
-              </a:defRPr>
-            </a:lvl2pPr>
-            <a:lvl3pPr marL="685800" indent="0">
-              <a:buNone/>
-              <a:defRPr sz="1350">
-                <a:solidFill>
-                  <a:schemeClr val="tx1">
-                    <a:tint val="75000"/>
-                  </a:schemeClr>
-                </a:solidFill>
-              </a:defRPr>
-            </a:lvl3pPr>
-            <a:lvl4pPr marL="1028700" indent="0">
-              <a:buNone/>
-              <a:defRPr sz="1200">
-                <a:solidFill>
-                  <a:schemeClr val="tx1">
-                    <a:tint val="75000"/>
-                  </a:schemeClr>
-                </a:solidFill>
-              </a:defRPr>
-            </a:lvl4pPr>
-            <a:lvl5pPr marL="1371600" indent="0">
-              <a:buNone/>
-              <a:defRPr sz="1200">
-                <a:solidFill>
-                  <a:schemeClr val="tx1">
-                    <a:tint val="75000"/>
-                  </a:schemeClr>
-                </a:solidFill>
-              </a:defRPr>
-            </a:lvl5pPr>
-            <a:lvl6pPr marL="1714500" indent="0">
-              <a:buNone/>
-              <a:defRPr sz="1200">
-                <a:solidFill>
-                  <a:schemeClr val="tx1">
-                    <a:tint val="75000"/>
-                  </a:schemeClr>
-                </a:solidFill>
-              </a:defRPr>
-            </a:lvl6pPr>
-            <a:lvl7pPr marL="2057400" indent="0">
-              <a:buNone/>
-              <a:defRPr sz="1200">
-                <a:solidFill>
-                  <a:schemeClr val="tx1">
-                    <a:tint val="75000"/>
-                  </a:schemeClr>
-                </a:solidFill>
-              </a:defRPr>
-            </a:lvl7pPr>
-            <a:lvl8pPr marL="2400300" indent="0">
-              <a:buNone/>
-              <a:defRPr sz="1200">
-                <a:solidFill>
-                  <a:schemeClr val="tx1">
-                    <a:tint val="75000"/>
-                  </a:schemeClr>
-                </a:solidFill>
-              </a:defRPr>
-            </a:lvl8pPr>
-            <a:lvl9pPr marL="2743200" indent="0">
-              <a:buNone/>
-              <a:defRPr sz="1200">
-                <a:solidFill>
-                  <a:schemeClr val="tx1">
-                    <a:tint val="75000"/>
-                  </a:schemeClr>
-                </a:solidFill>
-              </a:defRPr>
-            </a:lvl9pPr>
-          </a:lstStyle>
-          <a:p>
-            <a:pPr lvl="0"/>
-            <a:r>
-              <a:rPr lang="en-US"/>
-              <a:t>Edit Master text styles</a:t>
-            </a:r>
-          </a:p>
-        </p:txBody>
-      </p:sp>
-      <p:sp>
-        <p:nvSpPr>
-          <p:cNvPr id="4" name="Date Placeholder 3">
-            <a:extLst>
-              <a:ext uri="{FF2B5EF4-FFF2-40B4-BE49-F238E27FC236}">
-                <a16:creationId xmlns:a16="http://schemas.microsoft.com/office/drawing/2014/main" id="{610D3C9A-8421-4C3E-8B4A-FCFB60601267}"/>
-              </a:ext>
-            </a:extLst>
-          </p:cNvPr>
-          <p:cNvSpPr>
-            <a:spLocks noGrp="1"/>
-          </p:cNvSpPr>
-          <p:nvPr>
-            <p:ph type="dt" sz="half" idx="10"/>
-          </p:nvPr>
-        </p:nvSpPr>
-        <p:spPr/>
-        <p:txBody>
-          <a:bodyPr/>
-          <a:lstStyle/>
-          <a:p>
-            <a:fld id="{5FB62F81-FD80-4AA8-93CA-E835B40BE667}" type="datetimeFigureOut">
-              <a:rPr lang="en-US" smtClean="0"/>
-              <a:t>11/2/2017</a:t>
-            </a:fld>
-            <a:endParaRPr lang="en-US"/>
-          </a:p>
-        </p:txBody>
-      </p:sp>
-      <p:sp>
-        <p:nvSpPr>
-          <p:cNvPr id="5" name="Footer Placeholder 4">
-            <a:extLst>
-              <a:ext uri="{FF2B5EF4-FFF2-40B4-BE49-F238E27FC236}">
-                <a16:creationId xmlns:a16="http://schemas.microsoft.com/office/drawing/2014/main" id="{03E583CB-0B91-414A-B739-8022E58F55A0}"/>
-              </a:ext>
-            </a:extLst>
-          </p:cNvPr>
-          <p:cNvSpPr>
-            <a:spLocks noGrp="1"/>
-          </p:cNvSpPr>
-          <p:nvPr>
-            <p:ph type="ftr" sz="quarter" idx="11"/>
-          </p:nvPr>
-        </p:nvSpPr>
-        <p:spPr/>
-        <p:txBody>
-          <a:bodyPr/>
-          <a:lstStyle/>
-          <a:p>
-            <a:endParaRPr lang="en-US"/>
-          </a:p>
-        </p:txBody>
-      </p:sp>
-      <p:sp>
-        <p:nvSpPr>
-          <p:cNvPr id="6" name="Slide Number Placeholder 5">
-            <a:extLst>
-              <a:ext uri="{FF2B5EF4-FFF2-40B4-BE49-F238E27FC236}">
-                <a16:creationId xmlns:a16="http://schemas.microsoft.com/office/drawing/2014/main" id="{634DE307-2DDB-45DB-8E10-FA3993C53B8A}"/>
-              </a:ext>
-            </a:extLst>
-          </p:cNvPr>
-          <p:cNvSpPr>
-            <a:spLocks noGrp="1"/>
-          </p:cNvSpPr>
-          <p:nvPr>
-            <p:ph type="sldNum" sz="quarter" idx="12"/>
-          </p:nvPr>
-        </p:nvSpPr>
-        <p:spPr/>
-        <p:txBody>
-          <a:bodyPr/>
-          <a:lstStyle/>
-          <a:p>
-            <a:fld id="{6427441B-EBD2-447D-AE1D-AD6F97A1CA52}" type="slidenum">
-              <a:rPr lang="en-US" smtClean="0"/>
-              <a:t>‹#›</a:t>
-            </a:fld>
-            <a:endParaRPr lang="en-US"/>
-          </a:p>
-        </p:txBody>
-      </p:sp>
-    </p:spTree>
-    <p:extLst>
-      <p:ext uri="{BB962C8B-B14F-4D97-AF65-F5344CB8AC3E}">
-        <p14:creationId xmlns:p14="http://schemas.microsoft.com/office/powerpoint/2010/main" val="2618593005"/>
-      </p:ext>
-    </p:extLst>
-  </p:cSld>
-  <p:clrMapOvr>
-    <a:masterClrMapping/>
-  </p:clrMapOvr>
-</p:sldLayout>
-</file>
-
-<file path=ppt/slideLayouts/slideLayout17.xml><?xml version="1.0" encoding="utf-8"?>
-<p:sldLayout xmlns:a="http://schemas.openxmlformats.org/drawingml/2006/main" xmlns:r="http://schemas.openxmlformats.org/officeDocument/2006/relationships" xmlns:p="http://schemas.openxmlformats.org/presentationml/2006/main" type="twoObj" preserve="1">
-  <p:cSld name="Two Content">
-    <p:spTree>
-      <p:nvGrpSpPr>
-        <p:cNvPr id="1" name=""/>
-        <p:cNvGrpSpPr/>
-        <p:nvPr/>
-      </p:nvGrpSpPr>
-      <p:grpSpPr>
-        <a:xfrm>
-          <a:off x="0" y="0"/>
-          <a:ext cx="0" cy="0"/>
-          <a:chOff x="0" y="0"/>
-          <a:chExt cx="0" cy="0"/>
-        </a:xfrm>
-      </p:grpSpPr>
-      <p:sp>
-        <p:nvSpPr>
-          <p:cNvPr id="2" name="Title 1">
-            <a:extLst>
-              <a:ext uri="{FF2B5EF4-FFF2-40B4-BE49-F238E27FC236}">
-                <a16:creationId xmlns:a16="http://schemas.microsoft.com/office/drawing/2014/main" id="{D11B7465-3AC4-420D-8FB1-ABCF5949DF92}"/>
-              </a:ext>
-            </a:extLst>
-          </p:cNvPr>
-          <p:cNvSpPr>
-            <a:spLocks noGrp="1"/>
-          </p:cNvSpPr>
-          <p:nvPr>
-            <p:ph type="title"/>
-          </p:nvPr>
-        </p:nvSpPr>
-        <p:spPr/>
-        <p:txBody>
-          <a:bodyPr/>
-          <a:lstStyle/>
-          <a:p>
-            <a:r>
-              <a:rPr lang="en-US"/>
-              <a:t>Click to edit Master title style</a:t>
-            </a:r>
-          </a:p>
-        </p:txBody>
-      </p:sp>
-      <p:sp>
-        <p:nvSpPr>
-          <p:cNvPr id="3" name="Content Placeholder 2">
-            <a:extLst>
-              <a:ext uri="{FF2B5EF4-FFF2-40B4-BE49-F238E27FC236}">
-                <a16:creationId xmlns:a16="http://schemas.microsoft.com/office/drawing/2014/main" id="{2A2674F1-D18D-427C-9923-81F07500D57F}"/>
-              </a:ext>
-            </a:extLst>
-          </p:cNvPr>
-          <p:cNvSpPr>
-            <a:spLocks noGrp="1"/>
-          </p:cNvSpPr>
-          <p:nvPr>
-            <p:ph sz="half" idx="1"/>
-          </p:nvPr>
-        </p:nvSpPr>
-        <p:spPr>
-          <a:xfrm>
-            <a:off x="628650" y="1825625"/>
-            <a:ext cx="3886200" cy="4351338"/>
-          </a:xfrm>
-        </p:spPr>
-        <p:txBody>
-          <a:bodyPr/>
-          <a:lstStyle/>
-          <a:p>
-            <a:pPr lvl="0"/>
-            <a:r>
-              <a:rPr lang="en-US"/>
-              <a:t>Edit Master text styles</a:t>
-            </a:r>
-          </a:p>
-          <a:p>
-            <a:pPr lvl="1"/>
-            <a:r>
-              <a:rPr lang="en-US"/>
-              <a:t>Second level</a:t>
-            </a:r>
-          </a:p>
-          <a:p>
-            <a:pPr lvl="2"/>
-            <a:r>
-              <a:rPr lang="en-US"/>
-              <a:t>Third level</a:t>
-            </a:r>
-          </a:p>
-          <a:p>
-            <a:pPr lvl="3"/>
-            <a:r>
-              <a:rPr lang="en-US"/>
-              <a:t>Fourth level</a:t>
-            </a:r>
-          </a:p>
-          <a:p>
-            <a:pPr lvl="4"/>
-            <a:r>
-              <a:rPr lang="en-US"/>
-              <a:t>Fifth level</a:t>
-            </a:r>
-          </a:p>
-        </p:txBody>
-      </p:sp>
-      <p:sp>
-        <p:nvSpPr>
-          <p:cNvPr id="4" name="Content Placeholder 3">
-            <a:extLst>
-              <a:ext uri="{FF2B5EF4-FFF2-40B4-BE49-F238E27FC236}">
-                <a16:creationId xmlns:a16="http://schemas.microsoft.com/office/drawing/2014/main" id="{CED0845B-5E56-48A9-857D-9377324191AA}"/>
-              </a:ext>
-            </a:extLst>
-          </p:cNvPr>
-          <p:cNvSpPr>
-            <a:spLocks noGrp="1"/>
-          </p:cNvSpPr>
-          <p:nvPr>
-            <p:ph sz="half" idx="2"/>
-          </p:nvPr>
-        </p:nvSpPr>
-        <p:spPr>
-          <a:xfrm>
-            <a:off x="4629150" y="1825625"/>
-            <a:ext cx="3886200" cy="4351338"/>
-          </a:xfrm>
-        </p:spPr>
-        <p:txBody>
-          <a:bodyPr/>
-          <a:lstStyle/>
-          <a:p>
-            <a:pPr lvl="0"/>
-            <a:r>
-              <a:rPr lang="en-US"/>
-              <a:t>Edit Master text styles</a:t>
-            </a:r>
-          </a:p>
-          <a:p>
-            <a:pPr lvl="1"/>
-            <a:r>
-              <a:rPr lang="en-US"/>
-              <a:t>Second level</a:t>
-            </a:r>
-          </a:p>
-          <a:p>
-            <a:pPr lvl="2"/>
-            <a:r>
-              <a:rPr lang="en-US"/>
-              <a:t>Third level</a:t>
-            </a:r>
-          </a:p>
-          <a:p>
-            <a:pPr lvl="3"/>
-            <a:r>
-              <a:rPr lang="en-US"/>
-              <a:t>Fourth level</a:t>
-            </a:r>
-          </a:p>
-          <a:p>
-            <a:pPr lvl="4"/>
-            <a:r>
-              <a:rPr lang="en-US"/>
-              <a:t>Fifth level</a:t>
-            </a:r>
-          </a:p>
-        </p:txBody>
-      </p:sp>
-      <p:sp>
-        <p:nvSpPr>
-          <p:cNvPr id="5" name="Date Placeholder 4">
-            <a:extLst>
-              <a:ext uri="{FF2B5EF4-FFF2-40B4-BE49-F238E27FC236}">
-                <a16:creationId xmlns:a16="http://schemas.microsoft.com/office/drawing/2014/main" id="{72C89C73-D75E-4B3D-97C8-DBB0E68636E5}"/>
-              </a:ext>
-            </a:extLst>
-          </p:cNvPr>
-          <p:cNvSpPr>
-            <a:spLocks noGrp="1"/>
-          </p:cNvSpPr>
-          <p:nvPr>
-            <p:ph type="dt" sz="half" idx="10"/>
-          </p:nvPr>
-        </p:nvSpPr>
-        <p:spPr/>
-        <p:txBody>
-          <a:bodyPr/>
-          <a:lstStyle/>
-          <a:p>
-            <a:fld id="{5FB62F81-FD80-4AA8-93CA-E835B40BE667}" type="datetimeFigureOut">
-              <a:rPr lang="en-US" smtClean="0"/>
-              <a:t>11/2/2017</a:t>
-            </a:fld>
-            <a:endParaRPr lang="en-US"/>
-          </a:p>
-        </p:txBody>
-      </p:sp>
-      <p:sp>
-        <p:nvSpPr>
-          <p:cNvPr id="6" name="Footer Placeholder 5">
-            <a:extLst>
-              <a:ext uri="{FF2B5EF4-FFF2-40B4-BE49-F238E27FC236}">
-                <a16:creationId xmlns:a16="http://schemas.microsoft.com/office/drawing/2014/main" id="{5953AFEA-8A7F-45CF-93B8-7F3B5A069232}"/>
-              </a:ext>
-            </a:extLst>
-          </p:cNvPr>
-          <p:cNvSpPr>
-            <a:spLocks noGrp="1"/>
-          </p:cNvSpPr>
-          <p:nvPr>
-            <p:ph type="ftr" sz="quarter" idx="11"/>
-          </p:nvPr>
-        </p:nvSpPr>
-        <p:spPr/>
-        <p:txBody>
-          <a:bodyPr/>
-          <a:lstStyle/>
-          <a:p>
-            <a:endParaRPr lang="en-US"/>
-          </a:p>
-        </p:txBody>
-      </p:sp>
-      <p:sp>
-        <p:nvSpPr>
-          <p:cNvPr id="7" name="Slide Number Placeholder 6">
-            <a:extLst>
-              <a:ext uri="{FF2B5EF4-FFF2-40B4-BE49-F238E27FC236}">
-                <a16:creationId xmlns:a16="http://schemas.microsoft.com/office/drawing/2014/main" id="{A139FC2F-B2E0-4898-8B67-7BB87BCA5A4C}"/>
-              </a:ext>
-            </a:extLst>
-          </p:cNvPr>
-          <p:cNvSpPr>
-            <a:spLocks noGrp="1"/>
-          </p:cNvSpPr>
-          <p:nvPr>
-            <p:ph type="sldNum" sz="quarter" idx="12"/>
-          </p:nvPr>
-        </p:nvSpPr>
-        <p:spPr/>
-        <p:txBody>
-          <a:bodyPr/>
-          <a:lstStyle/>
-          <a:p>
-            <a:fld id="{6427441B-EBD2-447D-AE1D-AD6F97A1CA52}" type="slidenum">
-              <a:rPr lang="en-US" smtClean="0"/>
-              <a:t>‹#›</a:t>
-            </a:fld>
-            <a:endParaRPr lang="en-US"/>
-          </a:p>
-        </p:txBody>
-      </p:sp>
-    </p:spTree>
-    <p:extLst>
-      <p:ext uri="{BB962C8B-B14F-4D97-AF65-F5344CB8AC3E}">
-        <p14:creationId xmlns:p14="http://schemas.microsoft.com/office/powerpoint/2010/main" val="4068054273"/>
-      </p:ext>
-    </p:extLst>
-  </p:cSld>
-  <p:clrMapOvr>
-    <a:masterClrMapping/>
-  </p:clrMapOvr>
-</p:sldLayout>
-</file>
-
-<file path=ppt/slideLayouts/slideLayout18.xml><?xml version="1.0" encoding="utf-8"?>
-<p:sldLayout xmlns:a="http://schemas.openxmlformats.org/drawingml/2006/main" xmlns:r="http://schemas.openxmlformats.org/officeDocument/2006/relationships" xmlns:p="http://schemas.openxmlformats.org/presentationml/2006/main" type="twoTxTwoObj" preserve="1">
-  <p:cSld name="Comparison">
-    <p:spTree>
-      <p:nvGrpSpPr>
-        <p:cNvPr id="1" name=""/>
-        <p:cNvGrpSpPr/>
-        <p:nvPr/>
-      </p:nvGrpSpPr>
-      <p:grpSpPr>
-        <a:xfrm>
-          <a:off x="0" y="0"/>
-          <a:ext cx="0" cy="0"/>
-          <a:chOff x="0" y="0"/>
-          <a:chExt cx="0" cy="0"/>
-        </a:xfrm>
-      </p:grpSpPr>
-      <p:sp>
-        <p:nvSpPr>
-          <p:cNvPr id="2" name="Title 1">
-            <a:extLst>
-              <a:ext uri="{FF2B5EF4-FFF2-40B4-BE49-F238E27FC236}">
-                <a16:creationId xmlns:a16="http://schemas.microsoft.com/office/drawing/2014/main" id="{9C6FE785-9F16-4311-A71A-94203A1CC686}"/>
-              </a:ext>
-            </a:extLst>
-          </p:cNvPr>
-          <p:cNvSpPr>
-            <a:spLocks noGrp="1"/>
-          </p:cNvSpPr>
-          <p:nvPr>
-            <p:ph type="title"/>
-          </p:nvPr>
-        </p:nvSpPr>
-        <p:spPr>
-          <a:xfrm>
-            <a:off x="629841" y="365126"/>
-            <a:ext cx="7886700" cy="1325563"/>
-          </a:xfrm>
-        </p:spPr>
-        <p:txBody>
-          <a:bodyPr/>
-          <a:lstStyle/>
-          <a:p>
-            <a:r>
-              <a:rPr lang="en-US"/>
-              <a:t>Click to edit Master title style</a:t>
-            </a:r>
-          </a:p>
-        </p:txBody>
-      </p:sp>
-      <p:sp>
-        <p:nvSpPr>
-          <p:cNvPr id="3" name="Text Placeholder 2">
-            <a:extLst>
-              <a:ext uri="{FF2B5EF4-FFF2-40B4-BE49-F238E27FC236}">
-                <a16:creationId xmlns:a16="http://schemas.microsoft.com/office/drawing/2014/main" id="{3C90E02F-1513-431D-8BD6-DC72FCA35958}"/>
-              </a:ext>
-            </a:extLst>
-          </p:cNvPr>
-          <p:cNvSpPr>
-            <a:spLocks noGrp="1"/>
-          </p:cNvSpPr>
-          <p:nvPr>
-            <p:ph type="body" idx="1"/>
-          </p:nvPr>
-        </p:nvSpPr>
-        <p:spPr>
-          <a:xfrm>
-            <a:off x="629842" y="1681163"/>
-            <a:ext cx="3868340" cy="823912"/>
-          </a:xfrm>
-        </p:spPr>
-        <p:txBody>
-          <a:bodyPr anchor="b"/>
-          <a:lstStyle>
-            <a:lvl1pPr marL="0" indent="0">
-              <a:buNone/>
-              <a:defRPr sz="1800" b="1"/>
-            </a:lvl1pPr>
-            <a:lvl2pPr marL="342900" indent="0">
-              <a:buNone/>
-              <a:defRPr sz="1500" b="1"/>
-            </a:lvl2pPr>
-            <a:lvl3pPr marL="685800" indent="0">
-              <a:buNone/>
-              <a:defRPr sz="1350" b="1"/>
-            </a:lvl3pPr>
-            <a:lvl4pPr marL="1028700" indent="0">
-              <a:buNone/>
-              <a:defRPr sz="1200" b="1"/>
-            </a:lvl4pPr>
-            <a:lvl5pPr marL="1371600" indent="0">
-              <a:buNone/>
-              <a:defRPr sz="1200" b="1"/>
-            </a:lvl5pPr>
-            <a:lvl6pPr marL="1714500" indent="0">
-              <a:buNone/>
-              <a:defRPr sz="1200" b="1"/>
-            </a:lvl6pPr>
-            <a:lvl7pPr marL="2057400" indent="0">
-              <a:buNone/>
-              <a:defRPr sz="1200" b="1"/>
-            </a:lvl7pPr>
-            <a:lvl8pPr marL="2400300" indent="0">
-              <a:buNone/>
-              <a:defRPr sz="1200" b="1"/>
-            </a:lvl8pPr>
-            <a:lvl9pPr marL="2743200" indent="0">
-              <a:buNone/>
-              <a:defRPr sz="1200" b="1"/>
-            </a:lvl9pPr>
-          </a:lstStyle>
-          <a:p>
-            <a:pPr lvl="0"/>
-            <a:r>
-              <a:rPr lang="en-US"/>
-              <a:t>Edit Master text styles</a:t>
-            </a:r>
-          </a:p>
-        </p:txBody>
-      </p:sp>
-      <p:sp>
-        <p:nvSpPr>
-          <p:cNvPr id="4" name="Content Placeholder 3">
-            <a:extLst>
-              <a:ext uri="{FF2B5EF4-FFF2-40B4-BE49-F238E27FC236}">
-                <a16:creationId xmlns:a16="http://schemas.microsoft.com/office/drawing/2014/main" id="{DCE3A99F-6893-49D8-BE13-26CA09F038A5}"/>
-              </a:ext>
-            </a:extLst>
-          </p:cNvPr>
-          <p:cNvSpPr>
-            <a:spLocks noGrp="1"/>
-          </p:cNvSpPr>
-          <p:nvPr>
-            <p:ph sz="half" idx="2"/>
-          </p:nvPr>
-        </p:nvSpPr>
-        <p:spPr>
-          <a:xfrm>
-            <a:off x="629842" y="2505075"/>
-            <a:ext cx="3868340" cy="3684588"/>
-          </a:xfrm>
-        </p:spPr>
-        <p:txBody>
-          <a:bodyPr/>
-          <a:lstStyle/>
-          <a:p>
-            <a:pPr lvl="0"/>
-            <a:r>
-              <a:rPr lang="en-US"/>
-              <a:t>Edit Master text styles</a:t>
-            </a:r>
-          </a:p>
-          <a:p>
-            <a:pPr lvl="1"/>
-            <a:r>
-              <a:rPr lang="en-US"/>
-              <a:t>Second level</a:t>
-            </a:r>
-          </a:p>
-          <a:p>
-            <a:pPr lvl="2"/>
-            <a:r>
-              <a:rPr lang="en-US"/>
-              <a:t>Third level</a:t>
-            </a:r>
-          </a:p>
-          <a:p>
-            <a:pPr lvl="3"/>
-            <a:r>
-              <a:rPr lang="en-US"/>
-              <a:t>Fourth level</a:t>
-            </a:r>
-          </a:p>
-          <a:p>
-            <a:pPr lvl="4"/>
-            <a:r>
-              <a:rPr lang="en-US"/>
-              <a:t>Fifth level</a:t>
-            </a:r>
-          </a:p>
-        </p:txBody>
-      </p:sp>
-      <p:sp>
-        <p:nvSpPr>
-          <p:cNvPr id="5" name="Text Placeholder 4">
-            <a:extLst>
-              <a:ext uri="{FF2B5EF4-FFF2-40B4-BE49-F238E27FC236}">
-                <a16:creationId xmlns:a16="http://schemas.microsoft.com/office/drawing/2014/main" id="{D675ABEE-2ABE-4861-A480-D9CA5ABD27D1}"/>
-              </a:ext>
-            </a:extLst>
-          </p:cNvPr>
-          <p:cNvSpPr>
-            <a:spLocks noGrp="1"/>
-          </p:cNvSpPr>
-          <p:nvPr>
-            <p:ph type="body" sz="quarter" idx="3"/>
-          </p:nvPr>
-        </p:nvSpPr>
-        <p:spPr>
-          <a:xfrm>
-            <a:off x="4629150" y="1681163"/>
-            <a:ext cx="3887391" cy="823912"/>
-          </a:xfrm>
-        </p:spPr>
-        <p:txBody>
-          <a:bodyPr anchor="b"/>
-          <a:lstStyle>
-            <a:lvl1pPr marL="0" indent="0">
-              <a:buNone/>
-              <a:defRPr sz="1800" b="1"/>
-            </a:lvl1pPr>
-            <a:lvl2pPr marL="342900" indent="0">
-              <a:buNone/>
-              <a:defRPr sz="1500" b="1"/>
-            </a:lvl2pPr>
-            <a:lvl3pPr marL="685800" indent="0">
-              <a:buNone/>
-              <a:defRPr sz="1350" b="1"/>
-            </a:lvl3pPr>
-            <a:lvl4pPr marL="1028700" indent="0">
-              <a:buNone/>
-              <a:defRPr sz="1200" b="1"/>
-            </a:lvl4pPr>
-            <a:lvl5pPr marL="1371600" indent="0">
-              <a:buNone/>
-              <a:defRPr sz="1200" b="1"/>
-            </a:lvl5pPr>
-            <a:lvl6pPr marL="1714500" indent="0">
-              <a:buNone/>
-              <a:defRPr sz="1200" b="1"/>
-            </a:lvl6pPr>
-            <a:lvl7pPr marL="2057400" indent="0">
-              <a:buNone/>
-              <a:defRPr sz="1200" b="1"/>
-            </a:lvl7pPr>
-            <a:lvl8pPr marL="2400300" indent="0">
-              <a:buNone/>
-              <a:defRPr sz="1200" b="1"/>
-            </a:lvl8pPr>
-            <a:lvl9pPr marL="2743200" indent="0">
-              <a:buNone/>
-              <a:defRPr sz="1200" b="1"/>
-            </a:lvl9pPr>
-          </a:lstStyle>
-          <a:p>
-            <a:pPr lvl="0"/>
-            <a:r>
-              <a:rPr lang="en-US"/>
-              <a:t>Edit Master text styles</a:t>
-            </a:r>
-          </a:p>
-        </p:txBody>
-      </p:sp>
-      <p:sp>
-        <p:nvSpPr>
-          <p:cNvPr id="6" name="Content Placeholder 5">
-            <a:extLst>
-              <a:ext uri="{FF2B5EF4-FFF2-40B4-BE49-F238E27FC236}">
-                <a16:creationId xmlns:a16="http://schemas.microsoft.com/office/drawing/2014/main" id="{4C98955B-715F-4992-B5DC-774996D3DF4A}"/>
-              </a:ext>
-            </a:extLst>
-          </p:cNvPr>
-          <p:cNvSpPr>
-            <a:spLocks noGrp="1"/>
-          </p:cNvSpPr>
-          <p:nvPr>
-            <p:ph sz="quarter" idx="4"/>
-          </p:nvPr>
-        </p:nvSpPr>
-        <p:spPr>
-          <a:xfrm>
-            <a:off x="4629150" y="2505075"/>
-            <a:ext cx="3887391" cy="3684588"/>
-          </a:xfrm>
-        </p:spPr>
-        <p:txBody>
-          <a:bodyPr/>
-          <a:lstStyle/>
-          <a:p>
-            <a:pPr lvl="0"/>
-            <a:r>
-              <a:rPr lang="en-US"/>
-              <a:t>Edit Master text styles</a:t>
-            </a:r>
-          </a:p>
-          <a:p>
-            <a:pPr lvl="1"/>
-            <a:r>
-              <a:rPr lang="en-US"/>
-              <a:t>Second level</a:t>
-            </a:r>
-          </a:p>
-          <a:p>
-            <a:pPr lvl="2"/>
-            <a:r>
-              <a:rPr lang="en-US"/>
-              <a:t>Third level</a:t>
-            </a:r>
-          </a:p>
-          <a:p>
-            <a:pPr lvl="3"/>
-            <a:r>
-              <a:rPr lang="en-US"/>
-              <a:t>Fourth level</a:t>
-            </a:r>
-          </a:p>
-          <a:p>
-            <a:pPr lvl="4"/>
-            <a:r>
-              <a:rPr lang="en-US"/>
-              <a:t>Fifth level</a:t>
-            </a:r>
-          </a:p>
-        </p:txBody>
-      </p:sp>
-      <p:sp>
-        <p:nvSpPr>
-          <p:cNvPr id="7" name="Date Placeholder 6">
-            <a:extLst>
-              <a:ext uri="{FF2B5EF4-FFF2-40B4-BE49-F238E27FC236}">
-                <a16:creationId xmlns:a16="http://schemas.microsoft.com/office/drawing/2014/main" id="{43E99852-689C-485E-A1CD-81301E00BA47}"/>
-              </a:ext>
-            </a:extLst>
-          </p:cNvPr>
-          <p:cNvSpPr>
-            <a:spLocks noGrp="1"/>
-          </p:cNvSpPr>
-          <p:nvPr>
-            <p:ph type="dt" sz="half" idx="10"/>
-          </p:nvPr>
-        </p:nvSpPr>
-        <p:spPr/>
-        <p:txBody>
-          <a:bodyPr/>
-          <a:lstStyle/>
-          <a:p>
-            <a:fld id="{5FB62F81-FD80-4AA8-93CA-E835B40BE667}" type="datetimeFigureOut">
-              <a:rPr lang="en-US" smtClean="0"/>
-              <a:t>11/2/2017</a:t>
-            </a:fld>
-            <a:endParaRPr lang="en-US"/>
-          </a:p>
-        </p:txBody>
-      </p:sp>
-      <p:sp>
-        <p:nvSpPr>
-          <p:cNvPr id="8" name="Footer Placeholder 7">
-            <a:extLst>
-              <a:ext uri="{FF2B5EF4-FFF2-40B4-BE49-F238E27FC236}">
-                <a16:creationId xmlns:a16="http://schemas.microsoft.com/office/drawing/2014/main" id="{13846F57-A636-4AEB-AE87-4BB1D733D2D2}"/>
-              </a:ext>
-            </a:extLst>
-          </p:cNvPr>
-          <p:cNvSpPr>
-            <a:spLocks noGrp="1"/>
-          </p:cNvSpPr>
-          <p:nvPr>
-            <p:ph type="ftr" sz="quarter" idx="11"/>
-          </p:nvPr>
-        </p:nvSpPr>
-        <p:spPr/>
-        <p:txBody>
-          <a:bodyPr/>
-          <a:lstStyle/>
-          <a:p>
-            <a:endParaRPr lang="en-US"/>
-          </a:p>
-        </p:txBody>
-      </p:sp>
-      <p:sp>
-        <p:nvSpPr>
-          <p:cNvPr id="9" name="Slide Number Placeholder 8">
-            <a:extLst>
-              <a:ext uri="{FF2B5EF4-FFF2-40B4-BE49-F238E27FC236}">
-                <a16:creationId xmlns:a16="http://schemas.microsoft.com/office/drawing/2014/main" id="{68DCD6FC-D99A-4BF2-85FF-4C93EE851F96}"/>
-              </a:ext>
-            </a:extLst>
-          </p:cNvPr>
-          <p:cNvSpPr>
-            <a:spLocks noGrp="1"/>
-          </p:cNvSpPr>
-          <p:nvPr>
-            <p:ph type="sldNum" sz="quarter" idx="12"/>
-          </p:nvPr>
-        </p:nvSpPr>
-        <p:spPr/>
-        <p:txBody>
-          <a:bodyPr/>
-          <a:lstStyle/>
-          <a:p>
-            <a:fld id="{6427441B-EBD2-447D-AE1D-AD6F97A1CA52}" type="slidenum">
-              <a:rPr lang="en-US" smtClean="0"/>
-              <a:t>‹#›</a:t>
-            </a:fld>
-            <a:endParaRPr lang="en-US"/>
-          </a:p>
-        </p:txBody>
-      </p:sp>
-    </p:spTree>
-    <p:extLst>
-      <p:ext uri="{BB962C8B-B14F-4D97-AF65-F5344CB8AC3E}">
-        <p14:creationId xmlns:p14="http://schemas.microsoft.com/office/powerpoint/2010/main" val="3992364313"/>
-      </p:ext>
-    </p:extLst>
-  </p:cSld>
-  <p:clrMapOvr>
-    <a:masterClrMapping/>
-  </p:clrMapOvr>
-</p:sldLayout>
-</file>
-
-<file path=ppt/slideLayouts/slideLayout19.xml><?xml version="1.0" encoding="utf-8"?>
-<p:sldLayout xmlns:a="http://schemas.openxmlformats.org/drawingml/2006/main" xmlns:r="http://schemas.openxmlformats.org/officeDocument/2006/relationships" xmlns:p="http://schemas.openxmlformats.org/presentationml/2006/main" type="titleOnly" preserve="1">
-  <p:cSld name="Title Only">
-    <p:spTree>
-      <p:nvGrpSpPr>
-        <p:cNvPr id="1" name=""/>
-        <p:cNvGrpSpPr/>
-        <p:nvPr/>
-      </p:nvGrpSpPr>
-      <p:grpSpPr>
-        <a:xfrm>
-          <a:off x="0" y="0"/>
-          <a:ext cx="0" cy="0"/>
-          <a:chOff x="0" y="0"/>
-          <a:chExt cx="0" cy="0"/>
-        </a:xfrm>
-      </p:grpSpPr>
-      <p:sp>
-        <p:nvSpPr>
-          <p:cNvPr id="2" name="Title 1">
-            <a:extLst>
-              <a:ext uri="{FF2B5EF4-FFF2-40B4-BE49-F238E27FC236}">
-                <a16:creationId xmlns:a16="http://schemas.microsoft.com/office/drawing/2014/main" id="{B77147B3-7610-4B0C-AA06-ACFCEC7D28D4}"/>
-              </a:ext>
-            </a:extLst>
-          </p:cNvPr>
-          <p:cNvSpPr>
-            <a:spLocks noGrp="1"/>
-          </p:cNvSpPr>
-          <p:nvPr>
-            <p:ph type="title"/>
-          </p:nvPr>
-        </p:nvSpPr>
-        <p:spPr/>
-        <p:txBody>
-          <a:bodyPr/>
-          <a:lstStyle/>
-          <a:p>
-            <a:r>
-              <a:rPr lang="en-US"/>
-              <a:t>Click to edit Master title style</a:t>
-            </a:r>
-          </a:p>
-        </p:txBody>
-      </p:sp>
-      <p:sp>
-        <p:nvSpPr>
-          <p:cNvPr id="3" name="Date Placeholder 2">
-            <a:extLst>
-              <a:ext uri="{FF2B5EF4-FFF2-40B4-BE49-F238E27FC236}">
-                <a16:creationId xmlns:a16="http://schemas.microsoft.com/office/drawing/2014/main" id="{1D684655-5F95-4BF5-98E2-317FA71F67C0}"/>
-              </a:ext>
-            </a:extLst>
-          </p:cNvPr>
-          <p:cNvSpPr>
-            <a:spLocks noGrp="1"/>
-          </p:cNvSpPr>
-          <p:nvPr>
-            <p:ph type="dt" sz="half" idx="10"/>
-          </p:nvPr>
-        </p:nvSpPr>
-        <p:spPr/>
-        <p:txBody>
-          <a:bodyPr/>
-          <a:lstStyle/>
-          <a:p>
-            <a:fld id="{5FB62F81-FD80-4AA8-93CA-E835B40BE667}" type="datetimeFigureOut">
-              <a:rPr lang="en-US" smtClean="0"/>
-              <a:t>11/2/2017</a:t>
-            </a:fld>
-            <a:endParaRPr lang="en-US"/>
-          </a:p>
-        </p:txBody>
-      </p:sp>
-      <p:sp>
-        <p:nvSpPr>
-          <p:cNvPr id="4" name="Footer Placeholder 3">
-            <a:extLst>
-              <a:ext uri="{FF2B5EF4-FFF2-40B4-BE49-F238E27FC236}">
-                <a16:creationId xmlns:a16="http://schemas.microsoft.com/office/drawing/2014/main" id="{B3A7A9B1-9A01-417B-95A3-3D02F09C6C36}"/>
-              </a:ext>
-            </a:extLst>
-          </p:cNvPr>
-          <p:cNvSpPr>
-            <a:spLocks noGrp="1"/>
-          </p:cNvSpPr>
-          <p:nvPr>
-            <p:ph type="ftr" sz="quarter" idx="11"/>
-          </p:nvPr>
-        </p:nvSpPr>
-        <p:spPr/>
-        <p:txBody>
-          <a:bodyPr/>
-          <a:lstStyle/>
-          <a:p>
-            <a:endParaRPr lang="en-US"/>
-          </a:p>
-        </p:txBody>
-      </p:sp>
-      <p:sp>
-        <p:nvSpPr>
-          <p:cNvPr id="5" name="Slide Number Placeholder 4">
-            <a:extLst>
-              <a:ext uri="{FF2B5EF4-FFF2-40B4-BE49-F238E27FC236}">
-                <a16:creationId xmlns:a16="http://schemas.microsoft.com/office/drawing/2014/main" id="{35487BB0-8733-415D-8978-88206CD465A9}"/>
-              </a:ext>
-            </a:extLst>
-          </p:cNvPr>
-          <p:cNvSpPr>
-            <a:spLocks noGrp="1"/>
-          </p:cNvSpPr>
-          <p:nvPr>
-            <p:ph type="sldNum" sz="quarter" idx="12"/>
-          </p:nvPr>
-        </p:nvSpPr>
-        <p:spPr/>
-        <p:txBody>
-          <a:bodyPr/>
-          <a:lstStyle/>
-          <a:p>
-            <a:fld id="{6427441B-EBD2-447D-AE1D-AD6F97A1CA52}" type="slidenum">
-              <a:rPr lang="en-US" smtClean="0"/>
-              <a:t>‹#›</a:t>
-            </a:fld>
-            <a:endParaRPr lang="en-US"/>
-          </a:p>
-        </p:txBody>
-      </p:sp>
-    </p:spTree>
-    <p:extLst>
-      <p:ext uri="{BB962C8B-B14F-4D97-AF65-F5344CB8AC3E}">
-        <p14:creationId xmlns:p14="http://schemas.microsoft.com/office/powerpoint/2010/main" val="52362307"/>
       </p:ext>
     </p:extLst>
   </p:cSld>
@@ -3688,7 +1886,7 @@
           <a:p>
             <a:fld id="{FB7712AD-3B21-4FE9-B722-CF9B0200D9B9}" type="datetimeFigureOut">
               <a:rPr lang="en-US" smtClean="0"/>
-              <a:t>11/2/2017</a:t>
+              <a:t>11/3/2017</a:t>
             </a:fld>
             <a:endParaRPr lang="en-US"/>
           </a:p>
@@ -3748,1124 +1946,6 @@
     <p:extLst>
       <p:ext uri="{BB962C8B-B14F-4D97-AF65-F5344CB8AC3E}">
         <p14:creationId xmlns:p14="http://schemas.microsoft.com/office/powerpoint/2010/main" val="3776424572"/>
-      </p:ext>
-    </p:extLst>
-  </p:cSld>
-  <p:clrMapOvr>
-    <a:masterClrMapping/>
-  </p:clrMapOvr>
-</p:sldLayout>
-</file>
-
-<file path=ppt/slideLayouts/slideLayout20.xml><?xml version="1.0" encoding="utf-8"?>
-<p:sldLayout xmlns:a="http://schemas.openxmlformats.org/drawingml/2006/main" xmlns:r="http://schemas.openxmlformats.org/officeDocument/2006/relationships" xmlns:p="http://schemas.openxmlformats.org/presentationml/2006/main" type="blank" preserve="1">
-  <p:cSld name="Blank">
-    <p:spTree>
-      <p:nvGrpSpPr>
-        <p:cNvPr id="1" name=""/>
-        <p:cNvGrpSpPr/>
-        <p:nvPr/>
-      </p:nvGrpSpPr>
-      <p:grpSpPr>
-        <a:xfrm>
-          <a:off x="0" y="0"/>
-          <a:ext cx="0" cy="0"/>
-          <a:chOff x="0" y="0"/>
-          <a:chExt cx="0" cy="0"/>
-        </a:xfrm>
-      </p:grpSpPr>
-      <p:sp>
-        <p:nvSpPr>
-          <p:cNvPr id="2" name="Date Placeholder 1">
-            <a:extLst>
-              <a:ext uri="{FF2B5EF4-FFF2-40B4-BE49-F238E27FC236}">
-                <a16:creationId xmlns:a16="http://schemas.microsoft.com/office/drawing/2014/main" id="{FF20C482-9CD7-41D3-8523-72545A9EE729}"/>
-              </a:ext>
-            </a:extLst>
-          </p:cNvPr>
-          <p:cNvSpPr>
-            <a:spLocks noGrp="1"/>
-          </p:cNvSpPr>
-          <p:nvPr>
-            <p:ph type="dt" sz="half" idx="10"/>
-          </p:nvPr>
-        </p:nvSpPr>
-        <p:spPr/>
-        <p:txBody>
-          <a:bodyPr/>
-          <a:lstStyle/>
-          <a:p>
-            <a:fld id="{5FB62F81-FD80-4AA8-93CA-E835B40BE667}" type="datetimeFigureOut">
-              <a:rPr lang="en-US" smtClean="0"/>
-              <a:t>11/2/2017</a:t>
-            </a:fld>
-            <a:endParaRPr lang="en-US"/>
-          </a:p>
-        </p:txBody>
-      </p:sp>
-      <p:sp>
-        <p:nvSpPr>
-          <p:cNvPr id="3" name="Footer Placeholder 2">
-            <a:extLst>
-              <a:ext uri="{FF2B5EF4-FFF2-40B4-BE49-F238E27FC236}">
-                <a16:creationId xmlns:a16="http://schemas.microsoft.com/office/drawing/2014/main" id="{1DDE5A83-6AFF-4B43-8418-F51F0DC4049D}"/>
-              </a:ext>
-            </a:extLst>
-          </p:cNvPr>
-          <p:cNvSpPr>
-            <a:spLocks noGrp="1"/>
-          </p:cNvSpPr>
-          <p:nvPr>
-            <p:ph type="ftr" sz="quarter" idx="11"/>
-          </p:nvPr>
-        </p:nvSpPr>
-        <p:spPr/>
-        <p:txBody>
-          <a:bodyPr/>
-          <a:lstStyle/>
-          <a:p>
-            <a:endParaRPr lang="en-US"/>
-          </a:p>
-        </p:txBody>
-      </p:sp>
-      <p:sp>
-        <p:nvSpPr>
-          <p:cNvPr id="4" name="Slide Number Placeholder 3">
-            <a:extLst>
-              <a:ext uri="{FF2B5EF4-FFF2-40B4-BE49-F238E27FC236}">
-                <a16:creationId xmlns:a16="http://schemas.microsoft.com/office/drawing/2014/main" id="{1A7E7312-00EF-4646-AA53-4A2BE55ADF0D}"/>
-              </a:ext>
-            </a:extLst>
-          </p:cNvPr>
-          <p:cNvSpPr>
-            <a:spLocks noGrp="1"/>
-          </p:cNvSpPr>
-          <p:nvPr>
-            <p:ph type="sldNum" sz="quarter" idx="12"/>
-          </p:nvPr>
-        </p:nvSpPr>
-        <p:spPr/>
-        <p:txBody>
-          <a:bodyPr/>
-          <a:lstStyle/>
-          <a:p>
-            <a:fld id="{6427441B-EBD2-447D-AE1D-AD6F97A1CA52}" type="slidenum">
-              <a:rPr lang="en-US" smtClean="0"/>
-              <a:t>‹#›</a:t>
-            </a:fld>
-            <a:endParaRPr lang="en-US"/>
-          </a:p>
-        </p:txBody>
-      </p:sp>
-    </p:spTree>
-    <p:extLst>
-      <p:ext uri="{BB962C8B-B14F-4D97-AF65-F5344CB8AC3E}">
-        <p14:creationId xmlns:p14="http://schemas.microsoft.com/office/powerpoint/2010/main" val="3227972233"/>
-      </p:ext>
-    </p:extLst>
-  </p:cSld>
-  <p:clrMapOvr>
-    <a:masterClrMapping/>
-  </p:clrMapOvr>
-</p:sldLayout>
-</file>
-
-<file path=ppt/slideLayouts/slideLayout21.xml><?xml version="1.0" encoding="utf-8"?>
-<p:sldLayout xmlns:a="http://schemas.openxmlformats.org/drawingml/2006/main" xmlns:r="http://schemas.openxmlformats.org/officeDocument/2006/relationships" xmlns:p="http://schemas.openxmlformats.org/presentationml/2006/main" type="objTx" preserve="1">
-  <p:cSld name="Content with Caption">
-    <p:spTree>
-      <p:nvGrpSpPr>
-        <p:cNvPr id="1" name=""/>
-        <p:cNvGrpSpPr/>
-        <p:nvPr/>
-      </p:nvGrpSpPr>
-      <p:grpSpPr>
-        <a:xfrm>
-          <a:off x="0" y="0"/>
-          <a:ext cx="0" cy="0"/>
-          <a:chOff x="0" y="0"/>
-          <a:chExt cx="0" cy="0"/>
-        </a:xfrm>
-      </p:grpSpPr>
-      <p:sp>
-        <p:nvSpPr>
-          <p:cNvPr id="2" name="Title 1">
-            <a:extLst>
-              <a:ext uri="{FF2B5EF4-FFF2-40B4-BE49-F238E27FC236}">
-                <a16:creationId xmlns:a16="http://schemas.microsoft.com/office/drawing/2014/main" id="{5D2BDB94-95F6-4081-B0F6-38E6F63FA6D9}"/>
-              </a:ext>
-            </a:extLst>
-          </p:cNvPr>
-          <p:cNvSpPr>
-            <a:spLocks noGrp="1"/>
-          </p:cNvSpPr>
-          <p:nvPr>
-            <p:ph type="title"/>
-          </p:nvPr>
-        </p:nvSpPr>
-        <p:spPr>
-          <a:xfrm>
-            <a:off x="629841" y="457200"/>
-            <a:ext cx="2949178" cy="1600200"/>
-          </a:xfrm>
-        </p:spPr>
-        <p:txBody>
-          <a:bodyPr anchor="b"/>
-          <a:lstStyle>
-            <a:lvl1pPr>
-              <a:defRPr sz="2400"/>
-            </a:lvl1pPr>
-          </a:lstStyle>
-          <a:p>
-            <a:r>
-              <a:rPr lang="en-US"/>
-              <a:t>Click to edit Master title style</a:t>
-            </a:r>
-          </a:p>
-        </p:txBody>
-      </p:sp>
-      <p:sp>
-        <p:nvSpPr>
-          <p:cNvPr id="3" name="Content Placeholder 2">
-            <a:extLst>
-              <a:ext uri="{FF2B5EF4-FFF2-40B4-BE49-F238E27FC236}">
-                <a16:creationId xmlns:a16="http://schemas.microsoft.com/office/drawing/2014/main" id="{4541AD76-95A8-4FCF-BC7F-D5DC448CB604}"/>
-              </a:ext>
-            </a:extLst>
-          </p:cNvPr>
-          <p:cNvSpPr>
-            <a:spLocks noGrp="1"/>
-          </p:cNvSpPr>
-          <p:nvPr>
-            <p:ph idx="1"/>
-          </p:nvPr>
-        </p:nvSpPr>
-        <p:spPr>
-          <a:xfrm>
-            <a:off x="3887391" y="987426"/>
-            <a:ext cx="4629150" cy="4873625"/>
-          </a:xfrm>
-        </p:spPr>
-        <p:txBody>
-          <a:bodyPr/>
-          <a:lstStyle>
-            <a:lvl1pPr>
-              <a:defRPr sz="2400"/>
-            </a:lvl1pPr>
-            <a:lvl2pPr>
-              <a:defRPr sz="2100"/>
-            </a:lvl2pPr>
-            <a:lvl3pPr>
-              <a:defRPr sz="1800"/>
-            </a:lvl3pPr>
-            <a:lvl4pPr>
-              <a:defRPr sz="1500"/>
-            </a:lvl4pPr>
-            <a:lvl5pPr>
-              <a:defRPr sz="1500"/>
-            </a:lvl5pPr>
-            <a:lvl6pPr>
-              <a:defRPr sz="1500"/>
-            </a:lvl6pPr>
-            <a:lvl7pPr>
-              <a:defRPr sz="1500"/>
-            </a:lvl7pPr>
-            <a:lvl8pPr>
-              <a:defRPr sz="1500"/>
-            </a:lvl8pPr>
-            <a:lvl9pPr>
-              <a:defRPr sz="1500"/>
-            </a:lvl9pPr>
-          </a:lstStyle>
-          <a:p>
-            <a:pPr lvl="0"/>
-            <a:r>
-              <a:rPr lang="en-US"/>
-              <a:t>Edit Master text styles</a:t>
-            </a:r>
-          </a:p>
-          <a:p>
-            <a:pPr lvl="1"/>
-            <a:r>
-              <a:rPr lang="en-US"/>
-              <a:t>Second level</a:t>
-            </a:r>
-          </a:p>
-          <a:p>
-            <a:pPr lvl="2"/>
-            <a:r>
-              <a:rPr lang="en-US"/>
-              <a:t>Third level</a:t>
-            </a:r>
-          </a:p>
-          <a:p>
-            <a:pPr lvl="3"/>
-            <a:r>
-              <a:rPr lang="en-US"/>
-              <a:t>Fourth level</a:t>
-            </a:r>
-          </a:p>
-          <a:p>
-            <a:pPr lvl="4"/>
-            <a:r>
-              <a:rPr lang="en-US"/>
-              <a:t>Fifth level</a:t>
-            </a:r>
-          </a:p>
-        </p:txBody>
-      </p:sp>
-      <p:sp>
-        <p:nvSpPr>
-          <p:cNvPr id="4" name="Text Placeholder 3">
-            <a:extLst>
-              <a:ext uri="{FF2B5EF4-FFF2-40B4-BE49-F238E27FC236}">
-                <a16:creationId xmlns:a16="http://schemas.microsoft.com/office/drawing/2014/main" id="{FA9FC8E0-C367-44C8-9ECA-C42112A9E5BC}"/>
-              </a:ext>
-            </a:extLst>
-          </p:cNvPr>
-          <p:cNvSpPr>
-            <a:spLocks noGrp="1"/>
-          </p:cNvSpPr>
-          <p:nvPr>
-            <p:ph type="body" sz="half" idx="2"/>
-          </p:nvPr>
-        </p:nvSpPr>
-        <p:spPr>
-          <a:xfrm>
-            <a:off x="629841" y="2057400"/>
-            <a:ext cx="2949178" cy="3811588"/>
-          </a:xfrm>
-        </p:spPr>
-        <p:txBody>
-          <a:bodyPr/>
-          <a:lstStyle>
-            <a:lvl1pPr marL="0" indent="0">
-              <a:buNone/>
-              <a:defRPr sz="1200"/>
-            </a:lvl1pPr>
-            <a:lvl2pPr marL="342900" indent="0">
-              <a:buNone/>
-              <a:defRPr sz="1050"/>
-            </a:lvl2pPr>
-            <a:lvl3pPr marL="685800" indent="0">
-              <a:buNone/>
-              <a:defRPr sz="900"/>
-            </a:lvl3pPr>
-            <a:lvl4pPr marL="1028700" indent="0">
-              <a:buNone/>
-              <a:defRPr sz="750"/>
-            </a:lvl4pPr>
-            <a:lvl5pPr marL="1371600" indent="0">
-              <a:buNone/>
-              <a:defRPr sz="750"/>
-            </a:lvl5pPr>
-            <a:lvl6pPr marL="1714500" indent="0">
-              <a:buNone/>
-              <a:defRPr sz="750"/>
-            </a:lvl6pPr>
-            <a:lvl7pPr marL="2057400" indent="0">
-              <a:buNone/>
-              <a:defRPr sz="750"/>
-            </a:lvl7pPr>
-            <a:lvl8pPr marL="2400300" indent="0">
-              <a:buNone/>
-              <a:defRPr sz="750"/>
-            </a:lvl8pPr>
-            <a:lvl9pPr marL="2743200" indent="0">
-              <a:buNone/>
-              <a:defRPr sz="750"/>
-            </a:lvl9pPr>
-          </a:lstStyle>
-          <a:p>
-            <a:pPr lvl="0"/>
-            <a:r>
-              <a:rPr lang="en-US"/>
-              <a:t>Edit Master text styles</a:t>
-            </a:r>
-          </a:p>
-        </p:txBody>
-      </p:sp>
-      <p:sp>
-        <p:nvSpPr>
-          <p:cNvPr id="5" name="Date Placeholder 4">
-            <a:extLst>
-              <a:ext uri="{FF2B5EF4-FFF2-40B4-BE49-F238E27FC236}">
-                <a16:creationId xmlns:a16="http://schemas.microsoft.com/office/drawing/2014/main" id="{F51BFE1A-CCAA-45C1-A424-2D26E3634415}"/>
-              </a:ext>
-            </a:extLst>
-          </p:cNvPr>
-          <p:cNvSpPr>
-            <a:spLocks noGrp="1"/>
-          </p:cNvSpPr>
-          <p:nvPr>
-            <p:ph type="dt" sz="half" idx="10"/>
-          </p:nvPr>
-        </p:nvSpPr>
-        <p:spPr/>
-        <p:txBody>
-          <a:bodyPr/>
-          <a:lstStyle/>
-          <a:p>
-            <a:fld id="{5FB62F81-FD80-4AA8-93CA-E835B40BE667}" type="datetimeFigureOut">
-              <a:rPr lang="en-US" smtClean="0"/>
-              <a:t>11/2/2017</a:t>
-            </a:fld>
-            <a:endParaRPr lang="en-US"/>
-          </a:p>
-        </p:txBody>
-      </p:sp>
-      <p:sp>
-        <p:nvSpPr>
-          <p:cNvPr id="6" name="Footer Placeholder 5">
-            <a:extLst>
-              <a:ext uri="{FF2B5EF4-FFF2-40B4-BE49-F238E27FC236}">
-                <a16:creationId xmlns:a16="http://schemas.microsoft.com/office/drawing/2014/main" id="{DA3E8F67-DB7B-4DFF-856D-CBA5A8ED19E2}"/>
-              </a:ext>
-            </a:extLst>
-          </p:cNvPr>
-          <p:cNvSpPr>
-            <a:spLocks noGrp="1"/>
-          </p:cNvSpPr>
-          <p:nvPr>
-            <p:ph type="ftr" sz="quarter" idx="11"/>
-          </p:nvPr>
-        </p:nvSpPr>
-        <p:spPr/>
-        <p:txBody>
-          <a:bodyPr/>
-          <a:lstStyle/>
-          <a:p>
-            <a:endParaRPr lang="en-US"/>
-          </a:p>
-        </p:txBody>
-      </p:sp>
-      <p:sp>
-        <p:nvSpPr>
-          <p:cNvPr id="7" name="Slide Number Placeholder 6">
-            <a:extLst>
-              <a:ext uri="{FF2B5EF4-FFF2-40B4-BE49-F238E27FC236}">
-                <a16:creationId xmlns:a16="http://schemas.microsoft.com/office/drawing/2014/main" id="{B8DF6B6F-25F6-457A-9EBE-C3E715C17A60}"/>
-              </a:ext>
-            </a:extLst>
-          </p:cNvPr>
-          <p:cNvSpPr>
-            <a:spLocks noGrp="1"/>
-          </p:cNvSpPr>
-          <p:nvPr>
-            <p:ph type="sldNum" sz="quarter" idx="12"/>
-          </p:nvPr>
-        </p:nvSpPr>
-        <p:spPr/>
-        <p:txBody>
-          <a:bodyPr/>
-          <a:lstStyle/>
-          <a:p>
-            <a:fld id="{6427441B-EBD2-447D-AE1D-AD6F97A1CA52}" type="slidenum">
-              <a:rPr lang="en-US" smtClean="0"/>
-              <a:t>‹#›</a:t>
-            </a:fld>
-            <a:endParaRPr lang="en-US"/>
-          </a:p>
-        </p:txBody>
-      </p:sp>
-    </p:spTree>
-    <p:extLst>
-      <p:ext uri="{BB962C8B-B14F-4D97-AF65-F5344CB8AC3E}">
-        <p14:creationId xmlns:p14="http://schemas.microsoft.com/office/powerpoint/2010/main" val="3468506293"/>
-      </p:ext>
-    </p:extLst>
-  </p:cSld>
-  <p:clrMapOvr>
-    <a:masterClrMapping/>
-  </p:clrMapOvr>
-</p:sldLayout>
-</file>
-
-<file path=ppt/slideLayouts/slideLayout22.xml><?xml version="1.0" encoding="utf-8"?>
-<p:sldLayout xmlns:a="http://schemas.openxmlformats.org/drawingml/2006/main" xmlns:r="http://schemas.openxmlformats.org/officeDocument/2006/relationships" xmlns:p="http://schemas.openxmlformats.org/presentationml/2006/main" type="picTx" preserve="1">
-  <p:cSld name="Picture with Caption">
-    <p:spTree>
-      <p:nvGrpSpPr>
-        <p:cNvPr id="1" name=""/>
-        <p:cNvGrpSpPr/>
-        <p:nvPr/>
-      </p:nvGrpSpPr>
-      <p:grpSpPr>
-        <a:xfrm>
-          <a:off x="0" y="0"/>
-          <a:ext cx="0" cy="0"/>
-          <a:chOff x="0" y="0"/>
-          <a:chExt cx="0" cy="0"/>
-        </a:xfrm>
-      </p:grpSpPr>
-      <p:sp>
-        <p:nvSpPr>
-          <p:cNvPr id="2" name="Title 1">
-            <a:extLst>
-              <a:ext uri="{FF2B5EF4-FFF2-40B4-BE49-F238E27FC236}">
-                <a16:creationId xmlns:a16="http://schemas.microsoft.com/office/drawing/2014/main" id="{FA30506D-0D8E-4AC7-92CE-C929C59B41D2}"/>
-              </a:ext>
-            </a:extLst>
-          </p:cNvPr>
-          <p:cNvSpPr>
-            <a:spLocks noGrp="1"/>
-          </p:cNvSpPr>
-          <p:nvPr>
-            <p:ph type="title"/>
-          </p:nvPr>
-        </p:nvSpPr>
-        <p:spPr>
-          <a:xfrm>
-            <a:off x="629841" y="457200"/>
-            <a:ext cx="2949178" cy="1600200"/>
-          </a:xfrm>
-        </p:spPr>
-        <p:txBody>
-          <a:bodyPr anchor="b"/>
-          <a:lstStyle>
-            <a:lvl1pPr>
-              <a:defRPr sz="2400"/>
-            </a:lvl1pPr>
-          </a:lstStyle>
-          <a:p>
-            <a:r>
-              <a:rPr lang="en-US"/>
-              <a:t>Click to edit Master title style</a:t>
-            </a:r>
-          </a:p>
-        </p:txBody>
-      </p:sp>
-      <p:sp>
-        <p:nvSpPr>
-          <p:cNvPr id="3" name="Picture Placeholder 2">
-            <a:extLst>
-              <a:ext uri="{FF2B5EF4-FFF2-40B4-BE49-F238E27FC236}">
-                <a16:creationId xmlns:a16="http://schemas.microsoft.com/office/drawing/2014/main" id="{846DAA4E-0B97-4BFC-875F-40DEE33FAB9B}"/>
-              </a:ext>
-            </a:extLst>
-          </p:cNvPr>
-          <p:cNvSpPr>
-            <a:spLocks noGrp="1"/>
-          </p:cNvSpPr>
-          <p:nvPr>
-            <p:ph type="pic" idx="1"/>
-          </p:nvPr>
-        </p:nvSpPr>
-        <p:spPr>
-          <a:xfrm>
-            <a:off x="3887391" y="987426"/>
-            <a:ext cx="4629150" cy="4873625"/>
-          </a:xfrm>
-        </p:spPr>
-        <p:txBody>
-          <a:bodyPr/>
-          <a:lstStyle>
-            <a:lvl1pPr marL="0" indent="0">
-              <a:buNone/>
-              <a:defRPr sz="2400"/>
-            </a:lvl1pPr>
-            <a:lvl2pPr marL="342900" indent="0">
-              <a:buNone/>
-              <a:defRPr sz="2100"/>
-            </a:lvl2pPr>
-            <a:lvl3pPr marL="685800" indent="0">
-              <a:buNone/>
-              <a:defRPr sz="1800"/>
-            </a:lvl3pPr>
-            <a:lvl4pPr marL="1028700" indent="0">
-              <a:buNone/>
-              <a:defRPr sz="1500"/>
-            </a:lvl4pPr>
-            <a:lvl5pPr marL="1371600" indent="0">
-              <a:buNone/>
-              <a:defRPr sz="1500"/>
-            </a:lvl5pPr>
-            <a:lvl6pPr marL="1714500" indent="0">
-              <a:buNone/>
-              <a:defRPr sz="1500"/>
-            </a:lvl6pPr>
-            <a:lvl7pPr marL="2057400" indent="0">
-              <a:buNone/>
-              <a:defRPr sz="1500"/>
-            </a:lvl7pPr>
-            <a:lvl8pPr marL="2400300" indent="0">
-              <a:buNone/>
-              <a:defRPr sz="1500"/>
-            </a:lvl8pPr>
-            <a:lvl9pPr marL="2743200" indent="0">
-              <a:buNone/>
-              <a:defRPr sz="1500"/>
-            </a:lvl9pPr>
-          </a:lstStyle>
-          <a:p>
-            <a:endParaRPr lang="en-US"/>
-          </a:p>
-        </p:txBody>
-      </p:sp>
-      <p:sp>
-        <p:nvSpPr>
-          <p:cNvPr id="4" name="Text Placeholder 3">
-            <a:extLst>
-              <a:ext uri="{FF2B5EF4-FFF2-40B4-BE49-F238E27FC236}">
-                <a16:creationId xmlns:a16="http://schemas.microsoft.com/office/drawing/2014/main" id="{2171E06A-7A9C-45B0-AF60-D380243AF8B3}"/>
-              </a:ext>
-            </a:extLst>
-          </p:cNvPr>
-          <p:cNvSpPr>
-            <a:spLocks noGrp="1"/>
-          </p:cNvSpPr>
-          <p:nvPr>
-            <p:ph type="body" sz="half" idx="2"/>
-          </p:nvPr>
-        </p:nvSpPr>
-        <p:spPr>
-          <a:xfrm>
-            <a:off x="629841" y="2057400"/>
-            <a:ext cx="2949178" cy="3811588"/>
-          </a:xfrm>
-        </p:spPr>
-        <p:txBody>
-          <a:bodyPr/>
-          <a:lstStyle>
-            <a:lvl1pPr marL="0" indent="0">
-              <a:buNone/>
-              <a:defRPr sz="1200"/>
-            </a:lvl1pPr>
-            <a:lvl2pPr marL="342900" indent="0">
-              <a:buNone/>
-              <a:defRPr sz="1050"/>
-            </a:lvl2pPr>
-            <a:lvl3pPr marL="685800" indent="0">
-              <a:buNone/>
-              <a:defRPr sz="900"/>
-            </a:lvl3pPr>
-            <a:lvl4pPr marL="1028700" indent="0">
-              <a:buNone/>
-              <a:defRPr sz="750"/>
-            </a:lvl4pPr>
-            <a:lvl5pPr marL="1371600" indent="0">
-              <a:buNone/>
-              <a:defRPr sz="750"/>
-            </a:lvl5pPr>
-            <a:lvl6pPr marL="1714500" indent="0">
-              <a:buNone/>
-              <a:defRPr sz="750"/>
-            </a:lvl6pPr>
-            <a:lvl7pPr marL="2057400" indent="0">
-              <a:buNone/>
-              <a:defRPr sz="750"/>
-            </a:lvl7pPr>
-            <a:lvl8pPr marL="2400300" indent="0">
-              <a:buNone/>
-              <a:defRPr sz="750"/>
-            </a:lvl8pPr>
-            <a:lvl9pPr marL="2743200" indent="0">
-              <a:buNone/>
-              <a:defRPr sz="750"/>
-            </a:lvl9pPr>
-          </a:lstStyle>
-          <a:p>
-            <a:pPr lvl="0"/>
-            <a:r>
-              <a:rPr lang="en-US"/>
-              <a:t>Edit Master text styles</a:t>
-            </a:r>
-          </a:p>
-        </p:txBody>
-      </p:sp>
-      <p:sp>
-        <p:nvSpPr>
-          <p:cNvPr id="5" name="Date Placeholder 4">
-            <a:extLst>
-              <a:ext uri="{FF2B5EF4-FFF2-40B4-BE49-F238E27FC236}">
-                <a16:creationId xmlns:a16="http://schemas.microsoft.com/office/drawing/2014/main" id="{4855AFFE-4549-4804-8A40-7D7835CF32C5}"/>
-              </a:ext>
-            </a:extLst>
-          </p:cNvPr>
-          <p:cNvSpPr>
-            <a:spLocks noGrp="1"/>
-          </p:cNvSpPr>
-          <p:nvPr>
-            <p:ph type="dt" sz="half" idx="10"/>
-          </p:nvPr>
-        </p:nvSpPr>
-        <p:spPr/>
-        <p:txBody>
-          <a:bodyPr/>
-          <a:lstStyle/>
-          <a:p>
-            <a:fld id="{5FB62F81-FD80-4AA8-93CA-E835B40BE667}" type="datetimeFigureOut">
-              <a:rPr lang="en-US" smtClean="0"/>
-              <a:t>11/2/2017</a:t>
-            </a:fld>
-            <a:endParaRPr lang="en-US"/>
-          </a:p>
-        </p:txBody>
-      </p:sp>
-      <p:sp>
-        <p:nvSpPr>
-          <p:cNvPr id="6" name="Footer Placeholder 5">
-            <a:extLst>
-              <a:ext uri="{FF2B5EF4-FFF2-40B4-BE49-F238E27FC236}">
-                <a16:creationId xmlns:a16="http://schemas.microsoft.com/office/drawing/2014/main" id="{1317001D-2B7C-4C32-9209-92E10F0A5444}"/>
-              </a:ext>
-            </a:extLst>
-          </p:cNvPr>
-          <p:cNvSpPr>
-            <a:spLocks noGrp="1"/>
-          </p:cNvSpPr>
-          <p:nvPr>
-            <p:ph type="ftr" sz="quarter" idx="11"/>
-          </p:nvPr>
-        </p:nvSpPr>
-        <p:spPr/>
-        <p:txBody>
-          <a:bodyPr/>
-          <a:lstStyle/>
-          <a:p>
-            <a:endParaRPr lang="en-US"/>
-          </a:p>
-        </p:txBody>
-      </p:sp>
-      <p:sp>
-        <p:nvSpPr>
-          <p:cNvPr id="7" name="Slide Number Placeholder 6">
-            <a:extLst>
-              <a:ext uri="{FF2B5EF4-FFF2-40B4-BE49-F238E27FC236}">
-                <a16:creationId xmlns:a16="http://schemas.microsoft.com/office/drawing/2014/main" id="{03CDFDE6-A9E0-47D0-9169-872462EF3D01}"/>
-              </a:ext>
-            </a:extLst>
-          </p:cNvPr>
-          <p:cNvSpPr>
-            <a:spLocks noGrp="1"/>
-          </p:cNvSpPr>
-          <p:nvPr>
-            <p:ph type="sldNum" sz="quarter" idx="12"/>
-          </p:nvPr>
-        </p:nvSpPr>
-        <p:spPr/>
-        <p:txBody>
-          <a:bodyPr/>
-          <a:lstStyle/>
-          <a:p>
-            <a:fld id="{6427441B-EBD2-447D-AE1D-AD6F97A1CA52}" type="slidenum">
-              <a:rPr lang="en-US" smtClean="0"/>
-              <a:t>‹#›</a:t>
-            </a:fld>
-            <a:endParaRPr lang="en-US"/>
-          </a:p>
-        </p:txBody>
-      </p:sp>
-    </p:spTree>
-    <p:extLst>
-      <p:ext uri="{BB962C8B-B14F-4D97-AF65-F5344CB8AC3E}">
-        <p14:creationId xmlns:p14="http://schemas.microsoft.com/office/powerpoint/2010/main" val="1826425163"/>
-      </p:ext>
-    </p:extLst>
-  </p:cSld>
-  <p:clrMapOvr>
-    <a:masterClrMapping/>
-  </p:clrMapOvr>
-</p:sldLayout>
-</file>
-
-<file path=ppt/slideLayouts/slideLayout23.xml><?xml version="1.0" encoding="utf-8"?>
-<p:sldLayout xmlns:a="http://schemas.openxmlformats.org/drawingml/2006/main" xmlns:r="http://schemas.openxmlformats.org/officeDocument/2006/relationships" xmlns:p="http://schemas.openxmlformats.org/presentationml/2006/main" type="vertTx" preserve="1">
-  <p:cSld name="Title and Vertical Text">
-    <p:spTree>
-      <p:nvGrpSpPr>
-        <p:cNvPr id="1" name=""/>
-        <p:cNvGrpSpPr/>
-        <p:nvPr/>
-      </p:nvGrpSpPr>
-      <p:grpSpPr>
-        <a:xfrm>
-          <a:off x="0" y="0"/>
-          <a:ext cx="0" cy="0"/>
-          <a:chOff x="0" y="0"/>
-          <a:chExt cx="0" cy="0"/>
-        </a:xfrm>
-      </p:grpSpPr>
-      <p:sp>
-        <p:nvSpPr>
-          <p:cNvPr id="2" name="Title 1">
-            <a:extLst>
-              <a:ext uri="{FF2B5EF4-FFF2-40B4-BE49-F238E27FC236}">
-                <a16:creationId xmlns:a16="http://schemas.microsoft.com/office/drawing/2014/main" id="{B87EDF1D-A2D2-4D88-AA76-3736A561351E}"/>
-              </a:ext>
-            </a:extLst>
-          </p:cNvPr>
-          <p:cNvSpPr>
-            <a:spLocks noGrp="1"/>
-          </p:cNvSpPr>
-          <p:nvPr>
-            <p:ph type="title"/>
-          </p:nvPr>
-        </p:nvSpPr>
-        <p:spPr/>
-        <p:txBody>
-          <a:bodyPr/>
-          <a:lstStyle/>
-          <a:p>
-            <a:r>
-              <a:rPr lang="en-US"/>
-              <a:t>Click to edit Master title style</a:t>
-            </a:r>
-          </a:p>
-        </p:txBody>
-      </p:sp>
-      <p:sp>
-        <p:nvSpPr>
-          <p:cNvPr id="3" name="Vertical Text Placeholder 2">
-            <a:extLst>
-              <a:ext uri="{FF2B5EF4-FFF2-40B4-BE49-F238E27FC236}">
-                <a16:creationId xmlns:a16="http://schemas.microsoft.com/office/drawing/2014/main" id="{122D4B26-F186-41D9-AC40-AD9F0210D333}"/>
-              </a:ext>
-            </a:extLst>
-          </p:cNvPr>
-          <p:cNvSpPr>
-            <a:spLocks noGrp="1"/>
-          </p:cNvSpPr>
-          <p:nvPr>
-            <p:ph type="body" orient="vert" idx="1"/>
-          </p:nvPr>
-        </p:nvSpPr>
-        <p:spPr/>
-        <p:txBody>
-          <a:bodyPr vert="eaVert"/>
-          <a:lstStyle/>
-          <a:p>
-            <a:pPr lvl="0"/>
-            <a:r>
-              <a:rPr lang="en-US"/>
-              <a:t>Edit Master text styles</a:t>
-            </a:r>
-          </a:p>
-          <a:p>
-            <a:pPr lvl="1"/>
-            <a:r>
-              <a:rPr lang="en-US"/>
-              <a:t>Second level</a:t>
-            </a:r>
-          </a:p>
-          <a:p>
-            <a:pPr lvl="2"/>
-            <a:r>
-              <a:rPr lang="en-US"/>
-              <a:t>Third level</a:t>
-            </a:r>
-          </a:p>
-          <a:p>
-            <a:pPr lvl="3"/>
-            <a:r>
-              <a:rPr lang="en-US"/>
-              <a:t>Fourth level</a:t>
-            </a:r>
-          </a:p>
-          <a:p>
-            <a:pPr lvl="4"/>
-            <a:r>
-              <a:rPr lang="en-US"/>
-              <a:t>Fifth level</a:t>
-            </a:r>
-          </a:p>
-        </p:txBody>
-      </p:sp>
-      <p:sp>
-        <p:nvSpPr>
-          <p:cNvPr id="4" name="Date Placeholder 3">
-            <a:extLst>
-              <a:ext uri="{FF2B5EF4-FFF2-40B4-BE49-F238E27FC236}">
-                <a16:creationId xmlns:a16="http://schemas.microsoft.com/office/drawing/2014/main" id="{D73A0D7B-CF2D-4784-8BF2-4194618BE834}"/>
-              </a:ext>
-            </a:extLst>
-          </p:cNvPr>
-          <p:cNvSpPr>
-            <a:spLocks noGrp="1"/>
-          </p:cNvSpPr>
-          <p:nvPr>
-            <p:ph type="dt" sz="half" idx="10"/>
-          </p:nvPr>
-        </p:nvSpPr>
-        <p:spPr/>
-        <p:txBody>
-          <a:bodyPr/>
-          <a:lstStyle/>
-          <a:p>
-            <a:fld id="{5FB62F81-FD80-4AA8-93CA-E835B40BE667}" type="datetimeFigureOut">
-              <a:rPr lang="en-US" smtClean="0"/>
-              <a:t>11/2/2017</a:t>
-            </a:fld>
-            <a:endParaRPr lang="en-US"/>
-          </a:p>
-        </p:txBody>
-      </p:sp>
-      <p:sp>
-        <p:nvSpPr>
-          <p:cNvPr id="5" name="Footer Placeholder 4">
-            <a:extLst>
-              <a:ext uri="{FF2B5EF4-FFF2-40B4-BE49-F238E27FC236}">
-                <a16:creationId xmlns:a16="http://schemas.microsoft.com/office/drawing/2014/main" id="{073FDC74-B109-4DE9-9FD1-250BB00A38B6}"/>
-              </a:ext>
-            </a:extLst>
-          </p:cNvPr>
-          <p:cNvSpPr>
-            <a:spLocks noGrp="1"/>
-          </p:cNvSpPr>
-          <p:nvPr>
-            <p:ph type="ftr" sz="quarter" idx="11"/>
-          </p:nvPr>
-        </p:nvSpPr>
-        <p:spPr/>
-        <p:txBody>
-          <a:bodyPr/>
-          <a:lstStyle/>
-          <a:p>
-            <a:endParaRPr lang="en-US"/>
-          </a:p>
-        </p:txBody>
-      </p:sp>
-      <p:sp>
-        <p:nvSpPr>
-          <p:cNvPr id="6" name="Slide Number Placeholder 5">
-            <a:extLst>
-              <a:ext uri="{FF2B5EF4-FFF2-40B4-BE49-F238E27FC236}">
-                <a16:creationId xmlns:a16="http://schemas.microsoft.com/office/drawing/2014/main" id="{60DF9BB5-DD53-4702-A8B1-85175D633325}"/>
-              </a:ext>
-            </a:extLst>
-          </p:cNvPr>
-          <p:cNvSpPr>
-            <a:spLocks noGrp="1"/>
-          </p:cNvSpPr>
-          <p:nvPr>
-            <p:ph type="sldNum" sz="quarter" idx="12"/>
-          </p:nvPr>
-        </p:nvSpPr>
-        <p:spPr/>
-        <p:txBody>
-          <a:bodyPr/>
-          <a:lstStyle/>
-          <a:p>
-            <a:fld id="{6427441B-EBD2-447D-AE1D-AD6F97A1CA52}" type="slidenum">
-              <a:rPr lang="en-US" smtClean="0"/>
-              <a:t>‹#›</a:t>
-            </a:fld>
-            <a:endParaRPr lang="en-US"/>
-          </a:p>
-        </p:txBody>
-      </p:sp>
-    </p:spTree>
-    <p:extLst>
-      <p:ext uri="{BB962C8B-B14F-4D97-AF65-F5344CB8AC3E}">
-        <p14:creationId xmlns:p14="http://schemas.microsoft.com/office/powerpoint/2010/main" val="3661345977"/>
-      </p:ext>
-    </p:extLst>
-  </p:cSld>
-  <p:clrMapOvr>
-    <a:masterClrMapping/>
-  </p:clrMapOvr>
-</p:sldLayout>
-</file>
-
-<file path=ppt/slideLayouts/slideLayout24.xml><?xml version="1.0" encoding="utf-8"?>
-<p:sldLayout xmlns:a="http://schemas.openxmlformats.org/drawingml/2006/main" xmlns:r="http://schemas.openxmlformats.org/officeDocument/2006/relationships" xmlns:p="http://schemas.openxmlformats.org/presentationml/2006/main" type="vertTitleAndTx" preserve="1">
-  <p:cSld name="Vertical Title and Text">
-    <p:spTree>
-      <p:nvGrpSpPr>
-        <p:cNvPr id="1" name=""/>
-        <p:cNvGrpSpPr/>
-        <p:nvPr/>
-      </p:nvGrpSpPr>
-      <p:grpSpPr>
-        <a:xfrm>
-          <a:off x="0" y="0"/>
-          <a:ext cx="0" cy="0"/>
-          <a:chOff x="0" y="0"/>
-          <a:chExt cx="0" cy="0"/>
-        </a:xfrm>
-      </p:grpSpPr>
-      <p:sp>
-        <p:nvSpPr>
-          <p:cNvPr id="2" name="Vertical Title 1">
-            <a:extLst>
-              <a:ext uri="{FF2B5EF4-FFF2-40B4-BE49-F238E27FC236}">
-                <a16:creationId xmlns:a16="http://schemas.microsoft.com/office/drawing/2014/main" id="{6E06A5A5-DB12-437C-AB2F-D0045DBBF63F}"/>
-              </a:ext>
-            </a:extLst>
-          </p:cNvPr>
-          <p:cNvSpPr>
-            <a:spLocks noGrp="1"/>
-          </p:cNvSpPr>
-          <p:nvPr>
-            <p:ph type="title" orient="vert"/>
-          </p:nvPr>
-        </p:nvSpPr>
-        <p:spPr>
-          <a:xfrm>
-            <a:off x="6543675" y="365125"/>
-            <a:ext cx="1971675" cy="5811838"/>
-          </a:xfrm>
-        </p:spPr>
-        <p:txBody>
-          <a:bodyPr vert="eaVert"/>
-          <a:lstStyle/>
-          <a:p>
-            <a:r>
-              <a:rPr lang="en-US"/>
-              <a:t>Click to edit Master title style</a:t>
-            </a:r>
-          </a:p>
-        </p:txBody>
-      </p:sp>
-      <p:sp>
-        <p:nvSpPr>
-          <p:cNvPr id="3" name="Vertical Text Placeholder 2">
-            <a:extLst>
-              <a:ext uri="{FF2B5EF4-FFF2-40B4-BE49-F238E27FC236}">
-                <a16:creationId xmlns:a16="http://schemas.microsoft.com/office/drawing/2014/main" id="{70CEC960-BF96-4F15-9BBF-96B93A65F7B7}"/>
-              </a:ext>
-            </a:extLst>
-          </p:cNvPr>
-          <p:cNvSpPr>
-            <a:spLocks noGrp="1"/>
-          </p:cNvSpPr>
-          <p:nvPr>
-            <p:ph type="body" orient="vert" idx="1"/>
-          </p:nvPr>
-        </p:nvSpPr>
-        <p:spPr>
-          <a:xfrm>
-            <a:off x="628650" y="365125"/>
-            <a:ext cx="5800725" cy="5811838"/>
-          </a:xfrm>
-        </p:spPr>
-        <p:txBody>
-          <a:bodyPr vert="eaVert"/>
-          <a:lstStyle/>
-          <a:p>
-            <a:pPr lvl="0"/>
-            <a:r>
-              <a:rPr lang="en-US"/>
-              <a:t>Edit Master text styles</a:t>
-            </a:r>
-          </a:p>
-          <a:p>
-            <a:pPr lvl="1"/>
-            <a:r>
-              <a:rPr lang="en-US"/>
-              <a:t>Second level</a:t>
-            </a:r>
-          </a:p>
-          <a:p>
-            <a:pPr lvl="2"/>
-            <a:r>
-              <a:rPr lang="en-US"/>
-              <a:t>Third level</a:t>
-            </a:r>
-          </a:p>
-          <a:p>
-            <a:pPr lvl="3"/>
-            <a:r>
-              <a:rPr lang="en-US"/>
-              <a:t>Fourth level</a:t>
-            </a:r>
-          </a:p>
-          <a:p>
-            <a:pPr lvl="4"/>
-            <a:r>
-              <a:rPr lang="en-US"/>
-              <a:t>Fifth level</a:t>
-            </a:r>
-          </a:p>
-        </p:txBody>
-      </p:sp>
-      <p:sp>
-        <p:nvSpPr>
-          <p:cNvPr id="4" name="Date Placeholder 3">
-            <a:extLst>
-              <a:ext uri="{FF2B5EF4-FFF2-40B4-BE49-F238E27FC236}">
-                <a16:creationId xmlns:a16="http://schemas.microsoft.com/office/drawing/2014/main" id="{F2984198-A49F-4E6C-96F8-F3838E6D662A}"/>
-              </a:ext>
-            </a:extLst>
-          </p:cNvPr>
-          <p:cNvSpPr>
-            <a:spLocks noGrp="1"/>
-          </p:cNvSpPr>
-          <p:nvPr>
-            <p:ph type="dt" sz="half" idx="10"/>
-          </p:nvPr>
-        </p:nvSpPr>
-        <p:spPr/>
-        <p:txBody>
-          <a:bodyPr/>
-          <a:lstStyle/>
-          <a:p>
-            <a:fld id="{5FB62F81-FD80-4AA8-93CA-E835B40BE667}" type="datetimeFigureOut">
-              <a:rPr lang="en-US" smtClean="0"/>
-              <a:t>11/2/2017</a:t>
-            </a:fld>
-            <a:endParaRPr lang="en-US"/>
-          </a:p>
-        </p:txBody>
-      </p:sp>
-      <p:sp>
-        <p:nvSpPr>
-          <p:cNvPr id="5" name="Footer Placeholder 4">
-            <a:extLst>
-              <a:ext uri="{FF2B5EF4-FFF2-40B4-BE49-F238E27FC236}">
-                <a16:creationId xmlns:a16="http://schemas.microsoft.com/office/drawing/2014/main" id="{86CECD99-4493-400E-92BC-43836113D070}"/>
-              </a:ext>
-            </a:extLst>
-          </p:cNvPr>
-          <p:cNvSpPr>
-            <a:spLocks noGrp="1"/>
-          </p:cNvSpPr>
-          <p:nvPr>
-            <p:ph type="ftr" sz="quarter" idx="11"/>
-          </p:nvPr>
-        </p:nvSpPr>
-        <p:spPr/>
-        <p:txBody>
-          <a:bodyPr/>
-          <a:lstStyle/>
-          <a:p>
-            <a:endParaRPr lang="en-US"/>
-          </a:p>
-        </p:txBody>
-      </p:sp>
-      <p:sp>
-        <p:nvSpPr>
-          <p:cNvPr id="6" name="Slide Number Placeholder 5">
-            <a:extLst>
-              <a:ext uri="{FF2B5EF4-FFF2-40B4-BE49-F238E27FC236}">
-                <a16:creationId xmlns:a16="http://schemas.microsoft.com/office/drawing/2014/main" id="{D233D996-0A87-4973-B6BA-B5BC97B6F1A1}"/>
-              </a:ext>
-            </a:extLst>
-          </p:cNvPr>
-          <p:cNvSpPr>
-            <a:spLocks noGrp="1"/>
-          </p:cNvSpPr>
-          <p:nvPr>
-            <p:ph type="sldNum" sz="quarter" idx="12"/>
-          </p:nvPr>
-        </p:nvSpPr>
-        <p:spPr/>
-        <p:txBody>
-          <a:bodyPr/>
-          <a:lstStyle/>
-          <a:p>
-            <a:fld id="{6427441B-EBD2-447D-AE1D-AD6F97A1CA52}" type="slidenum">
-              <a:rPr lang="en-US" smtClean="0"/>
-              <a:t>‹#›</a:t>
-            </a:fld>
-            <a:endParaRPr lang="en-US"/>
-          </a:p>
-        </p:txBody>
-      </p:sp>
-    </p:spTree>
-    <p:extLst>
-      <p:ext uri="{BB962C8B-B14F-4D97-AF65-F5344CB8AC3E}">
-        <p14:creationId xmlns:p14="http://schemas.microsoft.com/office/powerpoint/2010/main" val="3237606489"/>
       </p:ext>
     </p:extLst>
   </p:cSld>
@@ -5045,7 +2125,7 @@
           <a:p>
             <a:fld id="{FB7712AD-3B21-4FE9-B722-CF9B0200D9B9}" type="datetimeFigureOut">
               <a:rPr lang="en-US" smtClean="0"/>
-              <a:t>11/2/2017</a:t>
+              <a:t>11/3/2017</a:t>
             </a:fld>
             <a:endParaRPr lang="en-US"/>
           </a:p>
@@ -5248,7 +2328,7 @@
           <a:p>
             <a:fld id="{FB7712AD-3B21-4FE9-B722-CF9B0200D9B9}" type="datetimeFigureOut">
               <a:rPr lang="en-US" smtClean="0"/>
-              <a:t>11/2/2017</a:t>
+              <a:t>11/3/2017</a:t>
             </a:fld>
             <a:endParaRPr lang="en-US"/>
           </a:p>
@@ -5545,7 +2625,7 @@
           <a:p>
             <a:fld id="{FB7712AD-3B21-4FE9-B722-CF9B0200D9B9}" type="datetimeFigureOut">
               <a:rPr lang="en-US" smtClean="0"/>
-              <a:t>11/2/2017</a:t>
+              <a:t>11/3/2017</a:t>
             </a:fld>
             <a:endParaRPr lang="en-US"/>
           </a:p>
@@ -5981,7 +3061,7 @@
           <a:p>
             <a:fld id="{FB7712AD-3B21-4FE9-B722-CF9B0200D9B9}" type="datetimeFigureOut">
               <a:rPr lang="en-US" smtClean="0"/>
-              <a:t>11/2/2017</a:t>
+              <a:t>11/3/2017</a:t>
             </a:fld>
             <a:endParaRPr lang="en-US"/>
           </a:p>
@@ -6110,7 +3190,7 @@
           <a:p>
             <a:fld id="{FB7712AD-3B21-4FE9-B722-CF9B0200D9B9}" type="datetimeFigureOut">
               <a:rPr lang="en-US" smtClean="0"/>
-              <a:t>11/2/2017</a:t>
+              <a:t>11/3/2017</a:t>
             </a:fld>
             <a:endParaRPr lang="en-US"/>
           </a:p>
@@ -6217,7 +3297,7 @@
           <a:p>
             <a:fld id="{FB7712AD-3B21-4FE9-B722-CF9B0200D9B9}" type="datetimeFigureOut">
               <a:rPr lang="en-US" smtClean="0"/>
-              <a:t>11/2/2017</a:t>
+              <a:t>11/3/2017</a:t>
             </a:fld>
             <a:endParaRPr lang="en-US"/>
           </a:p>
@@ -6504,7 +3584,7 @@
           <a:p>
             <a:fld id="{FB7712AD-3B21-4FE9-B722-CF9B0200D9B9}" type="datetimeFigureOut">
               <a:rPr lang="en-US" smtClean="0"/>
-              <a:t>11/2/2017</a:t>
+              <a:t>11/3/2017</a:t>
             </a:fld>
             <a:endParaRPr lang="en-US"/>
           </a:p>
@@ -6830,7 +3910,7 @@
           <a:p>
             <a:fld id="{FB7712AD-3B21-4FE9-B722-CF9B0200D9B9}" type="datetimeFigureOut">
               <a:rPr lang="en-US" smtClean="0"/>
-              <a:t>11/2/2017</a:t>
+              <a:t>11/3/2017</a:t>
             </a:fld>
             <a:endParaRPr lang="en-US"/>
           </a:p>
@@ -7363,574 +4443,6 @@
 </p:sldMaster>
 </file>
 
-<file path=ppt/slideMasters/slideMaster2.xml><?xml version="1.0" encoding="utf-8"?>
-<p:sldMaster xmlns:a="http://schemas.openxmlformats.org/drawingml/2006/main" xmlns:r="http://schemas.openxmlformats.org/officeDocument/2006/relationships" xmlns:p="http://schemas.openxmlformats.org/presentationml/2006/main">
-  <p:cSld>
-    <p:bg>
-      <p:bgRef idx="1001">
-        <a:schemeClr val="bg1"/>
-      </p:bgRef>
-    </p:bg>
-    <p:spTree>
-      <p:nvGrpSpPr>
-        <p:cNvPr id="1" name=""/>
-        <p:cNvGrpSpPr/>
-        <p:nvPr/>
-      </p:nvGrpSpPr>
-      <p:grpSpPr>
-        <a:xfrm>
-          <a:off x="0" y="0"/>
-          <a:ext cx="0" cy="0"/>
-          <a:chOff x="0" y="0"/>
-          <a:chExt cx="0" cy="0"/>
-        </a:xfrm>
-      </p:grpSpPr>
-      <p:sp>
-        <p:nvSpPr>
-          <p:cNvPr id="2" name="Title Placeholder 1">
-            <a:extLst>
-              <a:ext uri="{FF2B5EF4-FFF2-40B4-BE49-F238E27FC236}">
-                <a16:creationId xmlns:a16="http://schemas.microsoft.com/office/drawing/2014/main" id="{F4587AF0-3135-47FC-B6B8-5B68DF5C797B}"/>
-              </a:ext>
-            </a:extLst>
-          </p:cNvPr>
-          <p:cNvSpPr>
-            <a:spLocks noGrp="1"/>
-          </p:cNvSpPr>
-          <p:nvPr>
-            <p:ph type="title"/>
-          </p:nvPr>
-        </p:nvSpPr>
-        <p:spPr>
-          <a:xfrm>
-            <a:off x="628650" y="365126"/>
-            <a:ext cx="7886700" cy="1325563"/>
-          </a:xfrm>
-          <a:prstGeom prst="rect">
-            <a:avLst/>
-          </a:prstGeom>
-        </p:spPr>
-        <p:txBody>
-          <a:bodyPr vert="horz" lIns="91440" tIns="45720" rIns="91440" bIns="45720" rtlCol="0" anchor="ctr">
-            <a:normAutofit/>
-          </a:bodyPr>
-          <a:lstStyle/>
-          <a:p>
-            <a:r>
-              <a:rPr lang="en-US"/>
-              <a:t>Click to edit Master title style</a:t>
-            </a:r>
-          </a:p>
-        </p:txBody>
-      </p:sp>
-      <p:sp>
-        <p:nvSpPr>
-          <p:cNvPr id="3" name="Text Placeholder 2">
-            <a:extLst>
-              <a:ext uri="{FF2B5EF4-FFF2-40B4-BE49-F238E27FC236}">
-                <a16:creationId xmlns:a16="http://schemas.microsoft.com/office/drawing/2014/main" id="{27C1E50F-5482-4F90-8AD6-CBF9F335B542}"/>
-              </a:ext>
-            </a:extLst>
-          </p:cNvPr>
-          <p:cNvSpPr>
-            <a:spLocks noGrp="1"/>
-          </p:cNvSpPr>
-          <p:nvPr>
-            <p:ph type="body" idx="1"/>
-          </p:nvPr>
-        </p:nvSpPr>
-        <p:spPr>
-          <a:xfrm>
-            <a:off x="628650" y="1825625"/>
-            <a:ext cx="7886700" cy="4351338"/>
-          </a:xfrm>
-          <a:prstGeom prst="rect">
-            <a:avLst/>
-          </a:prstGeom>
-        </p:spPr>
-        <p:txBody>
-          <a:bodyPr vert="horz" lIns="91440" tIns="45720" rIns="91440" bIns="45720" rtlCol="0">
-            <a:normAutofit/>
-          </a:bodyPr>
-          <a:lstStyle/>
-          <a:p>
-            <a:pPr lvl="0"/>
-            <a:r>
-              <a:rPr lang="en-US"/>
-              <a:t>Edit Master text styles</a:t>
-            </a:r>
-          </a:p>
-          <a:p>
-            <a:pPr lvl="1"/>
-            <a:r>
-              <a:rPr lang="en-US"/>
-              <a:t>Second level</a:t>
-            </a:r>
-          </a:p>
-          <a:p>
-            <a:pPr lvl="2"/>
-            <a:r>
-              <a:rPr lang="en-US"/>
-              <a:t>Third level</a:t>
-            </a:r>
-          </a:p>
-          <a:p>
-            <a:pPr lvl="3"/>
-            <a:r>
-              <a:rPr lang="en-US"/>
-              <a:t>Fourth level</a:t>
-            </a:r>
-          </a:p>
-          <a:p>
-            <a:pPr lvl="4"/>
-            <a:r>
-              <a:rPr lang="en-US"/>
-              <a:t>Fifth level</a:t>
-            </a:r>
-          </a:p>
-        </p:txBody>
-      </p:sp>
-      <p:sp>
-        <p:nvSpPr>
-          <p:cNvPr id="4" name="Date Placeholder 3">
-            <a:extLst>
-              <a:ext uri="{FF2B5EF4-FFF2-40B4-BE49-F238E27FC236}">
-                <a16:creationId xmlns:a16="http://schemas.microsoft.com/office/drawing/2014/main" id="{5B03621F-6A3B-4B43-85D8-17930912E944}"/>
-              </a:ext>
-            </a:extLst>
-          </p:cNvPr>
-          <p:cNvSpPr>
-            <a:spLocks noGrp="1"/>
-          </p:cNvSpPr>
-          <p:nvPr>
-            <p:ph type="dt" sz="half" idx="2"/>
-          </p:nvPr>
-        </p:nvSpPr>
-        <p:spPr>
-          <a:xfrm>
-            <a:off x="628650" y="6356351"/>
-            <a:ext cx="2057400" cy="365125"/>
-          </a:xfrm>
-          <a:prstGeom prst="rect">
-            <a:avLst/>
-          </a:prstGeom>
-        </p:spPr>
-        <p:txBody>
-          <a:bodyPr vert="horz" lIns="91440" tIns="45720" rIns="91440" bIns="45720" rtlCol="0" anchor="ctr"/>
-          <a:lstStyle>
-            <a:lvl1pPr algn="l">
-              <a:defRPr sz="900">
-                <a:solidFill>
-                  <a:schemeClr val="tx1">
-                    <a:tint val="75000"/>
-                  </a:schemeClr>
-                </a:solidFill>
-              </a:defRPr>
-            </a:lvl1pPr>
-          </a:lstStyle>
-          <a:p>
-            <a:fld id="{5FB62F81-FD80-4AA8-93CA-E835B40BE667}" type="datetimeFigureOut">
-              <a:rPr lang="en-US" smtClean="0"/>
-              <a:t>11/2/2017</a:t>
-            </a:fld>
-            <a:endParaRPr lang="en-US"/>
-          </a:p>
-        </p:txBody>
-      </p:sp>
-      <p:sp>
-        <p:nvSpPr>
-          <p:cNvPr id="5" name="Footer Placeholder 4">
-            <a:extLst>
-              <a:ext uri="{FF2B5EF4-FFF2-40B4-BE49-F238E27FC236}">
-                <a16:creationId xmlns:a16="http://schemas.microsoft.com/office/drawing/2014/main" id="{D6BEA281-9CF8-4A62-B638-7E977FE178CA}"/>
-              </a:ext>
-            </a:extLst>
-          </p:cNvPr>
-          <p:cNvSpPr>
-            <a:spLocks noGrp="1"/>
-          </p:cNvSpPr>
-          <p:nvPr>
-            <p:ph type="ftr" sz="quarter" idx="3"/>
-          </p:nvPr>
-        </p:nvSpPr>
-        <p:spPr>
-          <a:xfrm>
-            <a:off x="3028950" y="6356351"/>
-            <a:ext cx="3086100" cy="365125"/>
-          </a:xfrm>
-          <a:prstGeom prst="rect">
-            <a:avLst/>
-          </a:prstGeom>
-        </p:spPr>
-        <p:txBody>
-          <a:bodyPr vert="horz" lIns="91440" tIns="45720" rIns="91440" bIns="45720" rtlCol="0" anchor="ctr"/>
-          <a:lstStyle>
-            <a:lvl1pPr algn="ctr">
-              <a:defRPr sz="900">
-                <a:solidFill>
-                  <a:schemeClr val="tx1">
-                    <a:tint val="75000"/>
-                  </a:schemeClr>
-                </a:solidFill>
-              </a:defRPr>
-            </a:lvl1pPr>
-          </a:lstStyle>
-          <a:p>
-            <a:endParaRPr lang="en-US"/>
-          </a:p>
-        </p:txBody>
-      </p:sp>
-      <p:sp>
-        <p:nvSpPr>
-          <p:cNvPr id="6" name="Slide Number Placeholder 5">
-            <a:extLst>
-              <a:ext uri="{FF2B5EF4-FFF2-40B4-BE49-F238E27FC236}">
-                <a16:creationId xmlns:a16="http://schemas.microsoft.com/office/drawing/2014/main" id="{478F2AB1-9C57-48F5-8977-2FB1E18599BA}"/>
-              </a:ext>
-            </a:extLst>
-          </p:cNvPr>
-          <p:cNvSpPr>
-            <a:spLocks noGrp="1"/>
-          </p:cNvSpPr>
-          <p:nvPr>
-            <p:ph type="sldNum" sz="quarter" idx="4"/>
-          </p:nvPr>
-        </p:nvSpPr>
-        <p:spPr>
-          <a:xfrm>
-            <a:off x="6457950" y="6356351"/>
-            <a:ext cx="2057400" cy="365125"/>
-          </a:xfrm>
-          <a:prstGeom prst="rect">
-            <a:avLst/>
-          </a:prstGeom>
-        </p:spPr>
-        <p:txBody>
-          <a:bodyPr vert="horz" lIns="91440" tIns="45720" rIns="91440" bIns="45720" rtlCol="0" anchor="ctr"/>
-          <a:lstStyle>
-            <a:lvl1pPr algn="r">
-              <a:defRPr sz="900">
-                <a:solidFill>
-                  <a:schemeClr val="tx1">
-                    <a:tint val="75000"/>
-                  </a:schemeClr>
-                </a:solidFill>
-              </a:defRPr>
-            </a:lvl1pPr>
-          </a:lstStyle>
-          <a:p>
-            <a:fld id="{6427441B-EBD2-447D-AE1D-AD6F97A1CA52}" type="slidenum">
-              <a:rPr lang="en-US" smtClean="0"/>
-              <a:t>‹#›</a:t>
-            </a:fld>
-            <a:endParaRPr lang="en-US"/>
-          </a:p>
-        </p:txBody>
-      </p:sp>
-    </p:spTree>
-    <p:extLst>
-      <p:ext uri="{BB962C8B-B14F-4D97-AF65-F5344CB8AC3E}">
-        <p14:creationId xmlns:p14="http://schemas.microsoft.com/office/powerpoint/2010/main" val="611922898"/>
-      </p:ext>
-    </p:extLst>
-  </p:cSld>
-  <p:clrMap bg1="lt1" tx1="dk1" bg2="lt2" tx2="dk2" accent1="accent1" accent2="accent2" accent3="accent3" accent4="accent4" accent5="accent5" accent6="accent6" hlink="hlink" folHlink="folHlink"/>
-  <p:sldLayoutIdLst>
-    <p:sldLayoutId id="2147483676" r:id="rId1"/>
-    <p:sldLayoutId id="2147483677" r:id="rId2"/>
-    <p:sldLayoutId id="2147483678" r:id="rId3"/>
-    <p:sldLayoutId id="2147483679" r:id="rId4"/>
-    <p:sldLayoutId id="2147483680" r:id="rId5"/>
-    <p:sldLayoutId id="2147483681" r:id="rId6"/>
-    <p:sldLayoutId id="2147483682" r:id="rId7"/>
-    <p:sldLayoutId id="2147483683" r:id="rId8"/>
-    <p:sldLayoutId id="2147483684" r:id="rId9"/>
-    <p:sldLayoutId id="2147483685" r:id="rId10"/>
-    <p:sldLayoutId id="2147483686" r:id="rId11"/>
-  </p:sldLayoutIdLst>
-  <p:txStyles>
-    <p:titleStyle>
-      <a:lvl1pPr algn="l" defTabSz="685800" rtl="0" eaLnBrk="1" latinLnBrk="0" hangingPunct="1">
-        <a:lnSpc>
-          <a:spcPct val="90000"/>
-        </a:lnSpc>
-        <a:spcBef>
-          <a:spcPct val="0"/>
-        </a:spcBef>
-        <a:buNone/>
-        <a:defRPr sz="3300" kern="1200">
-          <a:solidFill>
-            <a:schemeClr val="tx1"/>
-          </a:solidFill>
-          <a:latin typeface="+mj-lt"/>
-          <a:ea typeface="+mj-ea"/>
-          <a:cs typeface="+mj-cs"/>
-        </a:defRPr>
-      </a:lvl1pPr>
-    </p:titleStyle>
-    <p:bodyStyle>
-      <a:lvl1pPr marL="171450" indent="-171450" algn="l" defTabSz="685800" rtl="0" eaLnBrk="1" latinLnBrk="0" hangingPunct="1">
-        <a:lnSpc>
-          <a:spcPct val="90000"/>
-        </a:lnSpc>
-        <a:spcBef>
-          <a:spcPts val="750"/>
-        </a:spcBef>
-        <a:buFont typeface="Arial" panose="020B0604020202020204" pitchFamily="34" charset="0"/>
-        <a:buChar char="•"/>
-        <a:defRPr sz="2100" kern="1200">
-          <a:solidFill>
-            <a:schemeClr val="tx1"/>
-          </a:solidFill>
-          <a:latin typeface="+mn-lt"/>
-          <a:ea typeface="+mn-ea"/>
-          <a:cs typeface="+mn-cs"/>
-        </a:defRPr>
-      </a:lvl1pPr>
-      <a:lvl2pPr marL="514350" indent="-171450" algn="l" defTabSz="685800" rtl="0" eaLnBrk="1" latinLnBrk="0" hangingPunct="1">
-        <a:lnSpc>
-          <a:spcPct val="90000"/>
-        </a:lnSpc>
-        <a:spcBef>
-          <a:spcPts val="375"/>
-        </a:spcBef>
-        <a:buFont typeface="Arial" panose="020B0604020202020204" pitchFamily="34" charset="0"/>
-        <a:buChar char="•"/>
-        <a:defRPr sz="1800" kern="1200">
-          <a:solidFill>
-            <a:schemeClr val="tx1"/>
-          </a:solidFill>
-          <a:latin typeface="+mn-lt"/>
-          <a:ea typeface="+mn-ea"/>
-          <a:cs typeface="+mn-cs"/>
-        </a:defRPr>
-      </a:lvl2pPr>
-      <a:lvl3pPr marL="857250" indent="-171450" algn="l" defTabSz="685800" rtl="0" eaLnBrk="1" latinLnBrk="0" hangingPunct="1">
-        <a:lnSpc>
-          <a:spcPct val="90000"/>
-        </a:lnSpc>
-        <a:spcBef>
-          <a:spcPts val="375"/>
-        </a:spcBef>
-        <a:buFont typeface="Arial" panose="020B0604020202020204" pitchFamily="34" charset="0"/>
-        <a:buChar char="•"/>
-        <a:defRPr sz="1500" kern="1200">
-          <a:solidFill>
-            <a:schemeClr val="tx1"/>
-          </a:solidFill>
-          <a:latin typeface="+mn-lt"/>
-          <a:ea typeface="+mn-ea"/>
-          <a:cs typeface="+mn-cs"/>
-        </a:defRPr>
-      </a:lvl3pPr>
-      <a:lvl4pPr marL="1200150" indent="-171450" algn="l" defTabSz="685800" rtl="0" eaLnBrk="1" latinLnBrk="0" hangingPunct="1">
-        <a:lnSpc>
-          <a:spcPct val="90000"/>
-        </a:lnSpc>
-        <a:spcBef>
-          <a:spcPts val="375"/>
-        </a:spcBef>
-        <a:buFont typeface="Arial" panose="020B0604020202020204" pitchFamily="34" charset="0"/>
-        <a:buChar char="•"/>
-        <a:defRPr sz="1350" kern="1200">
-          <a:solidFill>
-            <a:schemeClr val="tx1"/>
-          </a:solidFill>
-          <a:latin typeface="+mn-lt"/>
-          <a:ea typeface="+mn-ea"/>
-          <a:cs typeface="+mn-cs"/>
-        </a:defRPr>
-      </a:lvl4pPr>
-      <a:lvl5pPr marL="1543050" indent="-171450" algn="l" defTabSz="685800" rtl="0" eaLnBrk="1" latinLnBrk="0" hangingPunct="1">
-        <a:lnSpc>
-          <a:spcPct val="90000"/>
-        </a:lnSpc>
-        <a:spcBef>
-          <a:spcPts val="375"/>
-        </a:spcBef>
-        <a:buFont typeface="Arial" panose="020B0604020202020204" pitchFamily="34" charset="0"/>
-        <a:buChar char="•"/>
-        <a:defRPr sz="1350" kern="1200">
-          <a:solidFill>
-            <a:schemeClr val="tx1"/>
-          </a:solidFill>
-          <a:latin typeface="+mn-lt"/>
-          <a:ea typeface="+mn-ea"/>
-          <a:cs typeface="+mn-cs"/>
-        </a:defRPr>
-      </a:lvl5pPr>
-      <a:lvl6pPr marL="1885950" indent="-171450" algn="l" defTabSz="685800" rtl="0" eaLnBrk="1" latinLnBrk="0" hangingPunct="1">
-        <a:lnSpc>
-          <a:spcPct val="90000"/>
-        </a:lnSpc>
-        <a:spcBef>
-          <a:spcPts val="375"/>
-        </a:spcBef>
-        <a:buFont typeface="Arial" panose="020B0604020202020204" pitchFamily="34" charset="0"/>
-        <a:buChar char="•"/>
-        <a:defRPr sz="1350" kern="1200">
-          <a:solidFill>
-            <a:schemeClr val="tx1"/>
-          </a:solidFill>
-          <a:latin typeface="+mn-lt"/>
-          <a:ea typeface="+mn-ea"/>
-          <a:cs typeface="+mn-cs"/>
-        </a:defRPr>
-      </a:lvl6pPr>
-      <a:lvl7pPr marL="2228850" indent="-171450" algn="l" defTabSz="685800" rtl="0" eaLnBrk="1" latinLnBrk="0" hangingPunct="1">
-        <a:lnSpc>
-          <a:spcPct val="90000"/>
-        </a:lnSpc>
-        <a:spcBef>
-          <a:spcPts val="375"/>
-        </a:spcBef>
-        <a:buFont typeface="Arial" panose="020B0604020202020204" pitchFamily="34" charset="0"/>
-        <a:buChar char="•"/>
-        <a:defRPr sz="1350" kern="1200">
-          <a:solidFill>
-            <a:schemeClr val="tx1"/>
-          </a:solidFill>
-          <a:latin typeface="+mn-lt"/>
-          <a:ea typeface="+mn-ea"/>
-          <a:cs typeface="+mn-cs"/>
-        </a:defRPr>
-      </a:lvl7pPr>
-      <a:lvl8pPr marL="2571750" indent="-171450" algn="l" defTabSz="685800" rtl="0" eaLnBrk="1" latinLnBrk="0" hangingPunct="1">
-        <a:lnSpc>
-          <a:spcPct val="90000"/>
-        </a:lnSpc>
-        <a:spcBef>
-          <a:spcPts val="375"/>
-        </a:spcBef>
-        <a:buFont typeface="Arial" panose="020B0604020202020204" pitchFamily="34" charset="0"/>
-        <a:buChar char="•"/>
-        <a:defRPr sz="1350" kern="1200">
-          <a:solidFill>
-            <a:schemeClr val="tx1"/>
-          </a:solidFill>
-          <a:latin typeface="+mn-lt"/>
-          <a:ea typeface="+mn-ea"/>
-          <a:cs typeface="+mn-cs"/>
-        </a:defRPr>
-      </a:lvl8pPr>
-      <a:lvl9pPr marL="2914650" indent="-171450" algn="l" defTabSz="685800" rtl="0" eaLnBrk="1" latinLnBrk="0" hangingPunct="1">
-        <a:lnSpc>
-          <a:spcPct val="90000"/>
-        </a:lnSpc>
-        <a:spcBef>
-          <a:spcPts val="375"/>
-        </a:spcBef>
-        <a:buFont typeface="Arial" panose="020B0604020202020204" pitchFamily="34" charset="0"/>
-        <a:buChar char="•"/>
-        <a:defRPr sz="1350" kern="1200">
-          <a:solidFill>
-            <a:schemeClr val="tx1"/>
-          </a:solidFill>
-          <a:latin typeface="+mn-lt"/>
-          <a:ea typeface="+mn-ea"/>
-          <a:cs typeface="+mn-cs"/>
-        </a:defRPr>
-      </a:lvl9pPr>
-    </p:bodyStyle>
-    <p:otherStyle>
-      <a:defPPr>
-        <a:defRPr lang="en-US"/>
-      </a:defPPr>
-      <a:lvl1pPr marL="0" algn="l" defTabSz="685800" rtl="0" eaLnBrk="1" latinLnBrk="0" hangingPunct="1">
-        <a:defRPr sz="1350" kern="1200">
-          <a:solidFill>
-            <a:schemeClr val="tx1"/>
-          </a:solidFill>
-          <a:latin typeface="+mn-lt"/>
-          <a:ea typeface="+mn-ea"/>
-          <a:cs typeface="+mn-cs"/>
-        </a:defRPr>
-      </a:lvl1pPr>
-      <a:lvl2pPr marL="342900" algn="l" defTabSz="685800" rtl="0" eaLnBrk="1" latinLnBrk="0" hangingPunct="1">
-        <a:defRPr sz="1350" kern="1200">
-          <a:solidFill>
-            <a:schemeClr val="tx1"/>
-          </a:solidFill>
-          <a:latin typeface="+mn-lt"/>
-          <a:ea typeface="+mn-ea"/>
-          <a:cs typeface="+mn-cs"/>
-        </a:defRPr>
-      </a:lvl2pPr>
-      <a:lvl3pPr marL="685800" algn="l" defTabSz="685800" rtl="0" eaLnBrk="1" latinLnBrk="0" hangingPunct="1">
-        <a:defRPr sz="1350" kern="1200">
-          <a:solidFill>
-            <a:schemeClr val="tx1"/>
-          </a:solidFill>
-          <a:latin typeface="+mn-lt"/>
-          <a:ea typeface="+mn-ea"/>
-          <a:cs typeface="+mn-cs"/>
-        </a:defRPr>
-      </a:lvl3pPr>
-      <a:lvl4pPr marL="1028700" algn="l" defTabSz="685800" rtl="0" eaLnBrk="1" latinLnBrk="0" hangingPunct="1">
-        <a:defRPr sz="1350" kern="1200">
-          <a:solidFill>
-            <a:schemeClr val="tx1"/>
-          </a:solidFill>
-          <a:latin typeface="+mn-lt"/>
-          <a:ea typeface="+mn-ea"/>
-          <a:cs typeface="+mn-cs"/>
-        </a:defRPr>
-      </a:lvl4pPr>
-      <a:lvl5pPr marL="1371600" algn="l" defTabSz="685800" rtl="0" eaLnBrk="1" latinLnBrk="0" hangingPunct="1">
-        <a:defRPr sz="1350" kern="1200">
-          <a:solidFill>
-            <a:schemeClr val="tx1"/>
-          </a:solidFill>
-          <a:latin typeface="+mn-lt"/>
-          <a:ea typeface="+mn-ea"/>
-          <a:cs typeface="+mn-cs"/>
-        </a:defRPr>
-      </a:lvl5pPr>
-      <a:lvl6pPr marL="1714500" algn="l" defTabSz="685800" rtl="0" eaLnBrk="1" latinLnBrk="0" hangingPunct="1">
-        <a:defRPr sz="1350" kern="1200">
-          <a:solidFill>
-            <a:schemeClr val="tx1"/>
-          </a:solidFill>
-          <a:latin typeface="+mn-lt"/>
-          <a:ea typeface="+mn-ea"/>
-          <a:cs typeface="+mn-cs"/>
-        </a:defRPr>
-      </a:lvl6pPr>
-      <a:lvl7pPr marL="2057400" algn="l" defTabSz="685800" rtl="0" eaLnBrk="1" latinLnBrk="0" hangingPunct="1">
-        <a:defRPr sz="1350" kern="1200">
-          <a:solidFill>
-            <a:schemeClr val="tx1"/>
-          </a:solidFill>
-          <a:latin typeface="+mn-lt"/>
-          <a:ea typeface="+mn-ea"/>
-          <a:cs typeface="+mn-cs"/>
-        </a:defRPr>
-      </a:lvl7pPr>
-      <a:lvl8pPr marL="2400300" algn="l" defTabSz="685800" rtl="0" eaLnBrk="1" latinLnBrk="0" hangingPunct="1">
-        <a:defRPr sz="1350" kern="1200">
-          <a:solidFill>
-            <a:schemeClr val="tx1"/>
-          </a:solidFill>
-          <a:latin typeface="+mn-lt"/>
-          <a:ea typeface="+mn-ea"/>
-          <a:cs typeface="+mn-cs"/>
-        </a:defRPr>
-      </a:lvl8pPr>
-      <a:lvl9pPr marL="2743200" algn="l" defTabSz="685800" rtl="0" eaLnBrk="1" latinLnBrk="0" hangingPunct="1">
-        <a:defRPr sz="1350" kern="1200">
-          <a:solidFill>
-            <a:schemeClr val="tx1"/>
-          </a:solidFill>
-          <a:latin typeface="+mn-lt"/>
-          <a:ea typeface="+mn-ea"/>
-          <a:cs typeface="+mn-cs"/>
-        </a:defRPr>
-      </a:lvl9pPr>
-    </p:otherStyle>
-  </p:txStyles>
-</p:sldMaster>
-</file>
-
 <file path=ppt/slides/slide1.xml><?xml version="1.0" encoding="utf-8"?>
 <p:sld xmlns:a="http://schemas.openxmlformats.org/drawingml/2006/main" xmlns:r="http://schemas.openxmlformats.org/officeDocument/2006/relationships" xmlns:p="http://schemas.openxmlformats.org/presentationml/2006/main">
   <p:cSld>
@@ -13533,16 +10045,6 @@
 <file path=ppt/slides/slide35.xml><?xml version="1.0" encoding="utf-8"?>
 <p:sld xmlns:a="http://schemas.openxmlformats.org/drawingml/2006/main" xmlns:r="http://schemas.openxmlformats.org/officeDocument/2006/relationships" xmlns:p="http://schemas.openxmlformats.org/presentationml/2006/main">
   <p:cSld>
-    <p:bg>
-      <p:bgPr>
-        <a:solidFill>
-          <a:schemeClr val="bg1">
-            <a:lumMod val="75000"/>
-          </a:schemeClr>
-        </a:solidFill>
-        <a:effectLst/>
-      </p:bgPr>
-    </p:bg>
     <p:spTree>
       <p:nvGrpSpPr>
         <p:cNvPr id="1" name=""/>
@@ -13567,58 +10069,14 @@
             <p:ph type="ctrTitle"/>
           </p:nvPr>
         </p:nvSpPr>
-        <p:spPr>
-          <a:xfrm>
-            <a:off x="1143000" y="1699022"/>
-            <a:ext cx="6858000" cy="1790700"/>
-          </a:xfrm>
-        </p:spPr>
-        <p:txBody>
-          <a:bodyPr>
-            <a:normAutofit/>
-          </a:bodyPr>
+        <p:spPr/>
+        <p:txBody>
+          <a:bodyPr/>
           <a:lstStyle/>
           <a:p>
             <a:r>
-              <a:rPr lang="en-US" sz="3600" dirty="0"/>
-              <a:t>Start Session 28</a:t>
-            </a:r>
-          </a:p>
-        </p:txBody>
-      </p:sp>
-      <p:sp>
-        <p:nvSpPr>
-          <p:cNvPr id="3" name="Subtitle 2"/>
-          <p:cNvSpPr>
-            <a:spLocks noGrp="1"/>
-          </p:cNvSpPr>
-          <p:nvPr>
-            <p:ph type="subTitle" idx="1"/>
-          </p:nvPr>
-        </p:nvSpPr>
-        <p:spPr>
-          <a:xfrm>
-            <a:off x="1143000" y="3558778"/>
-            <a:ext cx="6858000" cy="1648517"/>
-          </a:xfrm>
-        </p:spPr>
-        <p:txBody>
-          <a:bodyPr>
-            <a:normAutofit/>
-          </a:bodyPr>
-          <a:lstStyle/>
-          <a:p>
-            <a:pPr algn="l"/>
-            <a:r>
-              <a:rPr lang="en-US" dirty="0"/>
-              <a:t>Course Number: CPSC-24700</a:t>
-            </a:r>
-          </a:p>
-          <a:p>
-            <a:pPr algn="l"/>
-            <a:r>
-              <a:rPr lang="en-US" dirty="0"/>
-              <a:t>Instructor: Eric Pogue</a:t>
+              <a:rPr lang="en-US" dirty="0"/>
+              <a:t>AJAX Security Issues</a:t>
             </a:r>
           </a:p>
         </p:txBody>
@@ -13626,7 +10084,7 @@
     </p:spTree>
     <p:extLst>
       <p:ext uri="{BB962C8B-B14F-4D97-AF65-F5344CB8AC3E}">
-        <p14:creationId xmlns:p14="http://schemas.microsoft.com/office/powerpoint/2010/main" val="2756752717"/>
+        <p14:creationId xmlns:p14="http://schemas.microsoft.com/office/powerpoint/2010/main" val="3917904633"/>
       </p:ext>
     </p:extLst>
   </p:cSld>
@@ -13655,30 +10113,128 @@
       </p:grpSpPr>
       <p:sp>
         <p:nvSpPr>
-          <p:cNvPr id="2" name="Title 1"/>
-          <p:cNvSpPr>
-            <a:spLocks noGrp="1"/>
-          </p:cNvSpPr>
-          <p:nvPr>
-            <p:ph type="ctrTitle"/>
-          </p:nvPr>
-        </p:nvSpPr>
-        <p:spPr/>
-        <p:txBody>
-          <a:bodyPr/>
+          <p:cNvPr id="5" name="Title 4"/>
+          <p:cNvSpPr>
+            <a:spLocks noGrp="1"/>
+          </p:cNvSpPr>
+          <p:nvPr>
+            <p:ph type="title"/>
+          </p:nvPr>
+        </p:nvSpPr>
+        <p:spPr/>
+        <p:txBody>
+          <a:bodyPr>
+            <a:noAutofit/>
+          </a:bodyPr>
           <a:lstStyle/>
           <a:p>
             <a:r>
               <a:rPr lang="en-US" dirty="0"/>
-              <a:t>AJAX Security Issues</a:t>
-            </a:r>
+              <a:t>Security and Ajax</a:t>
+            </a:r>
+          </a:p>
+        </p:txBody>
+      </p:sp>
+      <p:sp>
+        <p:nvSpPr>
+          <p:cNvPr id="6" name="Content Placeholder 5"/>
+          <p:cNvSpPr>
+            <a:spLocks noGrp="1"/>
+          </p:cNvSpPr>
+          <p:nvPr>
+            <p:ph idx="1"/>
+          </p:nvPr>
+        </p:nvSpPr>
+        <p:spPr/>
+        <p:txBody>
+          <a:bodyPr>
+            <a:normAutofit/>
+          </a:bodyPr>
+          <a:lstStyle/>
+          <a:p>
+            <a:r>
+              <a:rPr lang="en-US" dirty="0"/>
+              <a:t>Some security issues to keep in mind when using Ajax:</a:t>
+            </a:r>
+          </a:p>
+          <a:p>
+            <a:endParaRPr lang="en-US" dirty="0"/>
+          </a:p>
+          <a:p>
+            <a:r>
+              <a:rPr lang="en-US" dirty="0"/>
+              <a:t>Non-Ajax applications often have just one or only a few server-side sources of responses</a:t>
+            </a:r>
+          </a:p>
+          <a:p>
+            <a:endParaRPr lang="en-US" dirty="0"/>
+          </a:p>
+          <a:p>
+            <a:r>
+              <a:rPr lang="en-US" dirty="0"/>
+              <a:t>Ajax applications often have </a:t>
+            </a:r>
+            <a:r>
+              <a:rPr lang="en-US" b="1" dirty="0"/>
+              <a:t>many server-side programs</a:t>
+            </a:r>
+            <a:r>
+              <a:rPr lang="en-US" dirty="0"/>
+              <a:t> that produce small amounts of data.  </a:t>
+            </a:r>
+          </a:p>
+          <a:p>
+            <a:endParaRPr lang="en-US" dirty="0"/>
+          </a:p>
+          <a:p>
+            <a:r>
+              <a:rPr lang="en-US" dirty="0">
+                <a:solidFill>
+                  <a:srgbClr val="FF0000"/>
+                </a:solidFill>
+              </a:rPr>
+              <a:t>This increases the attack surface of the whole application</a:t>
+            </a:r>
+          </a:p>
+          <a:p>
+            <a:endParaRPr lang="en-US" dirty="0"/>
+          </a:p>
+          <a:p>
+            <a:endParaRPr lang="en-US" dirty="0"/>
+          </a:p>
+          <a:p>
+            <a:endParaRPr lang="en-US" dirty="0"/>
+          </a:p>
+        </p:txBody>
+      </p:sp>
+      <p:sp>
+        <p:nvSpPr>
+          <p:cNvPr id="8" name="Slide Number Placeholder 7"/>
+          <p:cNvSpPr>
+            <a:spLocks noGrp="1"/>
+          </p:cNvSpPr>
+          <p:nvPr>
+            <p:ph type="sldNum" sz="quarter" idx="12"/>
+          </p:nvPr>
+        </p:nvSpPr>
+        <p:spPr/>
+        <p:txBody>
+          <a:bodyPr/>
+          <a:lstStyle/>
+          <a:p>
+            <a:fld id="{B68E68E5-E6FC-4206-8BED-C09E3F386DCD}" type="slidenum">
+              <a:rPr lang="en-US" smtClean="0"/>
+              <a:pPr/>
+              <a:t>36</a:t>
+            </a:fld>
+            <a:endParaRPr lang="en-US"/>
           </a:p>
         </p:txBody>
       </p:sp>
     </p:spTree>
     <p:extLst>
       <p:ext uri="{BB962C8B-B14F-4D97-AF65-F5344CB8AC3E}">
-        <p14:creationId xmlns:p14="http://schemas.microsoft.com/office/powerpoint/2010/main" val="3917904633"/>
+        <p14:creationId xmlns:p14="http://schemas.microsoft.com/office/powerpoint/2010/main" val="2278236532"/>
       </p:ext>
     </p:extLst>
   </p:cSld>
@@ -13739,7 +10295,12 @@
             <p:ph idx="1"/>
           </p:nvPr>
         </p:nvSpPr>
-        <p:spPr/>
+        <p:spPr>
+          <a:xfrm>
+            <a:off x="685800" y="1219200"/>
+            <a:ext cx="7772400" cy="4953000"/>
+          </a:xfrm>
+        </p:spPr>
         <p:txBody>
           <a:bodyPr>
             <a:normAutofit/>
@@ -13748,7 +10309,11 @@
           <a:p>
             <a:r>
               <a:rPr lang="en-US" dirty="0"/>
-              <a:t>Some security issues to keep in mind when using Ajax:</a:t>
+              <a:t>Therefore Ajax developers should put </a:t>
+            </a:r>
+            <a:r>
+              <a:rPr lang="en-US" b="1" dirty="0"/>
+              <a:t>security code in the client code</a:t>
             </a:r>
           </a:p>
           <a:p>
@@ -13757,47 +10322,37 @@
           <a:p>
             <a:r>
               <a:rPr lang="en-US" dirty="0"/>
-              <a:t>Non-Ajax applications often have just one or only a few server-side sources of responses</a:t>
-            </a:r>
-          </a:p>
-          <a:p>
-            <a:endParaRPr lang="en-US" dirty="0"/>
-          </a:p>
-          <a:p>
-            <a:r>
-              <a:rPr lang="en-US" dirty="0"/>
-              <a:t>Ajax applications often have </a:t>
+              <a:t>Also, </a:t>
             </a:r>
             <a:r>
               <a:rPr lang="en-US" b="1" dirty="0"/>
-              <a:t>many server-side programs</a:t>
-            </a:r>
-            <a:r>
-              <a:rPr lang="en-US" dirty="0"/>
-              <a:t> that produce small amounts of data.  </a:t>
-            </a:r>
-          </a:p>
-          <a:p>
-            <a:endParaRPr lang="en-US" dirty="0"/>
-          </a:p>
-          <a:p>
+              <a:t>must include in the server code</a:t>
+            </a:r>
+            <a:r>
+              <a:rPr lang="en-US" dirty="0"/>
+              <a:t>, because </a:t>
+            </a:r>
             <a:r>
               <a:rPr lang="en-US" dirty="0">
                 <a:solidFill>
-                  <a:srgbClr val="FF0000"/>
+                  <a:srgbClr val="7030A0"/>
                 </a:solidFill>
               </a:rPr>
-              <a:t>This increases the attack surface of the whole application</a:t>
+              <a:t>intruders can change the code on the client</a:t>
             </a:r>
           </a:p>
           <a:p>
             <a:endParaRPr lang="en-US" dirty="0"/>
           </a:p>
           <a:p>
-            <a:endParaRPr lang="en-US" dirty="0"/>
-          </a:p>
-          <a:p>
-            <a:endParaRPr lang="en-US" dirty="0"/>
+            <a:r>
+              <a:rPr lang="en-US" dirty="0"/>
+              <a:t>The common problem comes from </a:t>
+            </a:r>
+            <a:r>
+              <a:rPr lang="en-US" b="1" dirty="0"/>
+              <a:t>cross-site scripting</a:t>
+            </a:r>
           </a:p>
         </p:txBody>
       </p:sp>
@@ -13828,7 +10383,7 @@
     </p:spTree>
     <p:extLst>
       <p:ext uri="{BB962C8B-B14F-4D97-AF65-F5344CB8AC3E}">
-        <p14:creationId xmlns:p14="http://schemas.microsoft.com/office/powerpoint/2010/main" val="2278236532"/>
+        <p14:creationId xmlns:p14="http://schemas.microsoft.com/office/powerpoint/2010/main" val="1655927440"/>
       </p:ext>
     </p:extLst>
   </p:cSld>
@@ -13902,12 +10457,36 @@
           <a:lstStyle/>
           <a:p>
             <a:r>
-              <a:rPr lang="en-US" dirty="0"/>
-              <a:t>Therefore Ajax developers should put </a:t>
-            </a:r>
-            <a:r>
-              <a:rPr lang="en-US" b="1" dirty="0"/>
-              <a:t>security code in the client code</a:t>
+              <a:rPr lang="en-US" b="1" i="1" dirty="0">
+                <a:solidFill>
+                  <a:srgbClr val="FF0000"/>
+                </a:solidFill>
+              </a:rPr>
+              <a:t>Cross-site scripting </a:t>
+            </a:r>
+            <a:r>
+              <a:rPr lang="en-US" dirty="0"/>
+              <a:t>means servers providing JavaScript code as an Ajax response</a:t>
+            </a:r>
+          </a:p>
+          <a:p>
+            <a:pPr marL="342900" indent="-342900">
+              <a:buFont typeface="Arial" panose="020B0604020202020204" pitchFamily="34" charset="0"/>
+              <a:buChar char="•"/>
+            </a:pPr>
+            <a:r>
+              <a:rPr lang="en-US" dirty="0"/>
+              <a:t>Such code could be modified by an intruder before it is run on the client </a:t>
+            </a:r>
+          </a:p>
+          <a:p>
+            <a:pPr marL="342900" indent="-342900">
+              <a:buFont typeface="Arial" panose="020B0604020202020204" pitchFamily="34" charset="0"/>
+              <a:buChar char="•"/>
+            </a:pPr>
+            <a:r>
+              <a:rPr lang="en-US" dirty="0"/>
+              <a:t>All such code must be scanned before it is interpreted</a:t>
             </a:r>
           </a:p>
           <a:p>
@@ -13916,37 +10495,21 @@
           <a:p>
             <a:r>
               <a:rPr lang="en-US" dirty="0"/>
-              <a:t>Also, </a:t>
-            </a:r>
-            <a:r>
-              <a:rPr lang="en-US" b="1" dirty="0"/>
-              <a:t>must include in the server code</a:t>
-            </a:r>
-            <a:r>
-              <a:rPr lang="en-US" dirty="0"/>
-              <a:t>, because </a:t>
-            </a:r>
-            <a:r>
-              <a:rPr lang="en-US" dirty="0">
-                <a:solidFill>
-                  <a:srgbClr val="7030A0"/>
-                </a:solidFill>
-              </a:rPr>
-              <a:t>intruders can change the code on the client</a:t>
+              <a:t>Intruder code could also come to the client from text boxes used to collect return data</a:t>
+            </a:r>
+          </a:p>
+          <a:p>
+            <a:pPr marL="342900" indent="-342900">
+              <a:buFont typeface="Arial" panose="020B0604020202020204" pitchFamily="34" charset="0"/>
+              <a:buChar char="•"/>
+            </a:pPr>
+            <a:r>
+              <a:rPr lang="en-US" dirty="0"/>
+              <a:t>It could include script tags with malicious code</a:t>
             </a:r>
           </a:p>
           <a:p>
             <a:endParaRPr lang="en-US" dirty="0"/>
-          </a:p>
-          <a:p>
-            <a:r>
-              <a:rPr lang="en-US" dirty="0"/>
-              <a:t>The common problem comes from </a:t>
-            </a:r>
-            <a:r>
-              <a:rPr lang="en-US" b="1" dirty="0"/>
-              <a:t>cross-site scripting</a:t>
-            </a:r>
           </a:p>
         </p:txBody>
       </p:sp>
@@ -13977,7 +10540,7 @@
     </p:spTree>
     <p:extLst>
       <p:ext uri="{BB962C8B-B14F-4D97-AF65-F5344CB8AC3E}">
-        <p14:creationId xmlns:p14="http://schemas.microsoft.com/office/powerpoint/2010/main" val="1655927440"/>
+        <p14:creationId xmlns:p14="http://schemas.microsoft.com/office/powerpoint/2010/main" val="1604505368"/>
       </p:ext>
     </p:extLst>
   </p:cSld>
@@ -14006,7 +10569,7 @@
       </p:grpSpPr>
       <p:sp>
         <p:nvSpPr>
-          <p:cNvPr id="5" name="Title 4"/>
+          <p:cNvPr id="2" name="Title 1"/>
           <p:cNvSpPr>
             <a:spLocks noGrp="1"/>
           </p:cNvSpPr>
@@ -14016,21 +10579,19 @@
         </p:nvSpPr>
         <p:spPr/>
         <p:txBody>
-          <a:bodyPr>
-            <a:noAutofit/>
-          </a:bodyPr>
+          <a:bodyPr/>
           <a:lstStyle/>
           <a:p>
             <a:r>
               <a:rPr lang="en-US" dirty="0"/>
-              <a:t>Security and Ajax</a:t>
-            </a:r>
-          </a:p>
-        </p:txBody>
-      </p:sp>
-      <p:sp>
-        <p:nvSpPr>
-          <p:cNvPr id="6" name="Content Placeholder 5"/>
+              <a:t>Summary</a:t>
+            </a:r>
+          </a:p>
+        </p:txBody>
+      </p:sp>
+      <p:sp>
+        <p:nvSpPr>
+          <p:cNvPr id="3" name="Content Placeholder 2"/>
           <p:cNvSpPr>
             <a:spLocks noGrp="1"/>
           </p:cNvSpPr>
@@ -14041,28 +10602,14 @@
         <p:spPr>
           <a:xfrm>
             <a:off x="685800" y="1219200"/>
-            <a:ext cx="7772400" cy="4953000"/>
+            <a:ext cx="7772400" cy="4876800"/>
           </a:xfrm>
         </p:spPr>
         <p:txBody>
           <a:bodyPr>
-            <a:normAutofit/>
+            <a:normAutofit fontScale="92500" lnSpcReduction="10000"/>
           </a:bodyPr>
           <a:lstStyle/>
-          <a:p>
-            <a:r>
-              <a:rPr lang="en-US" b="1" i="1" dirty="0">
-                <a:solidFill>
-                  <a:srgbClr val="FF0000"/>
-                </a:solidFill>
-              </a:rPr>
-              <a:t>Cross-site scripting </a:t>
-            </a:r>
-            <a:r>
-              <a:rPr lang="en-US" dirty="0"/>
-              <a:t>means servers providing JavaScript code as an Ajax response</a:t>
-            </a:r>
-          </a:p>
           <a:p>
             <a:pPr marL="342900" indent="-342900">
               <a:buFont typeface="Arial" panose="020B0604020202020204" pitchFamily="34" charset="0"/>
@@ -14070,7 +10617,7 @@
             </a:pPr>
             <a:r>
               <a:rPr lang="en-US" dirty="0"/>
-              <a:t>Such code could be modified by an intruder before it is run on the client </a:t>
+              <a:t>AJAX is Asynchronous JavaScript and XML</a:t>
             </a:r>
           </a:p>
           <a:p>
@@ -14080,16 +10627,7 @@
             </a:pPr>
             <a:r>
               <a:rPr lang="en-US" dirty="0"/>
-              <a:t>All such code must be scanned before it is interpreted</a:t>
-            </a:r>
-          </a:p>
-          <a:p>
-            <a:endParaRPr lang="en-US" dirty="0"/>
-          </a:p>
-          <a:p>
-            <a:r>
-              <a:rPr lang="en-US" dirty="0"/>
-              <a:t>Intruder code could also come to the client from text boxes used to collect return data</a:t>
+              <a:t>Goal of Ajax is to provide Web-based applications with responsiveness approaching that of desktop applications</a:t>
             </a:r>
           </a:p>
           <a:p>
@@ -14099,42 +10637,81 @@
             </a:pPr>
             <a:r>
               <a:rPr lang="en-US" dirty="0"/>
-              <a:t>It could include script tags with malicious code</a:t>
-            </a:r>
-          </a:p>
-          <a:p>
-            <a:endParaRPr lang="en-US" dirty="0"/>
-          </a:p>
-        </p:txBody>
-      </p:sp>
-      <p:sp>
-        <p:nvSpPr>
-          <p:cNvPr id="8" name="Slide Number Placeholder 7"/>
-          <p:cNvSpPr>
-            <a:spLocks noGrp="1"/>
-          </p:cNvSpPr>
-          <p:nvPr>
-            <p:ph type="sldNum" sz="quarter" idx="12"/>
-          </p:nvPr>
-        </p:nvSpPr>
-        <p:spPr/>
-        <p:txBody>
-          <a:bodyPr/>
-          <a:lstStyle/>
-          <a:p>
-            <a:fld id="{B68E68E5-E6FC-4206-8BED-C09E3F386DCD}" type="slidenum">
-              <a:rPr lang="en-US" smtClean="0"/>
-              <a:pPr/>
-              <a:t>39</a:t>
-            </a:fld>
-            <a:endParaRPr lang="en-US"/>
+              <a:t>AJAX uses the </a:t>
+            </a:r>
+            <a:r>
+              <a:rPr lang="en-US" dirty="0" err="1"/>
+              <a:t>XMLHttpRequest</a:t>
+            </a:r>
+            <a:r>
+              <a:rPr lang="en-US" dirty="0"/>
+              <a:t> to transfer data between client and server</a:t>
+            </a:r>
+          </a:p>
+          <a:p>
+            <a:pPr marL="342900" indent="-342900">
+              <a:buFont typeface="Arial" panose="020B0604020202020204" pitchFamily="34" charset="0"/>
+              <a:buChar char="•"/>
+            </a:pPr>
+            <a:r>
+              <a:rPr lang="en-US" dirty="0"/>
+              <a:t>The callback function updates the page with the requested data arrives</a:t>
+            </a:r>
+          </a:p>
+          <a:p>
+            <a:pPr marL="342900" indent="-342900">
+              <a:buFont typeface="Arial" panose="020B0604020202020204" pitchFamily="34" charset="0"/>
+              <a:buChar char="•"/>
+            </a:pPr>
+            <a:r>
+              <a:rPr lang="en-US" dirty="0"/>
+              <a:t>Due to the issues with having to parse HTML or XML, JavaScript Object Notation (JSON) is often used</a:t>
+            </a:r>
+          </a:p>
+          <a:p>
+            <a:pPr marL="342900" indent="-342900">
+              <a:buFont typeface="Arial" panose="020B0604020202020204" pitchFamily="34" charset="0"/>
+              <a:buChar char="•"/>
+            </a:pPr>
+            <a:r>
+              <a:rPr lang="en-US" dirty="0"/>
+              <a:t>JSON objects are returned in </a:t>
+            </a:r>
+            <a:r>
+              <a:rPr lang="en-US" dirty="0" err="1"/>
+              <a:t>responseText</a:t>
+            </a:r>
+            <a:r>
+              <a:rPr lang="en-US" dirty="0"/>
+              <a:t> which are then parsed by a JSON parser</a:t>
+            </a:r>
+          </a:p>
+          <a:p>
+            <a:pPr marL="342900" indent="-342900">
+              <a:buFont typeface="Arial" panose="020B0604020202020204" pitchFamily="34" charset="0"/>
+              <a:buChar char="•"/>
+            </a:pPr>
+            <a:r>
+              <a:rPr lang="en-US" dirty="0"/>
+              <a:t>Ajax toolkits are libraries of functions that make it easy for you to add Ajax functionality to your web pages</a:t>
+            </a:r>
+          </a:p>
+          <a:p>
+            <a:pPr marL="342900" indent="-342900">
+              <a:buFont typeface="Arial" panose="020B0604020202020204" pitchFamily="34" charset="0"/>
+              <a:buChar char="•"/>
+            </a:pPr>
+            <a:r>
+              <a:rPr lang="en-US" dirty="0"/>
+              <a:t>Cross-site scripting is a security vulnerability that involves servers providing JavaScript code as an Ajax response</a:t>
+            </a:r>
           </a:p>
         </p:txBody>
       </p:sp>
     </p:spTree>
     <p:extLst>
       <p:ext uri="{BB962C8B-B14F-4D97-AF65-F5344CB8AC3E}">
-        <p14:creationId xmlns:p14="http://schemas.microsoft.com/office/powerpoint/2010/main" val="1604505368"/>
+        <p14:creationId xmlns:p14="http://schemas.microsoft.com/office/powerpoint/2010/main" val="1554061922"/>
       </p:ext>
     </p:extLst>
   </p:cSld>
@@ -14292,283 +10869,6 @@
     <p:extLst>
       <p:ext uri="{BB962C8B-B14F-4D97-AF65-F5344CB8AC3E}">
         <p14:creationId xmlns:p14="http://schemas.microsoft.com/office/powerpoint/2010/main" val="4066831752"/>
-      </p:ext>
-    </p:extLst>
-  </p:cSld>
-  <p:clrMapOvr>
-    <a:masterClrMapping/>
-  </p:clrMapOvr>
-</p:sld>
-</file>
-
-<file path=ppt/slides/slide40.xml><?xml version="1.0" encoding="utf-8"?>
-<p:sld xmlns:a="http://schemas.openxmlformats.org/drawingml/2006/main" xmlns:r="http://schemas.openxmlformats.org/officeDocument/2006/relationships" xmlns:p="http://schemas.openxmlformats.org/presentationml/2006/main">
-  <p:cSld>
-    <p:spTree>
-      <p:nvGrpSpPr>
-        <p:cNvPr id="1" name=""/>
-        <p:cNvGrpSpPr/>
-        <p:nvPr/>
-      </p:nvGrpSpPr>
-      <p:grpSpPr>
-        <a:xfrm>
-          <a:off x="0" y="0"/>
-          <a:ext cx="0" cy="0"/>
-          <a:chOff x="0" y="0"/>
-          <a:chExt cx="0" cy="0"/>
-        </a:xfrm>
-      </p:grpSpPr>
-      <p:sp>
-        <p:nvSpPr>
-          <p:cNvPr id="2" name="Title 1"/>
-          <p:cNvSpPr>
-            <a:spLocks noGrp="1"/>
-          </p:cNvSpPr>
-          <p:nvPr>
-            <p:ph type="title"/>
-          </p:nvPr>
-        </p:nvSpPr>
-        <p:spPr/>
-        <p:txBody>
-          <a:bodyPr/>
-          <a:lstStyle/>
-          <a:p>
-            <a:r>
-              <a:rPr lang="en-US" dirty="0"/>
-              <a:t>Summary</a:t>
-            </a:r>
-          </a:p>
-        </p:txBody>
-      </p:sp>
-      <p:sp>
-        <p:nvSpPr>
-          <p:cNvPr id="3" name="Content Placeholder 2"/>
-          <p:cNvSpPr>
-            <a:spLocks noGrp="1"/>
-          </p:cNvSpPr>
-          <p:nvPr>
-            <p:ph idx="1"/>
-          </p:nvPr>
-        </p:nvSpPr>
-        <p:spPr>
-          <a:xfrm>
-            <a:off x="685800" y="1219200"/>
-            <a:ext cx="7772400" cy="4876800"/>
-          </a:xfrm>
-        </p:spPr>
-        <p:txBody>
-          <a:bodyPr>
-            <a:normAutofit fontScale="92500" lnSpcReduction="10000"/>
-          </a:bodyPr>
-          <a:lstStyle/>
-          <a:p>
-            <a:pPr marL="342900" indent="-342900">
-              <a:buFont typeface="Arial" panose="020B0604020202020204" pitchFamily="34" charset="0"/>
-              <a:buChar char="•"/>
-            </a:pPr>
-            <a:r>
-              <a:rPr lang="en-US" dirty="0"/>
-              <a:t>AJAX is Asynchronous JavaScript and XML</a:t>
-            </a:r>
-          </a:p>
-          <a:p>
-            <a:pPr marL="342900" indent="-342900">
-              <a:buFont typeface="Arial" panose="020B0604020202020204" pitchFamily="34" charset="0"/>
-              <a:buChar char="•"/>
-            </a:pPr>
-            <a:r>
-              <a:rPr lang="en-US" dirty="0"/>
-              <a:t>Goal of Ajax is to provide Web-based applications with responsiveness approaching that of desktop applications</a:t>
-            </a:r>
-          </a:p>
-          <a:p>
-            <a:pPr marL="342900" indent="-342900">
-              <a:buFont typeface="Arial" panose="020B0604020202020204" pitchFamily="34" charset="0"/>
-              <a:buChar char="•"/>
-            </a:pPr>
-            <a:r>
-              <a:rPr lang="en-US" dirty="0"/>
-              <a:t>AJAX uses the </a:t>
-            </a:r>
-            <a:r>
-              <a:rPr lang="en-US" dirty="0" err="1"/>
-              <a:t>XMLHttpRequest</a:t>
-            </a:r>
-            <a:r>
-              <a:rPr lang="en-US" dirty="0"/>
-              <a:t> to transfer data between client and server</a:t>
-            </a:r>
-          </a:p>
-          <a:p>
-            <a:pPr marL="342900" indent="-342900">
-              <a:buFont typeface="Arial" panose="020B0604020202020204" pitchFamily="34" charset="0"/>
-              <a:buChar char="•"/>
-            </a:pPr>
-            <a:r>
-              <a:rPr lang="en-US" dirty="0"/>
-              <a:t>The callback function updates the page with the requested data arrives</a:t>
-            </a:r>
-          </a:p>
-          <a:p>
-            <a:pPr marL="342900" indent="-342900">
-              <a:buFont typeface="Arial" panose="020B0604020202020204" pitchFamily="34" charset="0"/>
-              <a:buChar char="•"/>
-            </a:pPr>
-            <a:r>
-              <a:rPr lang="en-US" dirty="0"/>
-              <a:t>Due to the issues with having to parse HTML or XML, JavaScript Object Notation (JSON) is often used</a:t>
-            </a:r>
-          </a:p>
-          <a:p>
-            <a:pPr marL="342900" indent="-342900">
-              <a:buFont typeface="Arial" panose="020B0604020202020204" pitchFamily="34" charset="0"/>
-              <a:buChar char="•"/>
-            </a:pPr>
-            <a:r>
-              <a:rPr lang="en-US" dirty="0"/>
-              <a:t>JSON objects are returned in </a:t>
-            </a:r>
-            <a:r>
-              <a:rPr lang="en-US" dirty="0" err="1"/>
-              <a:t>responseText</a:t>
-            </a:r>
-            <a:r>
-              <a:rPr lang="en-US" dirty="0"/>
-              <a:t> which are then parsed by a JSON parser</a:t>
-            </a:r>
-          </a:p>
-          <a:p>
-            <a:pPr marL="342900" indent="-342900">
-              <a:buFont typeface="Arial" panose="020B0604020202020204" pitchFamily="34" charset="0"/>
-              <a:buChar char="•"/>
-            </a:pPr>
-            <a:r>
-              <a:rPr lang="en-US" dirty="0"/>
-              <a:t>Ajax toolkits are libraries of functions that make it easy for you to add Ajax functionality to your web pages</a:t>
-            </a:r>
-          </a:p>
-          <a:p>
-            <a:pPr marL="342900" indent="-342900">
-              <a:buFont typeface="Arial" panose="020B0604020202020204" pitchFamily="34" charset="0"/>
-              <a:buChar char="•"/>
-            </a:pPr>
-            <a:r>
-              <a:rPr lang="en-US" dirty="0"/>
-              <a:t>Cross-site scripting is a security vulnerability that involves servers providing JavaScript code as an Ajax response</a:t>
-            </a:r>
-          </a:p>
-        </p:txBody>
-      </p:sp>
-    </p:spTree>
-    <p:extLst>
-      <p:ext uri="{BB962C8B-B14F-4D97-AF65-F5344CB8AC3E}">
-        <p14:creationId xmlns:p14="http://schemas.microsoft.com/office/powerpoint/2010/main" val="1554061922"/>
-      </p:ext>
-    </p:extLst>
-  </p:cSld>
-  <p:clrMapOvr>
-    <a:masterClrMapping/>
-  </p:clrMapOvr>
-</p:sld>
-</file>
-
-<file path=ppt/slides/slide41.xml><?xml version="1.0" encoding="utf-8"?>
-<p:sld xmlns:a="http://schemas.openxmlformats.org/drawingml/2006/main" xmlns:r="http://schemas.openxmlformats.org/officeDocument/2006/relationships" xmlns:p="http://schemas.openxmlformats.org/presentationml/2006/main">
-  <p:cSld>
-    <p:bg>
-      <p:bgPr>
-        <a:solidFill>
-          <a:schemeClr val="bg1">
-            <a:lumMod val="75000"/>
-          </a:schemeClr>
-        </a:solidFill>
-        <a:effectLst/>
-      </p:bgPr>
-    </p:bg>
-    <p:spTree>
-      <p:nvGrpSpPr>
-        <p:cNvPr id="1" name=""/>
-        <p:cNvGrpSpPr/>
-        <p:nvPr/>
-      </p:nvGrpSpPr>
-      <p:grpSpPr>
-        <a:xfrm>
-          <a:off x="0" y="0"/>
-          <a:ext cx="0" cy="0"/>
-          <a:chOff x="0" y="0"/>
-          <a:chExt cx="0" cy="0"/>
-        </a:xfrm>
-      </p:grpSpPr>
-      <p:sp>
-        <p:nvSpPr>
-          <p:cNvPr id="2" name="Title 1"/>
-          <p:cNvSpPr>
-            <a:spLocks noGrp="1"/>
-          </p:cNvSpPr>
-          <p:nvPr>
-            <p:ph type="ctrTitle"/>
-          </p:nvPr>
-        </p:nvSpPr>
-        <p:spPr>
-          <a:xfrm>
-            <a:off x="1143000" y="1699022"/>
-            <a:ext cx="6858000" cy="1790700"/>
-          </a:xfrm>
-        </p:spPr>
-        <p:txBody>
-          <a:bodyPr>
-            <a:normAutofit/>
-          </a:bodyPr>
-          <a:lstStyle/>
-          <a:p>
-            <a:r>
-              <a:rPr lang="en-US" sz="3600" dirty="0"/>
-              <a:t>End of Session 28</a:t>
-            </a:r>
-          </a:p>
-        </p:txBody>
-      </p:sp>
-      <p:sp>
-        <p:nvSpPr>
-          <p:cNvPr id="3" name="Subtitle 2"/>
-          <p:cNvSpPr>
-            <a:spLocks noGrp="1"/>
-          </p:cNvSpPr>
-          <p:nvPr>
-            <p:ph type="subTitle" idx="1"/>
-          </p:nvPr>
-        </p:nvSpPr>
-        <p:spPr>
-          <a:xfrm>
-            <a:off x="1143000" y="3558778"/>
-            <a:ext cx="6858000" cy="1648517"/>
-          </a:xfrm>
-        </p:spPr>
-        <p:txBody>
-          <a:bodyPr>
-            <a:normAutofit/>
-          </a:bodyPr>
-          <a:lstStyle/>
-          <a:p>
-            <a:pPr algn="l"/>
-            <a:r>
-              <a:rPr lang="en-US" dirty="0"/>
-              <a:t>Course Number: CPSC-24700</a:t>
-            </a:r>
-          </a:p>
-          <a:p>
-            <a:pPr algn="l"/>
-            <a:r>
-              <a:rPr lang="en-US" dirty="0"/>
-              <a:t>Instructor: Eric Pogue</a:t>
-            </a:r>
-          </a:p>
-        </p:txBody>
-      </p:sp>
-    </p:spTree>
-    <p:extLst>
-      <p:ext uri="{BB962C8B-B14F-4D97-AF65-F5344CB8AC3E}">
-        <p14:creationId xmlns:p14="http://schemas.microsoft.com/office/powerpoint/2010/main" val="4160976387"/>
       </p:ext>
     </p:extLst>
   </p:cSld>
@@ -16172,301 +12472,6 @@
         <a:sysClr val="window" lastClr="FFFFFF"/>
       </a:lt1>
       <a:dk2>
-        <a:srgbClr val="44546A"/>
-      </a:dk2>
-      <a:lt2>
-        <a:srgbClr val="E7E6E6"/>
-      </a:lt2>
-      <a:accent1>
-        <a:srgbClr val="4472C4"/>
-      </a:accent1>
-      <a:accent2>
-        <a:srgbClr val="ED7D31"/>
-      </a:accent2>
-      <a:accent3>
-        <a:srgbClr val="A5A5A5"/>
-      </a:accent3>
-      <a:accent4>
-        <a:srgbClr val="FFC000"/>
-      </a:accent4>
-      <a:accent5>
-        <a:srgbClr val="5B9BD5"/>
-      </a:accent5>
-      <a:accent6>
-        <a:srgbClr val="70AD47"/>
-      </a:accent6>
-      <a:hlink>
-        <a:srgbClr val="0563C1"/>
-      </a:hlink>
-      <a:folHlink>
-        <a:srgbClr val="954F72"/>
-      </a:folHlink>
-    </a:clrScheme>
-    <a:fontScheme name="Office">
-      <a:majorFont>
-        <a:latin typeface="Calibri Light" panose="020F0302020204030204"/>
-        <a:ea typeface=""/>
-        <a:cs typeface=""/>
-        <a:font script="Jpan" typeface="游ゴシック Light"/>
-        <a:font script="Hang" typeface="맑은 고딕"/>
-        <a:font script="Hans" typeface="等线 Light"/>
-        <a:font script="Hant" typeface="新細明體"/>
-        <a:font script="Arab" typeface="Times New Roman"/>
-        <a:font script="Hebr" typeface="Times New Roman"/>
-        <a:font script="Thai" typeface="Angsana New"/>
-        <a:font script="Ethi" typeface="Nyala"/>
-        <a:font script="Beng" typeface="Vrinda"/>
-        <a:font script="Gujr" typeface="Shruti"/>
-        <a:font script="Khmr" typeface="MoolBoran"/>
-        <a:font script="Knda" typeface="Tunga"/>
-        <a:font script="Guru" typeface="Raavi"/>
-        <a:font script="Cans" typeface="Euphemia"/>
-        <a:font script="Cher" typeface="Plantagenet Cherokee"/>
-        <a:font script="Yiii" typeface="Microsoft Yi Baiti"/>
-        <a:font script="Tibt" typeface="Microsoft Himalaya"/>
-        <a:font script="Thaa" typeface="MV Boli"/>
-        <a:font script="Deva" typeface="Mangal"/>
-        <a:font script="Telu" typeface="Gautami"/>
-        <a:font script="Taml" typeface="Latha"/>
-        <a:font script="Syrc" typeface="Estrangelo Edessa"/>
-        <a:font script="Orya" typeface="Kalinga"/>
-        <a:font script="Mlym" typeface="Kartika"/>
-        <a:font script="Laoo" typeface="DokChampa"/>
-        <a:font script="Sinh" typeface="Iskoola Pota"/>
-        <a:font script="Mong" typeface="Mongolian Baiti"/>
-        <a:font script="Viet" typeface="Times New Roman"/>
-        <a:font script="Uigh" typeface="Microsoft Uighur"/>
-        <a:font script="Geor" typeface="Sylfaen"/>
-        <a:font script="Armn" typeface="Arial"/>
-        <a:font script="Bugi" typeface="Leelawadee UI"/>
-        <a:font script="Bopo" typeface="Microsoft JhengHei"/>
-        <a:font script="Java" typeface="Javanese Text"/>
-        <a:font script="Lisu" typeface="Segoe UI"/>
-        <a:font script="Mymr" typeface="Myanmar Text"/>
-        <a:font script="Nkoo" typeface="Ebrima"/>
-        <a:font script="Olck" typeface="Nirmala UI"/>
-        <a:font script="Osma" typeface="Ebrima"/>
-        <a:font script="Phag" typeface="Phagspa"/>
-        <a:font script="Syrn" typeface="Estrangelo Edessa"/>
-        <a:font script="Syrj" typeface="Estrangelo Edessa"/>
-        <a:font script="Syre" typeface="Estrangelo Edessa"/>
-        <a:font script="Sora" typeface="Nirmala UI"/>
-        <a:font script="Tale" typeface="Microsoft Tai Le"/>
-        <a:font script="Talu" typeface="Microsoft New Tai Lue"/>
-        <a:font script="Tfng" typeface="Ebrima"/>
-      </a:majorFont>
-      <a:minorFont>
-        <a:latin typeface="Calibri" panose="020F0502020204030204"/>
-        <a:ea typeface=""/>
-        <a:cs typeface=""/>
-        <a:font script="Jpan" typeface="游ゴシック"/>
-        <a:font script="Hang" typeface="맑은 고딕"/>
-        <a:font script="Hans" typeface="等线"/>
-        <a:font script="Hant" typeface="新細明體"/>
-        <a:font script="Arab" typeface="Arial"/>
-        <a:font script="Hebr" typeface="Arial"/>
-        <a:font script="Thai" typeface="Cordia New"/>
-        <a:font script="Ethi" typeface="Nyala"/>
-        <a:font script="Beng" typeface="Vrinda"/>
-        <a:font script="Gujr" typeface="Shruti"/>
-        <a:font script="Khmr" typeface="DaunPenh"/>
-        <a:font script="Knda" typeface="Tunga"/>
-        <a:font script="Guru" typeface="Raavi"/>
-        <a:font script="Cans" typeface="Euphemia"/>
-        <a:font script="Cher" typeface="Plantagenet Cherokee"/>
-        <a:font script="Yiii" typeface="Microsoft Yi Baiti"/>
-        <a:font script="Tibt" typeface="Microsoft Himalaya"/>
-        <a:font script="Thaa" typeface="MV Boli"/>
-        <a:font script="Deva" typeface="Mangal"/>
-        <a:font script="Telu" typeface="Gautami"/>
-        <a:font script="Taml" typeface="Latha"/>
-        <a:font script="Syrc" typeface="Estrangelo Edessa"/>
-        <a:font script="Orya" typeface="Kalinga"/>
-        <a:font script="Mlym" typeface="Kartika"/>
-        <a:font script="Laoo" typeface="DokChampa"/>
-        <a:font script="Sinh" typeface="Iskoola Pota"/>
-        <a:font script="Mong" typeface="Mongolian Baiti"/>
-        <a:font script="Viet" typeface="Arial"/>
-        <a:font script="Uigh" typeface="Microsoft Uighur"/>
-        <a:font script="Geor" typeface="Sylfaen"/>
-        <a:font script="Armn" typeface="Arial"/>
-        <a:font script="Bugi" typeface="Leelawadee UI"/>
-        <a:font script="Bopo" typeface="Microsoft JhengHei"/>
-        <a:font script="Java" typeface="Javanese Text"/>
-        <a:font script="Lisu" typeface="Segoe UI"/>
-        <a:font script="Mymr" typeface="Myanmar Text"/>
-        <a:font script="Nkoo" typeface="Ebrima"/>
-        <a:font script="Olck" typeface="Nirmala UI"/>
-        <a:font script="Osma" typeface="Ebrima"/>
-        <a:font script="Phag" typeface="Phagspa"/>
-        <a:font script="Syrn" typeface="Estrangelo Edessa"/>
-        <a:font script="Syrj" typeface="Estrangelo Edessa"/>
-        <a:font script="Syre" typeface="Estrangelo Edessa"/>
-        <a:font script="Sora" typeface="Nirmala UI"/>
-        <a:font script="Tale" typeface="Microsoft Tai Le"/>
-        <a:font script="Talu" typeface="Microsoft New Tai Lue"/>
-        <a:font script="Tfng" typeface="Ebrima"/>
-      </a:minorFont>
-    </a:fontScheme>
-    <a:fmtScheme name="Office">
-      <a:fillStyleLst>
-        <a:solidFill>
-          <a:schemeClr val="phClr"/>
-        </a:solidFill>
-        <a:gradFill rotWithShape="1">
-          <a:gsLst>
-            <a:gs pos="0">
-              <a:schemeClr val="phClr">
-                <a:lumMod val="110000"/>
-                <a:satMod val="105000"/>
-                <a:tint val="67000"/>
-              </a:schemeClr>
-            </a:gs>
-            <a:gs pos="50000">
-              <a:schemeClr val="phClr">
-                <a:lumMod val="105000"/>
-                <a:satMod val="103000"/>
-                <a:tint val="73000"/>
-              </a:schemeClr>
-            </a:gs>
-            <a:gs pos="100000">
-              <a:schemeClr val="phClr">
-                <a:lumMod val="105000"/>
-                <a:satMod val="109000"/>
-                <a:tint val="81000"/>
-              </a:schemeClr>
-            </a:gs>
-          </a:gsLst>
-          <a:lin ang="5400000" scaled="0"/>
-        </a:gradFill>
-        <a:gradFill rotWithShape="1">
-          <a:gsLst>
-            <a:gs pos="0">
-              <a:schemeClr val="phClr">
-                <a:satMod val="103000"/>
-                <a:lumMod val="102000"/>
-                <a:tint val="94000"/>
-              </a:schemeClr>
-            </a:gs>
-            <a:gs pos="50000">
-              <a:schemeClr val="phClr">
-                <a:satMod val="110000"/>
-                <a:lumMod val="100000"/>
-                <a:shade val="100000"/>
-              </a:schemeClr>
-            </a:gs>
-            <a:gs pos="100000">
-              <a:schemeClr val="phClr">
-                <a:lumMod val="99000"/>
-                <a:satMod val="120000"/>
-                <a:shade val="78000"/>
-              </a:schemeClr>
-            </a:gs>
-          </a:gsLst>
-          <a:lin ang="5400000" scaled="0"/>
-        </a:gradFill>
-      </a:fillStyleLst>
-      <a:lnStyleLst>
-        <a:ln w="6350" cap="flat" cmpd="sng" algn="ctr">
-          <a:solidFill>
-            <a:schemeClr val="phClr"/>
-          </a:solidFill>
-          <a:prstDash val="solid"/>
-          <a:miter lim="800000"/>
-        </a:ln>
-        <a:ln w="12700" cap="flat" cmpd="sng" algn="ctr">
-          <a:solidFill>
-            <a:schemeClr val="phClr"/>
-          </a:solidFill>
-          <a:prstDash val="solid"/>
-          <a:miter lim="800000"/>
-        </a:ln>
-        <a:ln w="19050" cap="flat" cmpd="sng" algn="ctr">
-          <a:solidFill>
-            <a:schemeClr val="phClr"/>
-          </a:solidFill>
-          <a:prstDash val="solid"/>
-          <a:miter lim="800000"/>
-        </a:ln>
-      </a:lnStyleLst>
-      <a:effectStyleLst>
-        <a:effectStyle>
-          <a:effectLst/>
-        </a:effectStyle>
-        <a:effectStyle>
-          <a:effectLst/>
-        </a:effectStyle>
-        <a:effectStyle>
-          <a:effectLst>
-            <a:outerShdw blurRad="57150" dist="19050" dir="5400000" algn="ctr" rotWithShape="0">
-              <a:srgbClr val="000000">
-                <a:alpha val="63000"/>
-              </a:srgbClr>
-            </a:outerShdw>
-          </a:effectLst>
-        </a:effectStyle>
-      </a:effectStyleLst>
-      <a:bgFillStyleLst>
-        <a:solidFill>
-          <a:schemeClr val="phClr"/>
-        </a:solidFill>
-        <a:solidFill>
-          <a:schemeClr val="phClr">
-            <a:tint val="95000"/>
-            <a:satMod val="170000"/>
-          </a:schemeClr>
-        </a:solidFill>
-        <a:gradFill rotWithShape="1">
-          <a:gsLst>
-            <a:gs pos="0">
-              <a:schemeClr val="phClr">
-                <a:tint val="93000"/>
-                <a:satMod val="150000"/>
-                <a:shade val="98000"/>
-                <a:lumMod val="102000"/>
-              </a:schemeClr>
-            </a:gs>
-            <a:gs pos="50000">
-              <a:schemeClr val="phClr">
-                <a:tint val="98000"/>
-                <a:satMod val="130000"/>
-                <a:shade val="90000"/>
-                <a:lumMod val="103000"/>
-              </a:schemeClr>
-            </a:gs>
-            <a:gs pos="100000">
-              <a:schemeClr val="phClr">
-                <a:shade val="63000"/>
-                <a:satMod val="120000"/>
-              </a:schemeClr>
-            </a:gs>
-          </a:gsLst>
-          <a:lin ang="5400000" scaled="0"/>
-        </a:gradFill>
-      </a:bgFillStyleLst>
-    </a:fmtScheme>
-  </a:themeElements>
-  <a:objectDefaults/>
-  <a:extraClrSchemeLst/>
-  <a:extLst>
-    <a:ext uri="{05A4C25C-085E-4340-85A3-A5531E510DB2}">
-      <thm15:themeFamily xmlns:thm15="http://schemas.microsoft.com/office/thememl/2012/main" name="Office Theme" id="{62F939B6-93AF-4DB8-9C6B-D6C7DFDC589F}" vid="{4A3C46E8-61CC-4603-A589-7422A47A8E4A}"/>
-    </a:ext>
-  </a:extLst>
-</a:theme>
-</file>
-
-<file path=ppt/theme/theme3.xml><?xml version="1.0" encoding="utf-8"?>
-<a:theme xmlns:a="http://schemas.openxmlformats.org/drawingml/2006/main" name="Office Theme">
-  <a:themeElements>
-    <a:clrScheme name="Office">
-      <a:dk1>
-        <a:sysClr val="windowText" lastClr="000000"/>
-      </a:dk1>
-      <a:lt1>
-        <a:sysClr val="window" lastClr="FFFFFF"/>
-      </a:lt1>
-      <a:dk2>
         <a:srgbClr val="1F497D"/>
       </a:dk2>
       <a:lt2>

</xml_diff>